<commit_message>
Added a new post about Azure workflows
</commit_message>
<xml_diff>
--- a/illustrations/illustrations.pptx
+++ b/illustrations/illustrations.pptx
@@ -5,12 +5,13 @@
     <p:sldMasterId id="2147483648" r:id="rId1"/>
   </p:sldMasterIdLst>
   <p:notesMasterIdLst>
-    <p:notesMasterId r:id="rId5"/>
+    <p:notesMasterId r:id="rId6"/>
   </p:notesMasterIdLst>
   <p:sldIdLst>
     <p:sldId id="574" r:id="rId2"/>
     <p:sldId id="575" r:id="rId3"/>
     <p:sldId id="576" r:id="rId4"/>
+    <p:sldId id="577" r:id="rId5"/>
   </p:sldIdLst>
   <p:sldSz cx="9144000" cy="6858000" type="screen4x3"/>
   <p:notesSz cx="6858000" cy="9144000"/>
@@ -232,7 +233,7 @@
             <a:fld id="{1C54B592-DDDB-4FBB-91F2-233647701935}" type="datetimeFigureOut">
               <a:rPr lang="en-US" smtClean="0"/>
               <a:pPr/>
-              <a:t>11/19/2015</a:t>
+              <a:t>11/21/2015</a:t>
             </a:fld>
             <a:endParaRPr lang="en-US" dirty="0"/>
           </a:p>
@@ -790,7 +791,7 @@
           <a:p>
             <a:fld id="{C7AE018C-EBF3-4294-9E53-BB9692A1B238}" type="datetime1">
               <a:rPr lang="en-US" smtClean="0"/>
-              <a:t>11/19/2015</a:t>
+              <a:t>11/21/2015</a:t>
             </a:fld>
             <a:endParaRPr lang="en-US" dirty="0"/>
           </a:p>
@@ -953,7 +954,7 @@
           <a:p>
             <a:fld id="{AC5D3C69-66A1-4D00-B513-42CC0FCC59B6}" type="datetime1">
               <a:rPr lang="en-US" smtClean="0"/>
-              <a:t>11/19/2015</a:t>
+              <a:t>11/21/2015</a:t>
             </a:fld>
             <a:endParaRPr lang="en-US" dirty="0"/>
           </a:p>
@@ -1056,7 +1057,7 @@
           <a:p>
             <a:fld id="{DF081C4C-367B-4CA1-BFE5-DD5EF40A8C1E}" type="datetime1">
               <a:rPr lang="en-US" smtClean="0"/>
-              <a:t>11/19/2015</a:t>
+              <a:t>11/21/2015</a:t>
             </a:fld>
             <a:endParaRPr lang="en-US" dirty="0"/>
           </a:p>
@@ -1346,7 +1347,7 @@
           <a:p>
             <a:fld id="{7284FD7A-D0F1-4BFD-9AB1-D45A3214561B}" type="datetime1">
               <a:rPr lang="en-US" smtClean="0"/>
-              <a:t>11/19/2015</a:t>
+              <a:t>11/21/2015</a:t>
             </a:fld>
             <a:endParaRPr lang="en-US" dirty="0"/>
           </a:p>
@@ -1643,7 +1644,7 @@
           <a:p>
             <a:fld id="{7C1E8470-7002-4B16-912E-F3381BBFC303}" type="datetime1">
               <a:rPr lang="en-US" smtClean="0"/>
-              <a:t>11/19/2015</a:t>
+              <a:t>11/21/2015</a:t>
             </a:fld>
             <a:endParaRPr lang="en-US" dirty="0"/>
           </a:p>
@@ -2074,7 +2075,7 @@
           <a:p>
             <a:fld id="{2668835A-C4A1-487E-A7B8-3E3B6A85266C}" type="datetime1">
               <a:rPr lang="en-US" smtClean="0"/>
-              <a:t>11/19/2015</a:t>
+              <a:t>11/21/2015</a:t>
             </a:fld>
             <a:endParaRPr lang="en-US" dirty="0"/>
           </a:p>
@@ -2170,7 +2171,7 @@
           <a:p>
             <a:fld id="{83E71AAB-E703-47FE-974E-9D2B932F9534}" type="datetime1">
               <a:rPr lang="en-US" smtClean="0"/>
-              <a:t>11/19/2015</a:t>
+              <a:t>11/21/2015</a:t>
             </a:fld>
             <a:endParaRPr lang="en-US" dirty="0"/>
           </a:p>
@@ -2356,7 +2357,7 @@
           <a:p>
             <a:fld id="{C6C74358-98AB-4C1A-82FF-49E7FEE02080}" type="datetime1">
               <a:rPr lang="en-US" smtClean="0"/>
-              <a:t>11/19/2015</a:t>
+              <a:t>11/21/2015</a:t>
             </a:fld>
             <a:endParaRPr lang="en-US" dirty="0"/>
           </a:p>
@@ -2844,10 +2845,6 @@
               </a:rPr>
               <a:t>Micros POS Server</a:t>
             </a:r>
-            <a:endParaRPr lang="en-US" dirty="0" smtClean="0">
-              <a:latin typeface="Segoe UI Light" panose="020B0502040204020203" pitchFamily="34" charset="0"/>
-              <a:cs typeface="Segoe UI Light" panose="020B0502040204020203" pitchFamily="34" charset="0"/>
-            </a:endParaRPr>
           </a:p>
           <a:p>
             <a:pPr algn="ctr"/>
@@ -2981,10 +2978,6 @@
               </a:rPr>
               <a:t>Cloud Server</a:t>
             </a:r>
-            <a:endParaRPr lang="en-US" dirty="0" smtClean="0">
-              <a:latin typeface="Segoe UI Light" panose="020B0502040204020203" pitchFamily="34" charset="0"/>
-              <a:cs typeface="Segoe UI Light" panose="020B0502040204020203" pitchFamily="34" charset="0"/>
-            </a:endParaRPr>
           </a:p>
           <a:p>
             <a:pPr algn="ctr"/>
@@ -3472,10 +3465,6 @@
               </a:rPr>
               <a:t>Cloud Server</a:t>
             </a:r>
-            <a:endParaRPr lang="en-US" dirty="0" smtClean="0">
-              <a:latin typeface="Segoe UI Light" panose="020B0502040204020203" pitchFamily="34" charset="0"/>
-              <a:cs typeface="Segoe UI Light" panose="020B0502040204020203" pitchFamily="34" charset="0"/>
-            </a:endParaRPr>
           </a:p>
           <a:p>
             <a:pPr algn="ctr"/>
@@ -3629,10 +3618,6 @@
               </a:rPr>
               <a:t>Logic App</a:t>
             </a:r>
-            <a:endParaRPr lang="en-US" dirty="0" smtClean="0">
-              <a:latin typeface="Segoe UI Light" panose="020B0502040204020203" pitchFamily="34" charset="0"/>
-              <a:cs typeface="Segoe UI Light" panose="020B0502040204020203" pitchFamily="34" charset="0"/>
-            </a:endParaRPr>
           </a:p>
           <a:p>
             <a:pPr algn="ctr"/>
@@ -3834,10 +3819,6 @@
               </a:rPr>
               <a:t>Cloud Server</a:t>
             </a:r>
-            <a:endParaRPr lang="en-US" dirty="0" smtClean="0">
-              <a:latin typeface="Segoe UI Light" panose="020B0502040204020203" pitchFamily="34" charset="0"/>
-              <a:cs typeface="Segoe UI Light" panose="020B0502040204020203" pitchFamily="34" charset="0"/>
-            </a:endParaRPr>
           </a:p>
           <a:p>
             <a:pPr algn="ctr"/>
@@ -3908,10 +3889,6 @@
               </a:rPr>
               <a:t>Logic App</a:t>
             </a:r>
-            <a:endParaRPr lang="en-US" dirty="0" smtClean="0">
-              <a:latin typeface="Segoe UI Light" panose="020B0502040204020203" pitchFamily="34" charset="0"/>
-              <a:cs typeface="Segoe UI Light" panose="020B0502040204020203" pitchFamily="34" charset="0"/>
-            </a:endParaRPr>
           </a:p>
           <a:p>
             <a:pPr algn="ctr"/>
@@ -3977,10 +3954,6 @@
               </a:rPr>
               <a:t>App API</a:t>
             </a:r>
-            <a:endParaRPr lang="en-US" dirty="0" smtClean="0">
-              <a:latin typeface="Segoe UI Light" panose="020B0502040204020203" pitchFamily="34" charset="0"/>
-              <a:cs typeface="Segoe UI Light" panose="020B0502040204020203" pitchFamily="34" charset="0"/>
-            </a:endParaRPr>
           </a:p>
           <a:p>
             <a:pPr algn="ctr"/>
@@ -4321,6 +4294,2485 @@
   <p:clrMapOvr>
     <a:masterClrMapping/>
   </p:clrMapOvr>
+</p:sld>
+</file>
+
+<file path=ppt/slides/slide4.xml><?xml version="1.0" encoding="utf-8"?>
+<p:sld xmlns:a="http://schemas.openxmlformats.org/drawingml/2006/main" xmlns:r="http://schemas.openxmlformats.org/officeDocument/2006/relationships" xmlns:p="http://schemas.openxmlformats.org/presentationml/2006/main">
+  <p:cSld>
+    <p:spTree>
+      <p:nvGrpSpPr>
+        <p:cNvPr id="1" name=""/>
+        <p:cNvGrpSpPr/>
+        <p:nvPr/>
+      </p:nvGrpSpPr>
+      <p:grpSpPr>
+        <a:xfrm>
+          <a:off x="0" y="0"/>
+          <a:ext cx="0" cy="0"/>
+          <a:chOff x="0" y="0"/>
+          <a:chExt cx="0" cy="0"/>
+        </a:xfrm>
+      </p:grpSpPr>
+      <p:sp>
+        <p:nvSpPr>
+          <p:cNvPr id="2" name="Slide Number Placeholder 1"/>
+          <p:cNvSpPr>
+            <a:spLocks noGrp="1"/>
+          </p:cNvSpPr>
+          <p:nvPr>
+            <p:ph type="sldNum" sz="quarter" idx="12"/>
+          </p:nvPr>
+        </p:nvSpPr>
+        <p:spPr>
+          <a:xfrm>
+            <a:off x="6553200" y="5822950"/>
+            <a:ext cx="2133600" cy="365125"/>
+          </a:xfrm>
+        </p:spPr>
+        <p:txBody>
+          <a:bodyPr/>
+          <a:lstStyle/>
+          <a:p>
+            <a:fld id="{7C65DD3B-8E90-4815-956E-D18D24CB454B}" type="slidenum">
+              <a:rPr lang="en-US" smtClean="0"/>
+              <a:pPr/>
+              <a:t>4</a:t>
+            </a:fld>
+            <a:endParaRPr lang="en-US" dirty="0"/>
+          </a:p>
+        </p:txBody>
+      </p:sp>
+      <p:sp>
+        <p:nvSpPr>
+          <p:cNvPr id="3" name="Rectangle 2"/>
+          <p:cNvSpPr/>
+          <p:nvPr/>
+        </p:nvSpPr>
+        <p:spPr>
+          <a:xfrm>
+            <a:off x="761999" y="3846249"/>
+            <a:ext cx="8129503" cy="2335419"/>
+          </a:xfrm>
+          <a:prstGeom prst="rect">
+            <a:avLst/>
+          </a:prstGeom>
+          <a:solidFill>
+            <a:schemeClr val="bg1">
+              <a:lumMod val="85000"/>
+            </a:schemeClr>
+          </a:solidFill>
+          <a:ln w="9525">
+            <a:solidFill>
+              <a:schemeClr val="bg1"/>
+            </a:solidFill>
+          </a:ln>
+        </p:spPr>
+        <p:style>
+          <a:lnRef idx="2">
+            <a:schemeClr val="accent1">
+              <a:shade val="50000"/>
+            </a:schemeClr>
+          </a:lnRef>
+          <a:fillRef idx="1">
+            <a:schemeClr val="accent1"/>
+          </a:fillRef>
+          <a:effectRef idx="0">
+            <a:schemeClr val="accent1"/>
+          </a:effectRef>
+          <a:fontRef idx="minor">
+            <a:schemeClr val="lt1"/>
+          </a:fontRef>
+        </p:style>
+        <p:txBody>
+          <a:bodyPr rtlCol="0" anchor="ctr"/>
+          <a:lstStyle/>
+          <a:p>
+            <a:pPr algn="ctr"/>
+            <a:endParaRPr lang="en-US"/>
+          </a:p>
+        </p:txBody>
+      </p:sp>
+      <p:sp>
+        <p:nvSpPr>
+          <p:cNvPr id="4" name="Rectangle 3"/>
+          <p:cNvSpPr/>
+          <p:nvPr/>
+        </p:nvSpPr>
+        <p:spPr>
+          <a:xfrm>
+            <a:off x="762000" y="1388634"/>
+            <a:ext cx="8129503" cy="2294606"/>
+          </a:xfrm>
+          <a:prstGeom prst="rect">
+            <a:avLst/>
+          </a:prstGeom>
+          <a:solidFill>
+            <a:schemeClr val="bg1">
+              <a:lumMod val="85000"/>
+            </a:schemeClr>
+          </a:solidFill>
+          <a:ln>
+            <a:solidFill>
+              <a:schemeClr val="bg1"/>
+            </a:solidFill>
+          </a:ln>
+        </p:spPr>
+        <p:style>
+          <a:lnRef idx="2">
+            <a:schemeClr val="accent1">
+              <a:shade val="50000"/>
+            </a:schemeClr>
+          </a:lnRef>
+          <a:fillRef idx="1">
+            <a:schemeClr val="accent1"/>
+          </a:fillRef>
+          <a:effectRef idx="0">
+            <a:schemeClr val="accent1"/>
+          </a:effectRef>
+          <a:fontRef idx="minor">
+            <a:schemeClr val="lt1"/>
+          </a:fontRef>
+        </p:style>
+        <p:txBody>
+          <a:bodyPr rtlCol="0" anchor="ctr"/>
+          <a:lstStyle/>
+          <a:p>
+            <a:pPr algn="ctr"/>
+            <a:endParaRPr lang="en-US"/>
+          </a:p>
+        </p:txBody>
+      </p:sp>
+      <p:sp>
+        <p:nvSpPr>
+          <p:cNvPr id="5" name="TextBox 4"/>
+          <p:cNvSpPr txBox="1"/>
+          <p:nvPr/>
+        </p:nvSpPr>
+        <p:spPr>
+          <a:xfrm>
+            <a:off x="2133600" y="533400"/>
+            <a:ext cx="1828800" cy="461665"/>
+          </a:xfrm>
+          <a:prstGeom prst="rect">
+            <a:avLst/>
+          </a:prstGeom>
+        </p:spPr>
+        <p:style>
+          <a:lnRef idx="3">
+            <a:schemeClr val="lt1"/>
+          </a:lnRef>
+          <a:fillRef idx="1">
+            <a:schemeClr val="accent1"/>
+          </a:fillRef>
+          <a:effectRef idx="1">
+            <a:schemeClr val="accent1"/>
+          </a:effectRef>
+          <a:fontRef idx="minor">
+            <a:schemeClr val="lt1"/>
+          </a:fontRef>
+        </p:style>
+        <p:txBody>
+          <a:bodyPr wrap="square" rtlCol="0">
+            <a:spAutoFit/>
+          </a:bodyPr>
+          <a:lstStyle/>
+          <a:p>
+            <a:pPr algn="ctr"/>
+            <a:r>
+              <a:rPr lang="en-US" sz="1400" dirty="0" smtClean="0">
+                <a:latin typeface="Segoe UI Light" panose="020B0502040204020203" pitchFamily="34" charset="0"/>
+                <a:cs typeface="Segoe UI Light" panose="020B0502040204020203" pitchFamily="34" charset="0"/>
+              </a:rPr>
+              <a:t>Logic App</a:t>
+            </a:r>
+            <a:endParaRPr lang="en-US" sz="1400" dirty="0" smtClean="0">
+              <a:latin typeface="Segoe UI Light" panose="020B0502040204020203" pitchFamily="34" charset="0"/>
+              <a:cs typeface="Segoe UI Light" panose="020B0502040204020203" pitchFamily="34" charset="0"/>
+            </a:endParaRPr>
+          </a:p>
+          <a:p>
+            <a:pPr algn="ctr"/>
+            <a:r>
+              <a:rPr lang="en-US" sz="1000" dirty="0" smtClean="0">
+                <a:latin typeface="Segoe UI Light" panose="020B0502040204020203" pitchFamily="34" charset="0"/>
+                <a:cs typeface="Segoe UI Light" panose="020B0502040204020203" pitchFamily="34" charset="0"/>
+              </a:rPr>
+              <a:t>Trigger Recipient</a:t>
+            </a:r>
+            <a:endParaRPr lang="en-US" sz="1000" dirty="0">
+              <a:latin typeface="Segoe UI Light" panose="020B0502040204020203" pitchFamily="34" charset="0"/>
+              <a:cs typeface="Segoe UI Light" panose="020B0502040204020203" pitchFamily="34" charset="0"/>
+            </a:endParaRPr>
+          </a:p>
+        </p:txBody>
+      </p:sp>
+      <p:sp>
+        <p:nvSpPr>
+          <p:cNvPr id="6" name="TextBox 5"/>
+          <p:cNvSpPr txBox="1"/>
+          <p:nvPr/>
+        </p:nvSpPr>
+        <p:spPr>
+          <a:xfrm>
+            <a:off x="4727375" y="533400"/>
+            <a:ext cx="1725728" cy="523220"/>
+          </a:xfrm>
+          <a:prstGeom prst="rect">
+            <a:avLst/>
+          </a:prstGeom>
+          <a:solidFill>
+            <a:schemeClr val="accent2"/>
+          </a:solidFill>
+        </p:spPr>
+        <p:style>
+          <a:lnRef idx="3">
+            <a:schemeClr val="lt1"/>
+          </a:lnRef>
+          <a:fillRef idx="1">
+            <a:schemeClr val="accent1"/>
+          </a:fillRef>
+          <a:effectRef idx="1">
+            <a:schemeClr val="accent1"/>
+          </a:effectRef>
+          <a:fontRef idx="minor">
+            <a:schemeClr val="lt1"/>
+          </a:fontRef>
+        </p:style>
+        <p:txBody>
+          <a:bodyPr wrap="square" rtlCol="0">
+            <a:spAutoFit/>
+          </a:bodyPr>
+          <a:lstStyle/>
+          <a:p>
+            <a:pPr algn="ctr"/>
+            <a:r>
+              <a:rPr lang="en-US" sz="1400" dirty="0" smtClean="0">
+                <a:latin typeface="Segoe UI Light" panose="020B0502040204020203" pitchFamily="34" charset="0"/>
+                <a:cs typeface="Segoe UI Light" panose="020B0502040204020203" pitchFamily="34" charset="0"/>
+              </a:rPr>
+              <a:t>API App</a:t>
+            </a:r>
+            <a:endParaRPr lang="en-US" sz="1400" dirty="0" smtClean="0">
+              <a:latin typeface="Segoe UI Light" panose="020B0502040204020203" pitchFamily="34" charset="0"/>
+              <a:cs typeface="Segoe UI Light" panose="020B0502040204020203" pitchFamily="34" charset="0"/>
+            </a:endParaRPr>
+          </a:p>
+          <a:p>
+            <a:pPr algn="ctr"/>
+            <a:r>
+              <a:rPr lang="en-US" sz="1400" dirty="0" smtClean="0">
+                <a:latin typeface="Segoe UI Light" panose="020B0502040204020203" pitchFamily="34" charset="0"/>
+                <a:cs typeface="Segoe UI Light" panose="020B0502040204020203" pitchFamily="34" charset="0"/>
+              </a:rPr>
+              <a:t> </a:t>
+            </a:r>
+            <a:r>
+              <a:rPr lang="en-US" sz="1000" dirty="0" smtClean="0">
+                <a:latin typeface="Segoe UI Light" panose="020B0502040204020203" pitchFamily="34" charset="0"/>
+                <a:cs typeface="Segoe UI Light" panose="020B0502040204020203" pitchFamily="34" charset="0"/>
+              </a:rPr>
+              <a:t>Trigger Manager</a:t>
+            </a:r>
+            <a:endParaRPr lang="en-US" sz="1000" dirty="0">
+              <a:latin typeface="Segoe UI Light" panose="020B0502040204020203" pitchFamily="34" charset="0"/>
+              <a:cs typeface="Segoe UI Light" panose="020B0502040204020203" pitchFamily="34" charset="0"/>
+            </a:endParaRPr>
+          </a:p>
+        </p:txBody>
+      </p:sp>
+      <p:sp>
+        <p:nvSpPr>
+          <p:cNvPr id="7" name="TextBox 6"/>
+          <p:cNvSpPr txBox="1"/>
+          <p:nvPr/>
+        </p:nvSpPr>
+        <p:spPr>
+          <a:xfrm>
+            <a:off x="7239000" y="632696"/>
+            <a:ext cx="1676400" cy="461665"/>
+          </a:xfrm>
+          <a:prstGeom prst="rect">
+            <a:avLst/>
+          </a:prstGeom>
+          <a:solidFill>
+            <a:schemeClr val="accent6"/>
+          </a:solidFill>
+        </p:spPr>
+        <p:style>
+          <a:lnRef idx="3">
+            <a:schemeClr val="lt1"/>
+          </a:lnRef>
+          <a:fillRef idx="1">
+            <a:schemeClr val="accent1"/>
+          </a:fillRef>
+          <a:effectRef idx="1">
+            <a:schemeClr val="accent1"/>
+          </a:effectRef>
+          <a:fontRef idx="minor">
+            <a:schemeClr val="lt1"/>
+          </a:fontRef>
+        </p:style>
+        <p:txBody>
+          <a:bodyPr wrap="square" rtlCol="0">
+            <a:spAutoFit/>
+          </a:bodyPr>
+          <a:lstStyle/>
+          <a:p>
+            <a:pPr algn="ctr"/>
+            <a:r>
+              <a:rPr lang="en-US" sz="1400" dirty="0" smtClean="0">
+                <a:latin typeface="Segoe UI Light" panose="020B0502040204020203" pitchFamily="34" charset="0"/>
+                <a:cs typeface="Segoe UI Light" panose="020B0502040204020203" pitchFamily="34" charset="0"/>
+              </a:rPr>
+              <a:t>Web API</a:t>
+            </a:r>
+            <a:endParaRPr lang="en-US" sz="1400" dirty="0" smtClean="0">
+              <a:latin typeface="Segoe UI Light" panose="020B0502040204020203" pitchFamily="34" charset="0"/>
+              <a:cs typeface="Segoe UI Light" panose="020B0502040204020203" pitchFamily="34" charset="0"/>
+            </a:endParaRPr>
+          </a:p>
+          <a:p>
+            <a:pPr algn="ctr"/>
+            <a:r>
+              <a:rPr lang="en-US" sz="1000" dirty="0" smtClean="0">
+                <a:latin typeface="Segoe UI Light" panose="020B0502040204020203" pitchFamily="34" charset="0"/>
+                <a:cs typeface="Segoe UI Light" panose="020B0502040204020203" pitchFamily="34" charset="0"/>
+              </a:rPr>
+              <a:t>Trigger Source</a:t>
+            </a:r>
+            <a:endParaRPr lang="en-US" sz="1000" dirty="0">
+              <a:latin typeface="Segoe UI Light" panose="020B0502040204020203" pitchFamily="34" charset="0"/>
+              <a:cs typeface="Segoe UI Light" panose="020B0502040204020203" pitchFamily="34" charset="0"/>
+            </a:endParaRPr>
+          </a:p>
+        </p:txBody>
+      </p:sp>
+      <p:cxnSp>
+        <p:nvCxnSpPr>
+          <p:cNvPr id="8" name="Straight Connector 7"/>
+          <p:cNvCxnSpPr>
+            <a:stCxn id="5" idx="2"/>
+          </p:cNvCxnSpPr>
+          <p:nvPr/>
+        </p:nvCxnSpPr>
+        <p:spPr>
+          <a:xfrm>
+            <a:off x="3048000" y="995065"/>
+            <a:ext cx="31931" cy="5103912"/>
+          </a:xfrm>
+          <a:prstGeom prst="line">
+            <a:avLst/>
+          </a:prstGeom>
+          <a:ln w="9525" cmpd="sng"/>
+        </p:spPr>
+        <p:style>
+          <a:lnRef idx="3">
+            <a:schemeClr val="accent1"/>
+          </a:lnRef>
+          <a:fillRef idx="0">
+            <a:schemeClr val="accent1"/>
+          </a:fillRef>
+          <a:effectRef idx="2">
+            <a:schemeClr val="accent1"/>
+          </a:effectRef>
+          <a:fontRef idx="minor">
+            <a:schemeClr val="tx1"/>
+          </a:fontRef>
+        </p:style>
+      </p:cxnSp>
+      <p:cxnSp>
+        <p:nvCxnSpPr>
+          <p:cNvPr id="9" name="Straight Connector 8"/>
+          <p:cNvCxnSpPr>
+            <a:stCxn id="6" idx="2"/>
+          </p:cNvCxnSpPr>
+          <p:nvPr/>
+        </p:nvCxnSpPr>
+        <p:spPr>
+          <a:xfrm>
+            <a:off x="5590239" y="1056620"/>
+            <a:ext cx="25370" cy="2624171"/>
+          </a:xfrm>
+          <a:prstGeom prst="line">
+            <a:avLst/>
+          </a:prstGeom>
+          <a:ln w="9525"/>
+        </p:spPr>
+        <p:style>
+          <a:lnRef idx="3">
+            <a:schemeClr val="accent1"/>
+          </a:lnRef>
+          <a:fillRef idx="0">
+            <a:schemeClr val="accent1"/>
+          </a:fillRef>
+          <a:effectRef idx="2">
+            <a:schemeClr val="accent1"/>
+          </a:effectRef>
+          <a:fontRef idx="minor">
+            <a:schemeClr val="tx1"/>
+          </a:fontRef>
+        </p:style>
+      </p:cxnSp>
+      <p:cxnSp>
+        <p:nvCxnSpPr>
+          <p:cNvPr id="10" name="Straight Connector 9"/>
+          <p:cNvCxnSpPr/>
+          <p:nvPr/>
+        </p:nvCxnSpPr>
+        <p:spPr>
+          <a:xfrm flipH="1">
+            <a:off x="8067757" y="1111482"/>
+            <a:ext cx="6336" cy="4987495"/>
+          </a:xfrm>
+          <a:prstGeom prst="line">
+            <a:avLst/>
+          </a:prstGeom>
+          <a:ln w="9525"/>
+        </p:spPr>
+        <p:style>
+          <a:lnRef idx="3">
+            <a:schemeClr val="accent1"/>
+          </a:lnRef>
+          <a:fillRef idx="0">
+            <a:schemeClr val="accent1"/>
+          </a:fillRef>
+          <a:effectRef idx="2">
+            <a:schemeClr val="accent1"/>
+          </a:effectRef>
+          <a:fontRef idx="minor">
+            <a:schemeClr val="tx1"/>
+          </a:fontRef>
+        </p:style>
+      </p:cxnSp>
+      <p:cxnSp>
+        <p:nvCxnSpPr>
+          <p:cNvPr id="11" name="Straight Arrow Connector 10"/>
+          <p:cNvCxnSpPr/>
+          <p:nvPr/>
+        </p:nvCxnSpPr>
+        <p:spPr>
+          <a:xfrm>
+            <a:off x="3140980" y="1880331"/>
+            <a:ext cx="2353931" cy="14060"/>
+          </a:xfrm>
+          <a:prstGeom prst="straightConnector1">
+            <a:avLst/>
+          </a:prstGeom>
+          <a:ln w="9525">
+            <a:tailEnd type="triangle" w="lg" len="lg"/>
+          </a:ln>
+        </p:spPr>
+        <p:style>
+          <a:lnRef idx="3">
+            <a:schemeClr val="accent1"/>
+          </a:lnRef>
+          <a:fillRef idx="0">
+            <a:schemeClr val="accent1"/>
+          </a:fillRef>
+          <a:effectRef idx="2">
+            <a:schemeClr val="accent1"/>
+          </a:effectRef>
+          <a:fontRef idx="minor">
+            <a:schemeClr val="tx1"/>
+          </a:fontRef>
+        </p:style>
+      </p:cxnSp>
+      <p:sp>
+        <p:nvSpPr>
+          <p:cNvPr id="12" name="TextBox 11"/>
+          <p:cNvSpPr txBox="1"/>
+          <p:nvPr/>
+        </p:nvSpPr>
+        <p:spPr>
+          <a:xfrm>
+            <a:off x="3657600" y="1597223"/>
+            <a:ext cx="1568058" cy="307777"/>
+          </a:xfrm>
+          <a:prstGeom prst="rect">
+            <a:avLst/>
+          </a:prstGeom>
+          <a:noFill/>
+          <a:ln>
+            <a:noFill/>
+          </a:ln>
+        </p:spPr>
+        <p:style>
+          <a:lnRef idx="2">
+            <a:schemeClr val="accent1"/>
+          </a:lnRef>
+          <a:fillRef idx="1">
+            <a:schemeClr val="lt1"/>
+          </a:fillRef>
+          <a:effectRef idx="0">
+            <a:schemeClr val="accent1"/>
+          </a:effectRef>
+          <a:fontRef idx="minor">
+            <a:schemeClr val="dk1"/>
+          </a:fontRef>
+        </p:style>
+        <p:txBody>
+          <a:bodyPr wrap="none" rtlCol="0">
+            <a:spAutoFit/>
+          </a:bodyPr>
+          <a:lstStyle/>
+          <a:p>
+            <a:r>
+              <a:rPr lang="en-US" sz="1400" dirty="0" smtClean="0">
+                <a:latin typeface="Segoe UI Light" panose="020B0502040204020203" pitchFamily="34" charset="0"/>
+                <a:cs typeface="Segoe UI Light" panose="020B0502040204020203" pitchFamily="34" charset="0"/>
+              </a:rPr>
+              <a:t>PUT Configuration</a:t>
+            </a:r>
+            <a:endParaRPr lang="en-US" sz="1400" dirty="0">
+              <a:latin typeface="Segoe UI Light" panose="020B0502040204020203" pitchFamily="34" charset="0"/>
+              <a:cs typeface="Segoe UI Light" panose="020B0502040204020203" pitchFamily="34" charset="0"/>
+            </a:endParaRPr>
+          </a:p>
+        </p:txBody>
+      </p:sp>
+      <p:sp>
+        <p:nvSpPr>
+          <p:cNvPr id="14" name="Oval 13"/>
+          <p:cNvSpPr/>
+          <p:nvPr/>
+        </p:nvSpPr>
+        <p:spPr>
+          <a:xfrm>
+            <a:off x="2951031" y="1388634"/>
+            <a:ext cx="173169" cy="173571"/>
+          </a:xfrm>
+          <a:prstGeom prst="ellipse">
+            <a:avLst/>
+          </a:prstGeom>
+        </p:spPr>
+        <p:style>
+          <a:lnRef idx="2">
+            <a:schemeClr val="accent1">
+              <a:shade val="50000"/>
+            </a:schemeClr>
+          </a:lnRef>
+          <a:fillRef idx="1">
+            <a:schemeClr val="accent1"/>
+          </a:fillRef>
+          <a:effectRef idx="0">
+            <a:schemeClr val="accent1"/>
+          </a:effectRef>
+          <a:fontRef idx="minor">
+            <a:schemeClr val="lt1"/>
+          </a:fontRef>
+        </p:style>
+        <p:txBody>
+          <a:bodyPr rtlCol="0" anchor="ctr"/>
+          <a:lstStyle/>
+          <a:p>
+            <a:pPr algn="ctr"/>
+            <a:endParaRPr lang="en-US" sz="1400">
+              <a:latin typeface="Segoe UI Semilight" panose="020B0402040204020203" pitchFamily="34" charset="0"/>
+              <a:cs typeface="Segoe UI Semilight" panose="020B0402040204020203" pitchFamily="34" charset="0"/>
+            </a:endParaRPr>
+          </a:p>
+        </p:txBody>
+      </p:sp>
+      <p:sp>
+        <p:nvSpPr>
+          <p:cNvPr id="15" name="Rounded Rectangle 14"/>
+          <p:cNvSpPr/>
+          <p:nvPr/>
+        </p:nvSpPr>
+        <p:spPr>
+          <a:xfrm>
+            <a:off x="5481165" y="1777743"/>
+            <a:ext cx="259833" cy="797781"/>
+          </a:xfrm>
+          <a:prstGeom prst="roundRect">
+            <a:avLst/>
+          </a:prstGeom>
+          <a:solidFill>
+            <a:schemeClr val="accent2"/>
+          </a:solidFill>
+          <a:ln>
+            <a:solidFill>
+              <a:schemeClr val="bg1">
+                <a:lumMod val="75000"/>
+              </a:schemeClr>
+            </a:solidFill>
+          </a:ln>
+        </p:spPr>
+        <p:style>
+          <a:lnRef idx="2">
+            <a:schemeClr val="accent1">
+              <a:shade val="50000"/>
+            </a:schemeClr>
+          </a:lnRef>
+          <a:fillRef idx="1">
+            <a:schemeClr val="accent1"/>
+          </a:fillRef>
+          <a:effectRef idx="0">
+            <a:schemeClr val="accent1"/>
+          </a:effectRef>
+          <a:fontRef idx="minor">
+            <a:schemeClr val="lt1"/>
+          </a:fontRef>
+        </p:style>
+        <p:txBody>
+          <a:bodyPr rtlCol="0" anchor="ctr"/>
+          <a:lstStyle/>
+          <a:p>
+            <a:pPr algn="ctr"/>
+            <a:endParaRPr lang="en-US" sz="1400">
+              <a:latin typeface="Segoe UI Semilight" panose="020B0402040204020203" pitchFamily="34" charset="0"/>
+              <a:cs typeface="Segoe UI Semilight" panose="020B0402040204020203" pitchFamily="34" charset="0"/>
+            </a:endParaRPr>
+          </a:p>
+        </p:txBody>
+      </p:sp>
+      <p:cxnSp>
+        <p:nvCxnSpPr>
+          <p:cNvPr id="16" name="Straight Arrow Connector 15"/>
+          <p:cNvCxnSpPr/>
+          <p:nvPr/>
+        </p:nvCxnSpPr>
+        <p:spPr>
+          <a:xfrm>
+            <a:off x="5754744" y="2047433"/>
+            <a:ext cx="2156308" cy="6356"/>
+          </a:xfrm>
+          <a:prstGeom prst="straightConnector1">
+            <a:avLst/>
+          </a:prstGeom>
+          <a:ln w="9525">
+            <a:tailEnd type="triangle" w="lg" len="lg"/>
+          </a:ln>
+        </p:spPr>
+        <p:style>
+          <a:lnRef idx="3">
+            <a:schemeClr val="accent1"/>
+          </a:lnRef>
+          <a:fillRef idx="0">
+            <a:schemeClr val="accent1"/>
+          </a:fillRef>
+          <a:effectRef idx="2">
+            <a:schemeClr val="accent1"/>
+          </a:effectRef>
+          <a:fontRef idx="minor">
+            <a:schemeClr val="tx1"/>
+          </a:fontRef>
+        </p:style>
+      </p:cxnSp>
+      <p:cxnSp>
+        <p:nvCxnSpPr>
+          <p:cNvPr id="17" name="Straight Arrow Connector 16"/>
+          <p:cNvCxnSpPr/>
+          <p:nvPr/>
+        </p:nvCxnSpPr>
+        <p:spPr>
+          <a:xfrm flipH="1" flipV="1">
+            <a:off x="5754746" y="2361565"/>
+            <a:ext cx="2199647" cy="635"/>
+          </a:xfrm>
+          <a:prstGeom prst="straightConnector1">
+            <a:avLst/>
+          </a:prstGeom>
+          <a:ln w="9525">
+            <a:tailEnd type="triangle" w="lg" len="lg"/>
+          </a:ln>
+        </p:spPr>
+        <p:style>
+          <a:lnRef idx="3">
+            <a:schemeClr val="accent1"/>
+          </a:lnRef>
+          <a:fillRef idx="0">
+            <a:schemeClr val="accent1"/>
+          </a:fillRef>
+          <a:effectRef idx="2">
+            <a:schemeClr val="accent1"/>
+          </a:effectRef>
+          <a:fontRef idx="minor">
+            <a:schemeClr val="tx1"/>
+          </a:fontRef>
+        </p:style>
+      </p:cxnSp>
+      <p:cxnSp>
+        <p:nvCxnSpPr>
+          <p:cNvPr id="18" name="Straight Arrow Connector 17"/>
+          <p:cNvCxnSpPr/>
+          <p:nvPr/>
+        </p:nvCxnSpPr>
+        <p:spPr>
+          <a:xfrm flipH="1">
+            <a:off x="3118211" y="2455777"/>
+            <a:ext cx="2396788" cy="0"/>
+          </a:xfrm>
+          <a:prstGeom prst="straightConnector1">
+            <a:avLst/>
+          </a:prstGeom>
+          <a:ln w="9525">
+            <a:tailEnd type="triangle" w="lg" len="lg"/>
+          </a:ln>
+        </p:spPr>
+        <p:style>
+          <a:lnRef idx="3">
+            <a:schemeClr val="accent1"/>
+          </a:lnRef>
+          <a:fillRef idx="0">
+            <a:schemeClr val="accent1"/>
+          </a:fillRef>
+          <a:effectRef idx="2">
+            <a:schemeClr val="accent1"/>
+          </a:effectRef>
+          <a:fontRef idx="minor">
+            <a:schemeClr val="tx1"/>
+          </a:fontRef>
+        </p:style>
+      </p:cxnSp>
+      <p:sp>
+        <p:nvSpPr>
+          <p:cNvPr id="19" name="TextBox 18"/>
+          <p:cNvSpPr txBox="1"/>
+          <p:nvPr/>
+        </p:nvSpPr>
+        <p:spPr>
+          <a:xfrm>
+            <a:off x="4011228" y="2130623"/>
+            <a:ext cx="602857" cy="307777"/>
+          </a:xfrm>
+          <a:prstGeom prst="rect">
+            <a:avLst/>
+          </a:prstGeom>
+          <a:noFill/>
+          <a:ln>
+            <a:noFill/>
+          </a:ln>
+        </p:spPr>
+        <p:style>
+          <a:lnRef idx="2">
+            <a:schemeClr val="accent1"/>
+          </a:lnRef>
+          <a:fillRef idx="1">
+            <a:schemeClr val="lt1"/>
+          </a:fillRef>
+          <a:effectRef idx="0">
+            <a:schemeClr val="accent1"/>
+          </a:effectRef>
+          <a:fontRef idx="minor">
+            <a:schemeClr val="dk1"/>
+          </a:fontRef>
+        </p:style>
+        <p:txBody>
+          <a:bodyPr wrap="none" rtlCol="0">
+            <a:spAutoFit/>
+          </a:bodyPr>
+          <a:lstStyle/>
+          <a:p>
+            <a:r>
+              <a:rPr lang="en-US" sz="1400" dirty="0" smtClean="0">
+                <a:latin typeface="Segoe UI Light" panose="020B0502040204020203" pitchFamily="34" charset="0"/>
+                <a:cs typeface="Segoe UI Light" panose="020B0502040204020203" pitchFamily="34" charset="0"/>
+              </a:rPr>
+              <a:t>Reply</a:t>
+            </a:r>
+            <a:endParaRPr lang="en-US" sz="1400" dirty="0">
+              <a:latin typeface="Segoe UI Light" panose="020B0502040204020203" pitchFamily="34" charset="0"/>
+              <a:cs typeface="Segoe UI Light" panose="020B0502040204020203" pitchFamily="34" charset="0"/>
+            </a:endParaRPr>
+          </a:p>
+        </p:txBody>
+      </p:sp>
+      <p:sp>
+        <p:nvSpPr>
+          <p:cNvPr id="20" name="Rounded Rectangle 19"/>
+          <p:cNvSpPr/>
+          <p:nvPr/>
+        </p:nvSpPr>
+        <p:spPr>
+          <a:xfrm>
+            <a:off x="7924800" y="1933129"/>
+            <a:ext cx="274913" cy="657671"/>
+          </a:xfrm>
+          <a:prstGeom prst="roundRect">
+            <a:avLst/>
+          </a:prstGeom>
+          <a:solidFill>
+            <a:schemeClr val="accent6"/>
+          </a:solidFill>
+          <a:ln>
+            <a:solidFill>
+              <a:schemeClr val="bg1">
+                <a:lumMod val="85000"/>
+              </a:schemeClr>
+            </a:solidFill>
+          </a:ln>
+        </p:spPr>
+        <p:style>
+          <a:lnRef idx="2">
+            <a:schemeClr val="accent1">
+              <a:shade val="50000"/>
+            </a:schemeClr>
+          </a:lnRef>
+          <a:fillRef idx="1">
+            <a:schemeClr val="accent1"/>
+          </a:fillRef>
+          <a:effectRef idx="0">
+            <a:schemeClr val="accent1"/>
+          </a:effectRef>
+          <a:fontRef idx="minor">
+            <a:schemeClr val="lt1"/>
+          </a:fontRef>
+        </p:style>
+        <p:txBody>
+          <a:bodyPr rtlCol="0" anchor="ctr"/>
+          <a:lstStyle/>
+          <a:p>
+            <a:pPr algn="ctr"/>
+            <a:endParaRPr lang="en-US" sz="1400">
+              <a:latin typeface="Segoe UI Semilight" panose="020B0402040204020203" pitchFamily="34" charset="0"/>
+              <a:cs typeface="Segoe UI Semilight" panose="020B0402040204020203" pitchFamily="34" charset="0"/>
+            </a:endParaRPr>
+          </a:p>
+        </p:txBody>
+      </p:sp>
+      <p:sp>
+        <p:nvSpPr>
+          <p:cNvPr id="25" name="Rounded Rectangle 24"/>
+          <p:cNvSpPr/>
+          <p:nvPr/>
+        </p:nvSpPr>
+        <p:spPr>
+          <a:xfrm>
+            <a:off x="7924799" y="4262357"/>
+            <a:ext cx="282238" cy="657479"/>
+          </a:xfrm>
+          <a:prstGeom prst="roundRect">
+            <a:avLst/>
+          </a:prstGeom>
+          <a:solidFill>
+            <a:schemeClr val="accent6"/>
+          </a:solidFill>
+          <a:ln>
+            <a:solidFill>
+              <a:schemeClr val="bg1">
+                <a:lumMod val="85000"/>
+              </a:schemeClr>
+            </a:solidFill>
+          </a:ln>
+        </p:spPr>
+        <p:style>
+          <a:lnRef idx="2">
+            <a:schemeClr val="accent1">
+              <a:shade val="50000"/>
+            </a:schemeClr>
+          </a:lnRef>
+          <a:fillRef idx="1">
+            <a:schemeClr val="accent1"/>
+          </a:fillRef>
+          <a:effectRef idx="0">
+            <a:schemeClr val="accent1"/>
+          </a:effectRef>
+          <a:fontRef idx="minor">
+            <a:schemeClr val="lt1"/>
+          </a:fontRef>
+        </p:style>
+        <p:txBody>
+          <a:bodyPr rtlCol="0" anchor="ctr"/>
+          <a:lstStyle/>
+          <a:p>
+            <a:pPr algn="ctr"/>
+            <a:endParaRPr lang="en-US" sz="1400">
+              <a:latin typeface="Segoe UI Semilight" panose="020B0402040204020203" pitchFamily="34" charset="0"/>
+              <a:cs typeface="Segoe UI Semilight" panose="020B0402040204020203" pitchFamily="34" charset="0"/>
+            </a:endParaRPr>
+          </a:p>
+        </p:txBody>
+      </p:sp>
+      <p:sp>
+        <p:nvSpPr>
+          <p:cNvPr id="32" name="TextBox 31"/>
+          <p:cNvSpPr txBox="1"/>
+          <p:nvPr/>
+        </p:nvSpPr>
+        <p:spPr>
+          <a:xfrm>
+            <a:off x="5715000" y="1673423"/>
+            <a:ext cx="3073277" cy="307777"/>
+          </a:xfrm>
+          <a:prstGeom prst="rect">
+            <a:avLst/>
+          </a:prstGeom>
+          <a:noFill/>
+          <a:ln>
+            <a:noFill/>
+          </a:ln>
+        </p:spPr>
+        <p:style>
+          <a:lnRef idx="2">
+            <a:schemeClr val="accent1"/>
+          </a:lnRef>
+          <a:fillRef idx="1">
+            <a:schemeClr val="lt1"/>
+          </a:fillRef>
+          <a:effectRef idx="0">
+            <a:schemeClr val="accent1"/>
+          </a:effectRef>
+          <a:fontRef idx="minor">
+            <a:schemeClr val="dk1"/>
+          </a:fontRef>
+        </p:style>
+        <p:txBody>
+          <a:bodyPr wrap="none" rtlCol="0">
+            <a:spAutoFit/>
+          </a:bodyPr>
+          <a:lstStyle/>
+          <a:p>
+            <a:r>
+              <a:rPr lang="en-US" sz="1400" dirty="0" smtClean="0">
+                <a:latin typeface="Segoe UI Light" panose="020B0502040204020203" pitchFamily="34" charset="0"/>
+                <a:cs typeface="Segoe UI Light" panose="020B0502040204020203" pitchFamily="34" charset="0"/>
+              </a:rPr>
+              <a:t>POST Configuration and Callback Info </a:t>
+            </a:r>
+            <a:endParaRPr lang="en-US" sz="1400" dirty="0">
+              <a:latin typeface="Segoe UI Light" panose="020B0502040204020203" pitchFamily="34" charset="0"/>
+              <a:cs typeface="Segoe UI Light" panose="020B0502040204020203" pitchFamily="34" charset="0"/>
+            </a:endParaRPr>
+          </a:p>
+        </p:txBody>
+      </p:sp>
+      <p:sp>
+        <p:nvSpPr>
+          <p:cNvPr id="37" name="TextBox 36"/>
+          <p:cNvSpPr txBox="1"/>
+          <p:nvPr/>
+        </p:nvSpPr>
+        <p:spPr>
+          <a:xfrm>
+            <a:off x="194398" y="1337255"/>
+            <a:ext cx="400110" cy="2345985"/>
+          </a:xfrm>
+          <a:prstGeom prst="rect">
+            <a:avLst/>
+          </a:prstGeom>
+          <a:solidFill>
+            <a:schemeClr val="accent3">
+              <a:lumMod val="75000"/>
+            </a:schemeClr>
+          </a:solidFill>
+        </p:spPr>
+        <p:style>
+          <a:lnRef idx="3">
+            <a:schemeClr val="lt1"/>
+          </a:lnRef>
+          <a:fillRef idx="1">
+            <a:schemeClr val="accent1"/>
+          </a:fillRef>
+          <a:effectRef idx="1">
+            <a:schemeClr val="accent1"/>
+          </a:effectRef>
+          <a:fontRef idx="minor">
+            <a:schemeClr val="lt1"/>
+          </a:fontRef>
+        </p:style>
+        <p:txBody>
+          <a:bodyPr vert="vert270" wrap="square" rtlCol="0">
+            <a:spAutoFit/>
+          </a:bodyPr>
+          <a:lstStyle/>
+          <a:p>
+            <a:pPr algn="ctr"/>
+            <a:r>
+              <a:rPr lang="en-US" sz="1400" dirty="0" smtClean="0">
+                <a:latin typeface="Segoe UI Light" panose="020B0502040204020203" pitchFamily="34" charset="0"/>
+                <a:cs typeface="Segoe UI Light" panose="020B0502040204020203" pitchFamily="34" charset="0"/>
+              </a:rPr>
+              <a:t>Registration </a:t>
+            </a:r>
+            <a:r>
+              <a:rPr lang="en-US" sz="1400" dirty="0" smtClean="0">
+                <a:latin typeface="Segoe UI Light" panose="020B0502040204020203" pitchFamily="34" charset="0"/>
+                <a:cs typeface="Segoe UI Light" panose="020B0502040204020203" pitchFamily="34" charset="0"/>
+              </a:rPr>
+              <a:t>Phase</a:t>
+            </a:r>
+            <a:endParaRPr lang="en-US" sz="1400" dirty="0">
+              <a:latin typeface="Segoe UI Light" panose="020B0502040204020203" pitchFamily="34" charset="0"/>
+              <a:cs typeface="Segoe UI Light" panose="020B0502040204020203" pitchFamily="34" charset="0"/>
+            </a:endParaRPr>
+          </a:p>
+        </p:txBody>
+      </p:sp>
+      <p:sp>
+        <p:nvSpPr>
+          <p:cNvPr id="39" name="TextBox 38"/>
+          <p:cNvSpPr txBox="1"/>
+          <p:nvPr/>
+        </p:nvSpPr>
+        <p:spPr>
+          <a:xfrm>
+            <a:off x="208527" y="3846998"/>
+            <a:ext cx="400110" cy="2345985"/>
+          </a:xfrm>
+          <a:prstGeom prst="rect">
+            <a:avLst/>
+          </a:prstGeom>
+          <a:solidFill>
+            <a:schemeClr val="accent3">
+              <a:lumMod val="75000"/>
+            </a:schemeClr>
+          </a:solidFill>
+        </p:spPr>
+        <p:style>
+          <a:lnRef idx="3">
+            <a:schemeClr val="lt1"/>
+          </a:lnRef>
+          <a:fillRef idx="1">
+            <a:schemeClr val="accent1"/>
+          </a:fillRef>
+          <a:effectRef idx="1">
+            <a:schemeClr val="accent1"/>
+          </a:effectRef>
+          <a:fontRef idx="minor">
+            <a:schemeClr val="lt1"/>
+          </a:fontRef>
+        </p:style>
+        <p:txBody>
+          <a:bodyPr vert="vert270" wrap="square" rtlCol="0">
+            <a:spAutoFit/>
+          </a:bodyPr>
+          <a:lstStyle/>
+          <a:p>
+            <a:pPr algn="ctr"/>
+            <a:r>
+              <a:rPr lang="en-US" sz="1400" dirty="0" smtClean="0">
+                <a:latin typeface="Segoe UI Light" panose="020B0502040204020203" pitchFamily="34" charset="0"/>
+                <a:cs typeface="Segoe UI Light" panose="020B0502040204020203" pitchFamily="34" charset="0"/>
+              </a:rPr>
+              <a:t>Callback </a:t>
+            </a:r>
+            <a:r>
+              <a:rPr lang="en-US" sz="1400" dirty="0" smtClean="0">
+                <a:latin typeface="Segoe UI Light" panose="020B0502040204020203" pitchFamily="34" charset="0"/>
+                <a:cs typeface="Segoe UI Light" panose="020B0502040204020203" pitchFamily="34" charset="0"/>
+              </a:rPr>
+              <a:t>Phase</a:t>
+            </a:r>
+            <a:endParaRPr lang="en-US" sz="1400" dirty="0">
+              <a:latin typeface="Segoe UI Light" panose="020B0502040204020203" pitchFamily="34" charset="0"/>
+              <a:cs typeface="Segoe UI Light" panose="020B0502040204020203" pitchFamily="34" charset="0"/>
+            </a:endParaRPr>
+          </a:p>
+        </p:txBody>
+      </p:sp>
+      <p:sp>
+        <p:nvSpPr>
+          <p:cNvPr id="42" name="TextBox 41"/>
+          <p:cNvSpPr txBox="1"/>
+          <p:nvPr/>
+        </p:nvSpPr>
+        <p:spPr>
+          <a:xfrm>
+            <a:off x="990600" y="1464690"/>
+            <a:ext cx="1368423" cy="307777"/>
+          </a:xfrm>
+          <a:prstGeom prst="rect">
+            <a:avLst/>
+          </a:prstGeom>
+          <a:solidFill>
+            <a:schemeClr val="bg1">
+              <a:lumMod val="85000"/>
+            </a:schemeClr>
+          </a:solidFill>
+          <a:ln>
+            <a:noFill/>
+          </a:ln>
+        </p:spPr>
+        <p:style>
+          <a:lnRef idx="2">
+            <a:schemeClr val="accent1"/>
+          </a:lnRef>
+          <a:fillRef idx="1">
+            <a:schemeClr val="lt1"/>
+          </a:fillRef>
+          <a:effectRef idx="0">
+            <a:schemeClr val="accent1"/>
+          </a:effectRef>
+          <a:fontRef idx="minor">
+            <a:schemeClr val="dk1"/>
+          </a:fontRef>
+        </p:style>
+        <p:txBody>
+          <a:bodyPr wrap="square" rtlCol="0">
+            <a:spAutoFit/>
+          </a:bodyPr>
+          <a:lstStyle/>
+          <a:p>
+            <a:pPr algn="r"/>
+            <a:r>
+              <a:rPr lang="en-US" sz="1400" dirty="0" smtClean="0">
+                <a:latin typeface="Segoe UI Semilight" panose="020B0402040204020203" pitchFamily="34" charset="0"/>
+                <a:cs typeface="Segoe UI Semilight" panose="020B0402040204020203" pitchFamily="34" charset="0"/>
+              </a:rPr>
+              <a:t>Editor Save</a:t>
+            </a:r>
+            <a:endParaRPr lang="en-US" sz="1400" dirty="0">
+              <a:latin typeface="Segoe UI Semilight" panose="020B0402040204020203" pitchFamily="34" charset="0"/>
+              <a:cs typeface="Segoe UI Semilight" panose="020B0402040204020203" pitchFamily="34" charset="0"/>
+            </a:endParaRPr>
+          </a:p>
+        </p:txBody>
+      </p:sp>
+      <p:cxnSp>
+        <p:nvCxnSpPr>
+          <p:cNvPr id="43" name="Elbow Connector 42"/>
+          <p:cNvCxnSpPr>
+            <a:stCxn id="42" idx="3"/>
+            <a:endCxn id="14" idx="2"/>
+          </p:cNvCxnSpPr>
+          <p:nvPr/>
+        </p:nvCxnSpPr>
+        <p:spPr>
+          <a:xfrm flipV="1">
+            <a:off x="2359023" y="1475420"/>
+            <a:ext cx="592008" cy="143159"/>
+          </a:xfrm>
+          <a:prstGeom prst="bentConnector3">
+            <a:avLst/>
+          </a:prstGeom>
+          <a:ln>
+            <a:tailEnd type="triangle"/>
+          </a:ln>
+        </p:spPr>
+        <p:style>
+          <a:lnRef idx="1">
+            <a:schemeClr val="accent1"/>
+          </a:lnRef>
+          <a:fillRef idx="0">
+            <a:schemeClr val="accent1"/>
+          </a:fillRef>
+          <a:effectRef idx="0">
+            <a:schemeClr val="accent1"/>
+          </a:effectRef>
+          <a:fontRef idx="minor">
+            <a:schemeClr val="tx1"/>
+          </a:fontRef>
+        </p:style>
+      </p:cxnSp>
+      <p:sp>
+        <p:nvSpPr>
+          <p:cNvPr id="46" name="Rounded Rectangle 45"/>
+          <p:cNvSpPr/>
+          <p:nvPr/>
+        </p:nvSpPr>
+        <p:spPr>
+          <a:xfrm>
+            <a:off x="2895600" y="4262356"/>
+            <a:ext cx="325569" cy="657479"/>
+          </a:xfrm>
+          <a:prstGeom prst="roundRect">
+            <a:avLst/>
+          </a:prstGeom>
+          <a:solidFill>
+            <a:schemeClr val="accent1"/>
+          </a:solidFill>
+          <a:ln>
+            <a:solidFill>
+              <a:schemeClr val="bg1">
+                <a:lumMod val="85000"/>
+              </a:schemeClr>
+            </a:solidFill>
+          </a:ln>
+        </p:spPr>
+        <p:style>
+          <a:lnRef idx="2">
+            <a:schemeClr val="accent1">
+              <a:shade val="50000"/>
+            </a:schemeClr>
+          </a:lnRef>
+          <a:fillRef idx="1">
+            <a:schemeClr val="accent1"/>
+          </a:fillRef>
+          <a:effectRef idx="0">
+            <a:schemeClr val="accent1"/>
+          </a:effectRef>
+          <a:fontRef idx="minor">
+            <a:schemeClr val="lt1"/>
+          </a:fontRef>
+        </p:style>
+        <p:txBody>
+          <a:bodyPr rtlCol="0" anchor="ctr"/>
+          <a:lstStyle/>
+          <a:p>
+            <a:pPr algn="ctr"/>
+            <a:endParaRPr lang="en-US" sz="1400">
+              <a:latin typeface="Segoe UI Semilight" panose="020B0402040204020203" pitchFamily="34" charset="0"/>
+              <a:cs typeface="Segoe UI Semilight" panose="020B0402040204020203" pitchFamily="34" charset="0"/>
+            </a:endParaRPr>
+          </a:p>
+        </p:txBody>
+      </p:sp>
+      <p:cxnSp>
+        <p:nvCxnSpPr>
+          <p:cNvPr id="47" name="Straight Arrow Connector 46"/>
+          <p:cNvCxnSpPr/>
+          <p:nvPr/>
+        </p:nvCxnSpPr>
+        <p:spPr>
+          <a:xfrm flipH="1">
+            <a:off x="3221169" y="4572000"/>
+            <a:ext cx="4733224" cy="0"/>
+          </a:xfrm>
+          <a:prstGeom prst="straightConnector1">
+            <a:avLst/>
+          </a:prstGeom>
+          <a:ln w="9525">
+            <a:tailEnd type="triangle" w="lg" len="lg"/>
+          </a:ln>
+        </p:spPr>
+        <p:style>
+          <a:lnRef idx="3">
+            <a:schemeClr val="accent1"/>
+          </a:lnRef>
+          <a:fillRef idx="0">
+            <a:schemeClr val="accent1"/>
+          </a:fillRef>
+          <a:effectRef idx="2">
+            <a:schemeClr val="accent1"/>
+          </a:effectRef>
+          <a:fontRef idx="minor">
+            <a:schemeClr val="tx1"/>
+          </a:fontRef>
+        </p:style>
+      </p:cxnSp>
+      <p:sp>
+        <p:nvSpPr>
+          <p:cNvPr id="49" name="Oval 48"/>
+          <p:cNvSpPr/>
+          <p:nvPr/>
+        </p:nvSpPr>
+        <p:spPr>
+          <a:xfrm>
+            <a:off x="7996941" y="3865029"/>
+            <a:ext cx="173169" cy="173571"/>
+          </a:xfrm>
+          <a:prstGeom prst="ellipse">
+            <a:avLst/>
+          </a:prstGeom>
+        </p:spPr>
+        <p:style>
+          <a:lnRef idx="2">
+            <a:schemeClr val="accent1">
+              <a:shade val="50000"/>
+            </a:schemeClr>
+          </a:lnRef>
+          <a:fillRef idx="1">
+            <a:schemeClr val="accent1"/>
+          </a:fillRef>
+          <a:effectRef idx="0">
+            <a:schemeClr val="accent1"/>
+          </a:effectRef>
+          <a:fontRef idx="minor">
+            <a:schemeClr val="lt1"/>
+          </a:fontRef>
+        </p:style>
+        <p:txBody>
+          <a:bodyPr rtlCol="0" anchor="ctr"/>
+          <a:lstStyle/>
+          <a:p>
+            <a:pPr algn="ctr"/>
+            <a:endParaRPr lang="en-US" sz="1400">
+              <a:latin typeface="Segoe UI Semilight" panose="020B0402040204020203" pitchFamily="34" charset="0"/>
+              <a:cs typeface="Segoe UI Semilight" panose="020B0402040204020203" pitchFamily="34" charset="0"/>
+            </a:endParaRPr>
+          </a:p>
+        </p:txBody>
+      </p:sp>
+      <p:sp>
+        <p:nvSpPr>
+          <p:cNvPr id="50" name="TextBox 49"/>
+          <p:cNvSpPr txBox="1"/>
+          <p:nvPr/>
+        </p:nvSpPr>
+        <p:spPr>
+          <a:xfrm>
+            <a:off x="6031808" y="3962400"/>
+            <a:ext cx="1368423" cy="307777"/>
+          </a:xfrm>
+          <a:prstGeom prst="rect">
+            <a:avLst/>
+          </a:prstGeom>
+          <a:solidFill>
+            <a:schemeClr val="bg1">
+              <a:lumMod val="85000"/>
+            </a:schemeClr>
+          </a:solidFill>
+          <a:ln>
+            <a:noFill/>
+          </a:ln>
+        </p:spPr>
+        <p:style>
+          <a:lnRef idx="2">
+            <a:schemeClr val="accent1"/>
+          </a:lnRef>
+          <a:fillRef idx="1">
+            <a:schemeClr val="lt1"/>
+          </a:fillRef>
+          <a:effectRef idx="0">
+            <a:schemeClr val="accent1"/>
+          </a:effectRef>
+          <a:fontRef idx="minor">
+            <a:schemeClr val="dk1"/>
+          </a:fontRef>
+        </p:style>
+        <p:txBody>
+          <a:bodyPr wrap="square" rtlCol="0">
+            <a:spAutoFit/>
+          </a:bodyPr>
+          <a:lstStyle/>
+          <a:p>
+            <a:pPr algn="r"/>
+            <a:r>
+              <a:rPr lang="en-US" sz="1400" dirty="0" smtClean="0">
+                <a:latin typeface="Segoe UI Semilight" panose="020B0402040204020203" pitchFamily="34" charset="0"/>
+                <a:cs typeface="Segoe UI Semilight" panose="020B0402040204020203" pitchFamily="34" charset="0"/>
+              </a:rPr>
+              <a:t>Trigger Event</a:t>
+            </a:r>
+            <a:endParaRPr lang="en-US" sz="1400" dirty="0">
+              <a:latin typeface="Segoe UI Semilight" panose="020B0402040204020203" pitchFamily="34" charset="0"/>
+              <a:cs typeface="Segoe UI Semilight" panose="020B0402040204020203" pitchFamily="34" charset="0"/>
+            </a:endParaRPr>
+          </a:p>
+        </p:txBody>
+      </p:sp>
+      <p:cxnSp>
+        <p:nvCxnSpPr>
+          <p:cNvPr id="51" name="Elbow Connector 50"/>
+          <p:cNvCxnSpPr>
+            <a:stCxn id="50" idx="3"/>
+          </p:cNvCxnSpPr>
+          <p:nvPr/>
+        </p:nvCxnSpPr>
+        <p:spPr>
+          <a:xfrm flipV="1">
+            <a:off x="7400231" y="3973130"/>
+            <a:ext cx="592008" cy="143159"/>
+          </a:xfrm>
+          <a:prstGeom prst="bentConnector3">
+            <a:avLst/>
+          </a:prstGeom>
+          <a:ln>
+            <a:tailEnd type="triangle"/>
+          </a:ln>
+        </p:spPr>
+        <p:style>
+          <a:lnRef idx="1">
+            <a:schemeClr val="accent1"/>
+          </a:lnRef>
+          <a:fillRef idx="0">
+            <a:schemeClr val="accent1"/>
+          </a:fillRef>
+          <a:effectRef idx="0">
+            <a:schemeClr val="accent1"/>
+          </a:effectRef>
+          <a:fontRef idx="minor">
+            <a:schemeClr val="tx1"/>
+          </a:fontRef>
+        </p:style>
+      </p:cxnSp>
+      <p:sp>
+        <p:nvSpPr>
+          <p:cNvPr id="52" name="TextBox 51"/>
+          <p:cNvSpPr txBox="1"/>
+          <p:nvPr/>
+        </p:nvSpPr>
+        <p:spPr>
+          <a:xfrm>
+            <a:off x="4178361" y="4252653"/>
+            <a:ext cx="3325334" cy="307777"/>
+          </a:xfrm>
+          <a:prstGeom prst="rect">
+            <a:avLst/>
+          </a:prstGeom>
+          <a:noFill/>
+          <a:ln>
+            <a:noFill/>
+          </a:ln>
+        </p:spPr>
+        <p:style>
+          <a:lnRef idx="2">
+            <a:schemeClr val="accent1"/>
+          </a:lnRef>
+          <a:fillRef idx="1">
+            <a:schemeClr val="lt1"/>
+          </a:fillRef>
+          <a:effectRef idx="0">
+            <a:schemeClr val="accent1"/>
+          </a:effectRef>
+          <a:fontRef idx="minor">
+            <a:schemeClr val="dk1"/>
+          </a:fontRef>
+        </p:style>
+        <p:txBody>
+          <a:bodyPr wrap="none" rtlCol="0">
+            <a:spAutoFit/>
+          </a:bodyPr>
+          <a:lstStyle/>
+          <a:p>
+            <a:r>
+              <a:rPr lang="en-US" sz="1400" dirty="0" smtClean="0">
+                <a:latin typeface="Segoe UI Light" panose="020B0502040204020203" pitchFamily="34" charset="0"/>
+                <a:cs typeface="Segoe UI Light" panose="020B0502040204020203" pitchFamily="34" charset="0"/>
+              </a:rPr>
+              <a:t>POST Trigger Body using the callback URL</a:t>
+            </a:r>
+            <a:endParaRPr lang="en-US" sz="1400" dirty="0">
+              <a:latin typeface="Segoe UI Light" panose="020B0502040204020203" pitchFamily="34" charset="0"/>
+              <a:cs typeface="Segoe UI Light" panose="020B0502040204020203" pitchFamily="34" charset="0"/>
+            </a:endParaRPr>
+          </a:p>
+        </p:txBody>
+      </p:sp>
+    </p:spTree>
+    <p:extLst>
+      <p:ext uri="{BB962C8B-B14F-4D97-AF65-F5344CB8AC3E}">
+        <p14:creationId xmlns:p14="http://schemas.microsoft.com/office/powerpoint/2010/main" val="2473542658"/>
+      </p:ext>
+    </p:extLst>
+  </p:cSld>
+  <p:clrMapOvr>
+    <a:masterClrMapping/>
+  </p:clrMapOvr>
+  <p:timing>
+    <p:tnLst>
+      <p:par>
+        <p:cTn id="1" dur="indefinite" restart="never" nodeType="tmRoot">
+          <p:childTnLst>
+            <p:seq concurrent="1" nextAc="seek">
+              <p:cTn id="2" dur="indefinite" nodeType="mainSeq">
+                <p:childTnLst>
+                  <p:par>
+                    <p:cTn id="3" fill="hold">
+                      <p:stCondLst>
+                        <p:cond delay="indefinite"/>
+                      </p:stCondLst>
+                      <p:childTnLst>
+                        <p:par>
+                          <p:cTn id="4" fill="hold">
+                            <p:stCondLst>
+                              <p:cond delay="0"/>
+                            </p:stCondLst>
+                            <p:childTnLst>
+                              <p:par>
+                                <p:cTn id="5" presetID="10" presetClass="entr" presetSubtype="0" fill="hold" grpId="0" nodeType="clickEffect">
+                                  <p:stCondLst>
+                                    <p:cond delay="0"/>
+                                  </p:stCondLst>
+                                  <p:childTnLst>
+                                    <p:set>
+                                      <p:cBhvr>
+                                        <p:cTn id="6" dur="1" fill="hold">
+                                          <p:stCondLst>
+                                            <p:cond delay="0"/>
+                                          </p:stCondLst>
+                                        </p:cTn>
+                                        <p:tgtEl>
+                                          <p:spTgt spid="5"/>
+                                        </p:tgtEl>
+                                        <p:attrNameLst>
+                                          <p:attrName>style.visibility</p:attrName>
+                                        </p:attrNameLst>
+                                      </p:cBhvr>
+                                      <p:to>
+                                        <p:strVal val="visible"/>
+                                      </p:to>
+                                    </p:set>
+                                    <p:animEffect transition="in" filter="fade">
+                                      <p:cBhvr>
+                                        <p:cTn id="7" dur="500"/>
+                                        <p:tgtEl>
+                                          <p:spTgt spid="5"/>
+                                        </p:tgtEl>
+                                      </p:cBhvr>
+                                    </p:animEffect>
+                                  </p:childTnLst>
+                                </p:cTn>
+                              </p:par>
+                              <p:par>
+                                <p:cTn id="8" presetID="10" presetClass="entr" presetSubtype="0" fill="hold" grpId="0" nodeType="withEffect">
+                                  <p:stCondLst>
+                                    <p:cond delay="0"/>
+                                  </p:stCondLst>
+                                  <p:childTnLst>
+                                    <p:set>
+                                      <p:cBhvr>
+                                        <p:cTn id="9" dur="1" fill="hold">
+                                          <p:stCondLst>
+                                            <p:cond delay="0"/>
+                                          </p:stCondLst>
+                                        </p:cTn>
+                                        <p:tgtEl>
+                                          <p:spTgt spid="14"/>
+                                        </p:tgtEl>
+                                        <p:attrNameLst>
+                                          <p:attrName>style.visibility</p:attrName>
+                                        </p:attrNameLst>
+                                      </p:cBhvr>
+                                      <p:to>
+                                        <p:strVal val="visible"/>
+                                      </p:to>
+                                    </p:set>
+                                    <p:animEffect transition="in" filter="fade">
+                                      <p:cBhvr>
+                                        <p:cTn id="10" dur="500"/>
+                                        <p:tgtEl>
+                                          <p:spTgt spid="14"/>
+                                        </p:tgtEl>
+                                      </p:cBhvr>
+                                    </p:animEffect>
+                                  </p:childTnLst>
+                                </p:cTn>
+                              </p:par>
+                              <p:par>
+                                <p:cTn id="11" presetID="10" presetClass="entr" presetSubtype="0" fill="hold" nodeType="withEffect">
+                                  <p:stCondLst>
+                                    <p:cond delay="0"/>
+                                  </p:stCondLst>
+                                  <p:childTnLst>
+                                    <p:set>
+                                      <p:cBhvr>
+                                        <p:cTn id="12" dur="1" fill="hold">
+                                          <p:stCondLst>
+                                            <p:cond delay="0"/>
+                                          </p:stCondLst>
+                                        </p:cTn>
+                                        <p:tgtEl>
+                                          <p:spTgt spid="8"/>
+                                        </p:tgtEl>
+                                        <p:attrNameLst>
+                                          <p:attrName>style.visibility</p:attrName>
+                                        </p:attrNameLst>
+                                      </p:cBhvr>
+                                      <p:to>
+                                        <p:strVal val="visible"/>
+                                      </p:to>
+                                    </p:set>
+                                    <p:animEffect transition="in" filter="fade">
+                                      <p:cBhvr>
+                                        <p:cTn id="13" dur="500"/>
+                                        <p:tgtEl>
+                                          <p:spTgt spid="8"/>
+                                        </p:tgtEl>
+                                      </p:cBhvr>
+                                    </p:animEffect>
+                                  </p:childTnLst>
+                                </p:cTn>
+                              </p:par>
+                            </p:childTnLst>
+                          </p:cTn>
+                        </p:par>
+                      </p:childTnLst>
+                    </p:cTn>
+                  </p:par>
+                  <p:par>
+                    <p:cTn id="14" fill="hold">
+                      <p:stCondLst>
+                        <p:cond delay="indefinite"/>
+                      </p:stCondLst>
+                      <p:childTnLst>
+                        <p:par>
+                          <p:cTn id="15" fill="hold">
+                            <p:stCondLst>
+                              <p:cond delay="0"/>
+                            </p:stCondLst>
+                            <p:childTnLst>
+                              <p:par>
+                                <p:cTn id="16" presetID="10" presetClass="entr" presetSubtype="0" fill="hold" nodeType="clickEffect">
+                                  <p:stCondLst>
+                                    <p:cond delay="0"/>
+                                  </p:stCondLst>
+                                  <p:childTnLst>
+                                    <p:set>
+                                      <p:cBhvr>
+                                        <p:cTn id="17" dur="1" fill="hold">
+                                          <p:stCondLst>
+                                            <p:cond delay="0"/>
+                                          </p:stCondLst>
+                                        </p:cTn>
+                                        <p:tgtEl>
+                                          <p:spTgt spid="11"/>
+                                        </p:tgtEl>
+                                        <p:attrNameLst>
+                                          <p:attrName>style.visibility</p:attrName>
+                                        </p:attrNameLst>
+                                      </p:cBhvr>
+                                      <p:to>
+                                        <p:strVal val="visible"/>
+                                      </p:to>
+                                    </p:set>
+                                    <p:animEffect transition="in" filter="fade">
+                                      <p:cBhvr>
+                                        <p:cTn id="18" dur="500"/>
+                                        <p:tgtEl>
+                                          <p:spTgt spid="11"/>
+                                        </p:tgtEl>
+                                      </p:cBhvr>
+                                    </p:animEffect>
+                                  </p:childTnLst>
+                                </p:cTn>
+                              </p:par>
+                              <p:par>
+                                <p:cTn id="19" presetID="10" presetClass="entr" presetSubtype="0" fill="hold" grpId="0" nodeType="withEffect">
+                                  <p:stCondLst>
+                                    <p:cond delay="0"/>
+                                  </p:stCondLst>
+                                  <p:childTnLst>
+                                    <p:set>
+                                      <p:cBhvr>
+                                        <p:cTn id="20" dur="1" fill="hold">
+                                          <p:stCondLst>
+                                            <p:cond delay="0"/>
+                                          </p:stCondLst>
+                                        </p:cTn>
+                                        <p:tgtEl>
+                                          <p:spTgt spid="12"/>
+                                        </p:tgtEl>
+                                        <p:attrNameLst>
+                                          <p:attrName>style.visibility</p:attrName>
+                                        </p:attrNameLst>
+                                      </p:cBhvr>
+                                      <p:to>
+                                        <p:strVal val="visible"/>
+                                      </p:to>
+                                    </p:set>
+                                    <p:animEffect transition="in" filter="fade">
+                                      <p:cBhvr>
+                                        <p:cTn id="21" dur="500"/>
+                                        <p:tgtEl>
+                                          <p:spTgt spid="12"/>
+                                        </p:tgtEl>
+                                      </p:cBhvr>
+                                    </p:animEffect>
+                                  </p:childTnLst>
+                                </p:cTn>
+                              </p:par>
+                              <p:par>
+                                <p:cTn id="22" presetID="10" presetClass="entr" presetSubtype="0" fill="hold" grpId="0" nodeType="withEffect">
+                                  <p:stCondLst>
+                                    <p:cond delay="0"/>
+                                  </p:stCondLst>
+                                  <p:childTnLst>
+                                    <p:set>
+                                      <p:cBhvr>
+                                        <p:cTn id="23" dur="1" fill="hold">
+                                          <p:stCondLst>
+                                            <p:cond delay="0"/>
+                                          </p:stCondLst>
+                                        </p:cTn>
+                                        <p:tgtEl>
+                                          <p:spTgt spid="6"/>
+                                        </p:tgtEl>
+                                        <p:attrNameLst>
+                                          <p:attrName>style.visibility</p:attrName>
+                                        </p:attrNameLst>
+                                      </p:cBhvr>
+                                      <p:to>
+                                        <p:strVal val="visible"/>
+                                      </p:to>
+                                    </p:set>
+                                    <p:animEffect transition="in" filter="fade">
+                                      <p:cBhvr>
+                                        <p:cTn id="24" dur="500"/>
+                                        <p:tgtEl>
+                                          <p:spTgt spid="6"/>
+                                        </p:tgtEl>
+                                      </p:cBhvr>
+                                    </p:animEffect>
+                                  </p:childTnLst>
+                                </p:cTn>
+                              </p:par>
+                              <p:par>
+                                <p:cTn id="25" presetID="10" presetClass="entr" presetSubtype="0" fill="hold" nodeType="withEffect">
+                                  <p:stCondLst>
+                                    <p:cond delay="0"/>
+                                  </p:stCondLst>
+                                  <p:childTnLst>
+                                    <p:set>
+                                      <p:cBhvr>
+                                        <p:cTn id="26" dur="1" fill="hold">
+                                          <p:stCondLst>
+                                            <p:cond delay="0"/>
+                                          </p:stCondLst>
+                                        </p:cTn>
+                                        <p:tgtEl>
+                                          <p:spTgt spid="9"/>
+                                        </p:tgtEl>
+                                        <p:attrNameLst>
+                                          <p:attrName>style.visibility</p:attrName>
+                                        </p:attrNameLst>
+                                      </p:cBhvr>
+                                      <p:to>
+                                        <p:strVal val="visible"/>
+                                      </p:to>
+                                    </p:set>
+                                    <p:animEffect transition="in" filter="fade">
+                                      <p:cBhvr>
+                                        <p:cTn id="27" dur="500"/>
+                                        <p:tgtEl>
+                                          <p:spTgt spid="9"/>
+                                        </p:tgtEl>
+                                      </p:cBhvr>
+                                    </p:animEffect>
+                                  </p:childTnLst>
+                                </p:cTn>
+                              </p:par>
+                              <p:par>
+                                <p:cTn id="28" presetID="10" presetClass="entr" presetSubtype="0" fill="hold" grpId="0" nodeType="withEffect">
+                                  <p:stCondLst>
+                                    <p:cond delay="0"/>
+                                  </p:stCondLst>
+                                  <p:childTnLst>
+                                    <p:set>
+                                      <p:cBhvr>
+                                        <p:cTn id="29" dur="1" fill="hold">
+                                          <p:stCondLst>
+                                            <p:cond delay="0"/>
+                                          </p:stCondLst>
+                                        </p:cTn>
+                                        <p:tgtEl>
+                                          <p:spTgt spid="7"/>
+                                        </p:tgtEl>
+                                        <p:attrNameLst>
+                                          <p:attrName>style.visibility</p:attrName>
+                                        </p:attrNameLst>
+                                      </p:cBhvr>
+                                      <p:to>
+                                        <p:strVal val="visible"/>
+                                      </p:to>
+                                    </p:set>
+                                    <p:animEffect transition="in" filter="fade">
+                                      <p:cBhvr>
+                                        <p:cTn id="30" dur="500"/>
+                                        <p:tgtEl>
+                                          <p:spTgt spid="7"/>
+                                        </p:tgtEl>
+                                      </p:cBhvr>
+                                    </p:animEffect>
+                                  </p:childTnLst>
+                                </p:cTn>
+                              </p:par>
+                              <p:par>
+                                <p:cTn id="31" presetID="10" presetClass="entr" presetSubtype="0" fill="hold" nodeType="withEffect">
+                                  <p:stCondLst>
+                                    <p:cond delay="0"/>
+                                  </p:stCondLst>
+                                  <p:childTnLst>
+                                    <p:set>
+                                      <p:cBhvr>
+                                        <p:cTn id="32" dur="1" fill="hold">
+                                          <p:stCondLst>
+                                            <p:cond delay="0"/>
+                                          </p:stCondLst>
+                                        </p:cTn>
+                                        <p:tgtEl>
+                                          <p:spTgt spid="10"/>
+                                        </p:tgtEl>
+                                        <p:attrNameLst>
+                                          <p:attrName>style.visibility</p:attrName>
+                                        </p:attrNameLst>
+                                      </p:cBhvr>
+                                      <p:to>
+                                        <p:strVal val="visible"/>
+                                      </p:to>
+                                    </p:set>
+                                    <p:animEffect transition="in" filter="fade">
+                                      <p:cBhvr>
+                                        <p:cTn id="33" dur="500"/>
+                                        <p:tgtEl>
+                                          <p:spTgt spid="10"/>
+                                        </p:tgtEl>
+                                      </p:cBhvr>
+                                    </p:animEffect>
+                                  </p:childTnLst>
+                                </p:cTn>
+                              </p:par>
+                              <p:par>
+                                <p:cTn id="34" presetID="10" presetClass="entr" presetSubtype="0" fill="hold" grpId="0" nodeType="withEffect">
+                                  <p:stCondLst>
+                                    <p:cond delay="0"/>
+                                  </p:stCondLst>
+                                  <p:childTnLst>
+                                    <p:set>
+                                      <p:cBhvr>
+                                        <p:cTn id="35" dur="1" fill="hold">
+                                          <p:stCondLst>
+                                            <p:cond delay="0"/>
+                                          </p:stCondLst>
+                                        </p:cTn>
+                                        <p:tgtEl>
+                                          <p:spTgt spid="15"/>
+                                        </p:tgtEl>
+                                        <p:attrNameLst>
+                                          <p:attrName>style.visibility</p:attrName>
+                                        </p:attrNameLst>
+                                      </p:cBhvr>
+                                      <p:to>
+                                        <p:strVal val="visible"/>
+                                      </p:to>
+                                    </p:set>
+                                    <p:animEffect transition="in" filter="fade">
+                                      <p:cBhvr>
+                                        <p:cTn id="36" dur="500"/>
+                                        <p:tgtEl>
+                                          <p:spTgt spid="15"/>
+                                        </p:tgtEl>
+                                      </p:cBhvr>
+                                    </p:animEffect>
+                                  </p:childTnLst>
+                                </p:cTn>
+                              </p:par>
+                            </p:childTnLst>
+                          </p:cTn>
+                        </p:par>
+                      </p:childTnLst>
+                    </p:cTn>
+                  </p:par>
+                  <p:par>
+                    <p:cTn id="37" fill="hold">
+                      <p:stCondLst>
+                        <p:cond delay="indefinite"/>
+                      </p:stCondLst>
+                      <p:childTnLst>
+                        <p:par>
+                          <p:cTn id="38" fill="hold">
+                            <p:stCondLst>
+                              <p:cond delay="0"/>
+                            </p:stCondLst>
+                            <p:childTnLst>
+                              <p:par>
+                                <p:cTn id="39" presetID="10" presetClass="entr" presetSubtype="0" fill="hold" grpId="0" nodeType="clickEffect">
+                                  <p:stCondLst>
+                                    <p:cond delay="0"/>
+                                  </p:stCondLst>
+                                  <p:childTnLst>
+                                    <p:set>
+                                      <p:cBhvr>
+                                        <p:cTn id="40" dur="1" fill="hold">
+                                          <p:stCondLst>
+                                            <p:cond delay="0"/>
+                                          </p:stCondLst>
+                                        </p:cTn>
+                                        <p:tgtEl>
+                                          <p:spTgt spid="32"/>
+                                        </p:tgtEl>
+                                        <p:attrNameLst>
+                                          <p:attrName>style.visibility</p:attrName>
+                                        </p:attrNameLst>
+                                      </p:cBhvr>
+                                      <p:to>
+                                        <p:strVal val="visible"/>
+                                      </p:to>
+                                    </p:set>
+                                    <p:animEffect transition="in" filter="fade">
+                                      <p:cBhvr>
+                                        <p:cTn id="41" dur="500"/>
+                                        <p:tgtEl>
+                                          <p:spTgt spid="32"/>
+                                        </p:tgtEl>
+                                      </p:cBhvr>
+                                    </p:animEffect>
+                                  </p:childTnLst>
+                                </p:cTn>
+                              </p:par>
+                              <p:par>
+                                <p:cTn id="42" presetID="10" presetClass="entr" presetSubtype="0" fill="hold" nodeType="withEffect">
+                                  <p:stCondLst>
+                                    <p:cond delay="0"/>
+                                  </p:stCondLst>
+                                  <p:childTnLst>
+                                    <p:set>
+                                      <p:cBhvr>
+                                        <p:cTn id="43" dur="1" fill="hold">
+                                          <p:stCondLst>
+                                            <p:cond delay="0"/>
+                                          </p:stCondLst>
+                                        </p:cTn>
+                                        <p:tgtEl>
+                                          <p:spTgt spid="16"/>
+                                        </p:tgtEl>
+                                        <p:attrNameLst>
+                                          <p:attrName>style.visibility</p:attrName>
+                                        </p:attrNameLst>
+                                      </p:cBhvr>
+                                      <p:to>
+                                        <p:strVal val="visible"/>
+                                      </p:to>
+                                    </p:set>
+                                    <p:animEffect transition="in" filter="fade">
+                                      <p:cBhvr>
+                                        <p:cTn id="44" dur="500"/>
+                                        <p:tgtEl>
+                                          <p:spTgt spid="16"/>
+                                        </p:tgtEl>
+                                      </p:cBhvr>
+                                    </p:animEffect>
+                                  </p:childTnLst>
+                                </p:cTn>
+                              </p:par>
+                              <p:par>
+                                <p:cTn id="45" presetID="10" presetClass="entr" presetSubtype="0" fill="hold" nodeType="withEffect">
+                                  <p:stCondLst>
+                                    <p:cond delay="0"/>
+                                  </p:stCondLst>
+                                  <p:childTnLst>
+                                    <p:set>
+                                      <p:cBhvr>
+                                        <p:cTn id="46" dur="1" fill="hold">
+                                          <p:stCondLst>
+                                            <p:cond delay="0"/>
+                                          </p:stCondLst>
+                                        </p:cTn>
+                                        <p:tgtEl>
+                                          <p:spTgt spid="17"/>
+                                        </p:tgtEl>
+                                        <p:attrNameLst>
+                                          <p:attrName>style.visibility</p:attrName>
+                                        </p:attrNameLst>
+                                      </p:cBhvr>
+                                      <p:to>
+                                        <p:strVal val="visible"/>
+                                      </p:to>
+                                    </p:set>
+                                    <p:animEffect transition="in" filter="fade">
+                                      <p:cBhvr>
+                                        <p:cTn id="47" dur="500"/>
+                                        <p:tgtEl>
+                                          <p:spTgt spid="17"/>
+                                        </p:tgtEl>
+                                      </p:cBhvr>
+                                    </p:animEffect>
+                                  </p:childTnLst>
+                                </p:cTn>
+                              </p:par>
+                              <p:par>
+                                <p:cTn id="48" presetID="10" presetClass="entr" presetSubtype="0" fill="hold" grpId="0" nodeType="withEffect">
+                                  <p:stCondLst>
+                                    <p:cond delay="0"/>
+                                  </p:stCondLst>
+                                  <p:childTnLst>
+                                    <p:set>
+                                      <p:cBhvr>
+                                        <p:cTn id="49" dur="1" fill="hold">
+                                          <p:stCondLst>
+                                            <p:cond delay="0"/>
+                                          </p:stCondLst>
+                                        </p:cTn>
+                                        <p:tgtEl>
+                                          <p:spTgt spid="20"/>
+                                        </p:tgtEl>
+                                        <p:attrNameLst>
+                                          <p:attrName>style.visibility</p:attrName>
+                                        </p:attrNameLst>
+                                      </p:cBhvr>
+                                      <p:to>
+                                        <p:strVal val="visible"/>
+                                      </p:to>
+                                    </p:set>
+                                    <p:animEffect transition="in" filter="fade">
+                                      <p:cBhvr>
+                                        <p:cTn id="50" dur="500"/>
+                                        <p:tgtEl>
+                                          <p:spTgt spid="20"/>
+                                        </p:tgtEl>
+                                      </p:cBhvr>
+                                    </p:animEffect>
+                                  </p:childTnLst>
+                                </p:cTn>
+                              </p:par>
+                              <p:par>
+                                <p:cTn id="51" presetID="10" presetClass="entr" presetSubtype="0" fill="hold" nodeType="withEffect">
+                                  <p:stCondLst>
+                                    <p:cond delay="0"/>
+                                  </p:stCondLst>
+                                  <p:childTnLst>
+                                    <p:set>
+                                      <p:cBhvr>
+                                        <p:cTn id="52" dur="1" fill="hold">
+                                          <p:stCondLst>
+                                            <p:cond delay="0"/>
+                                          </p:stCondLst>
+                                        </p:cTn>
+                                        <p:tgtEl>
+                                          <p:spTgt spid="18"/>
+                                        </p:tgtEl>
+                                        <p:attrNameLst>
+                                          <p:attrName>style.visibility</p:attrName>
+                                        </p:attrNameLst>
+                                      </p:cBhvr>
+                                      <p:to>
+                                        <p:strVal val="visible"/>
+                                      </p:to>
+                                    </p:set>
+                                    <p:animEffect transition="in" filter="fade">
+                                      <p:cBhvr>
+                                        <p:cTn id="53" dur="500"/>
+                                        <p:tgtEl>
+                                          <p:spTgt spid="18"/>
+                                        </p:tgtEl>
+                                      </p:cBhvr>
+                                    </p:animEffect>
+                                  </p:childTnLst>
+                                </p:cTn>
+                              </p:par>
+                              <p:par>
+                                <p:cTn id="54" presetID="10" presetClass="entr" presetSubtype="0" fill="hold" grpId="0" nodeType="withEffect">
+                                  <p:stCondLst>
+                                    <p:cond delay="0"/>
+                                  </p:stCondLst>
+                                  <p:childTnLst>
+                                    <p:set>
+                                      <p:cBhvr>
+                                        <p:cTn id="55" dur="1" fill="hold">
+                                          <p:stCondLst>
+                                            <p:cond delay="0"/>
+                                          </p:stCondLst>
+                                        </p:cTn>
+                                        <p:tgtEl>
+                                          <p:spTgt spid="19"/>
+                                        </p:tgtEl>
+                                        <p:attrNameLst>
+                                          <p:attrName>style.visibility</p:attrName>
+                                        </p:attrNameLst>
+                                      </p:cBhvr>
+                                      <p:to>
+                                        <p:strVal val="visible"/>
+                                      </p:to>
+                                    </p:set>
+                                    <p:animEffect transition="in" filter="fade">
+                                      <p:cBhvr>
+                                        <p:cTn id="56" dur="500"/>
+                                        <p:tgtEl>
+                                          <p:spTgt spid="19"/>
+                                        </p:tgtEl>
+                                      </p:cBhvr>
+                                    </p:animEffect>
+                                  </p:childTnLst>
+                                </p:cTn>
+                              </p:par>
+                              <p:par>
+                                <p:cTn id="57" presetID="10" presetClass="entr" presetSubtype="0" fill="hold" grpId="0" nodeType="withEffect">
+                                  <p:stCondLst>
+                                    <p:cond delay="0"/>
+                                  </p:stCondLst>
+                                  <p:childTnLst>
+                                    <p:set>
+                                      <p:cBhvr>
+                                        <p:cTn id="58" dur="1" fill="hold">
+                                          <p:stCondLst>
+                                            <p:cond delay="0"/>
+                                          </p:stCondLst>
+                                        </p:cTn>
+                                        <p:tgtEl>
+                                          <p:spTgt spid="25"/>
+                                        </p:tgtEl>
+                                        <p:attrNameLst>
+                                          <p:attrName>style.visibility</p:attrName>
+                                        </p:attrNameLst>
+                                      </p:cBhvr>
+                                      <p:to>
+                                        <p:strVal val="visible"/>
+                                      </p:to>
+                                    </p:set>
+                                    <p:animEffect transition="in" filter="fade">
+                                      <p:cBhvr>
+                                        <p:cTn id="59" dur="500"/>
+                                        <p:tgtEl>
+                                          <p:spTgt spid="25"/>
+                                        </p:tgtEl>
+                                      </p:cBhvr>
+                                    </p:animEffect>
+                                  </p:childTnLst>
+                                </p:cTn>
+                              </p:par>
+                            </p:childTnLst>
+                          </p:cTn>
+                        </p:par>
+                      </p:childTnLst>
+                    </p:cTn>
+                  </p:par>
+                  <p:par>
+                    <p:cTn id="60" fill="hold">
+                      <p:stCondLst>
+                        <p:cond delay="indefinite"/>
+                      </p:stCondLst>
+                      <p:childTnLst>
+                        <p:par>
+                          <p:cTn id="61" fill="hold">
+                            <p:stCondLst>
+                              <p:cond delay="0"/>
+                            </p:stCondLst>
+                            <p:childTnLst>
+                              <p:par>
+                                <p:cTn id="62" presetID="10" presetClass="entr" presetSubtype="0" fill="hold" grpId="0" nodeType="clickEffect">
+                                  <p:stCondLst>
+                                    <p:cond delay="0"/>
+                                  </p:stCondLst>
+                                  <p:childTnLst>
+                                    <p:set>
+                                      <p:cBhvr>
+                                        <p:cTn id="63" dur="1" fill="hold">
+                                          <p:stCondLst>
+                                            <p:cond delay="0"/>
+                                          </p:stCondLst>
+                                        </p:cTn>
+                                        <p:tgtEl>
+                                          <p:spTgt spid="37"/>
+                                        </p:tgtEl>
+                                        <p:attrNameLst>
+                                          <p:attrName>style.visibility</p:attrName>
+                                        </p:attrNameLst>
+                                      </p:cBhvr>
+                                      <p:to>
+                                        <p:strVal val="visible"/>
+                                      </p:to>
+                                    </p:set>
+                                    <p:animEffect transition="in" filter="fade">
+                                      <p:cBhvr>
+                                        <p:cTn id="64" dur="500"/>
+                                        <p:tgtEl>
+                                          <p:spTgt spid="37"/>
+                                        </p:tgtEl>
+                                      </p:cBhvr>
+                                    </p:animEffect>
+                                  </p:childTnLst>
+                                </p:cTn>
+                              </p:par>
+                            </p:childTnLst>
+                          </p:cTn>
+                        </p:par>
+                      </p:childTnLst>
+                    </p:cTn>
+                  </p:par>
+                  <p:par>
+                    <p:cTn id="65" fill="hold">
+                      <p:stCondLst>
+                        <p:cond delay="indefinite"/>
+                      </p:stCondLst>
+                      <p:childTnLst>
+                        <p:par>
+                          <p:cTn id="66" fill="hold">
+                            <p:stCondLst>
+                              <p:cond delay="0"/>
+                            </p:stCondLst>
+                            <p:childTnLst>
+                              <p:par>
+                                <p:cTn id="67" presetID="10" presetClass="entr" presetSubtype="0" fill="hold" grpId="0" nodeType="clickEffect">
+                                  <p:stCondLst>
+                                    <p:cond delay="0"/>
+                                  </p:stCondLst>
+                                  <p:childTnLst>
+                                    <p:set>
+                                      <p:cBhvr>
+                                        <p:cTn id="68" dur="1" fill="hold">
+                                          <p:stCondLst>
+                                            <p:cond delay="0"/>
+                                          </p:stCondLst>
+                                        </p:cTn>
+                                        <p:tgtEl>
+                                          <p:spTgt spid="39"/>
+                                        </p:tgtEl>
+                                        <p:attrNameLst>
+                                          <p:attrName>style.visibility</p:attrName>
+                                        </p:attrNameLst>
+                                      </p:cBhvr>
+                                      <p:to>
+                                        <p:strVal val="visible"/>
+                                      </p:to>
+                                    </p:set>
+                                    <p:animEffect transition="in" filter="fade">
+                                      <p:cBhvr>
+                                        <p:cTn id="69" dur="500"/>
+                                        <p:tgtEl>
+                                          <p:spTgt spid="39"/>
+                                        </p:tgtEl>
+                                      </p:cBhvr>
+                                    </p:animEffect>
+                                  </p:childTnLst>
+                                </p:cTn>
+                              </p:par>
+                              <p:par>
+                                <p:cTn id="70" presetID="10" presetClass="entr" presetSubtype="0" fill="hold" grpId="0" nodeType="withEffect">
+                                  <p:stCondLst>
+                                    <p:cond delay="0"/>
+                                  </p:stCondLst>
+                                  <p:childTnLst>
+                                    <p:set>
+                                      <p:cBhvr>
+                                        <p:cTn id="71" dur="1" fill="hold">
+                                          <p:stCondLst>
+                                            <p:cond delay="0"/>
+                                          </p:stCondLst>
+                                        </p:cTn>
+                                        <p:tgtEl>
+                                          <p:spTgt spid="42"/>
+                                        </p:tgtEl>
+                                        <p:attrNameLst>
+                                          <p:attrName>style.visibility</p:attrName>
+                                        </p:attrNameLst>
+                                      </p:cBhvr>
+                                      <p:to>
+                                        <p:strVal val="visible"/>
+                                      </p:to>
+                                    </p:set>
+                                    <p:animEffect transition="in" filter="fade">
+                                      <p:cBhvr>
+                                        <p:cTn id="72" dur="500"/>
+                                        <p:tgtEl>
+                                          <p:spTgt spid="42"/>
+                                        </p:tgtEl>
+                                      </p:cBhvr>
+                                    </p:animEffect>
+                                  </p:childTnLst>
+                                </p:cTn>
+                              </p:par>
+                              <p:par>
+                                <p:cTn id="73" presetID="10" presetClass="entr" presetSubtype="0" fill="hold" grpId="0" nodeType="withEffect">
+                                  <p:stCondLst>
+                                    <p:cond delay="0"/>
+                                  </p:stCondLst>
+                                  <p:childTnLst>
+                                    <p:set>
+                                      <p:cBhvr>
+                                        <p:cTn id="74" dur="1" fill="hold">
+                                          <p:stCondLst>
+                                            <p:cond delay="0"/>
+                                          </p:stCondLst>
+                                        </p:cTn>
+                                        <p:tgtEl>
+                                          <p:spTgt spid="46"/>
+                                        </p:tgtEl>
+                                        <p:attrNameLst>
+                                          <p:attrName>style.visibility</p:attrName>
+                                        </p:attrNameLst>
+                                      </p:cBhvr>
+                                      <p:to>
+                                        <p:strVal val="visible"/>
+                                      </p:to>
+                                    </p:set>
+                                    <p:animEffect transition="in" filter="fade">
+                                      <p:cBhvr>
+                                        <p:cTn id="75" dur="500"/>
+                                        <p:tgtEl>
+                                          <p:spTgt spid="46"/>
+                                        </p:tgtEl>
+                                      </p:cBhvr>
+                                    </p:animEffect>
+                                  </p:childTnLst>
+                                </p:cTn>
+                              </p:par>
+                              <p:par>
+                                <p:cTn id="76" presetID="10" presetClass="entr" presetSubtype="0" fill="hold" nodeType="withEffect">
+                                  <p:stCondLst>
+                                    <p:cond delay="0"/>
+                                  </p:stCondLst>
+                                  <p:childTnLst>
+                                    <p:set>
+                                      <p:cBhvr>
+                                        <p:cTn id="77" dur="1" fill="hold">
+                                          <p:stCondLst>
+                                            <p:cond delay="0"/>
+                                          </p:stCondLst>
+                                        </p:cTn>
+                                        <p:tgtEl>
+                                          <p:spTgt spid="47"/>
+                                        </p:tgtEl>
+                                        <p:attrNameLst>
+                                          <p:attrName>style.visibility</p:attrName>
+                                        </p:attrNameLst>
+                                      </p:cBhvr>
+                                      <p:to>
+                                        <p:strVal val="visible"/>
+                                      </p:to>
+                                    </p:set>
+                                    <p:animEffect transition="in" filter="fade">
+                                      <p:cBhvr>
+                                        <p:cTn id="78" dur="500"/>
+                                        <p:tgtEl>
+                                          <p:spTgt spid="47"/>
+                                        </p:tgtEl>
+                                      </p:cBhvr>
+                                    </p:animEffect>
+                                  </p:childTnLst>
+                                </p:cTn>
+                              </p:par>
+                              <p:par>
+                                <p:cTn id="79" presetID="10" presetClass="entr" presetSubtype="0" fill="hold" grpId="0" nodeType="withEffect">
+                                  <p:stCondLst>
+                                    <p:cond delay="0"/>
+                                  </p:stCondLst>
+                                  <p:childTnLst>
+                                    <p:set>
+                                      <p:cBhvr>
+                                        <p:cTn id="80" dur="1" fill="hold">
+                                          <p:stCondLst>
+                                            <p:cond delay="0"/>
+                                          </p:stCondLst>
+                                        </p:cTn>
+                                        <p:tgtEl>
+                                          <p:spTgt spid="49"/>
+                                        </p:tgtEl>
+                                        <p:attrNameLst>
+                                          <p:attrName>style.visibility</p:attrName>
+                                        </p:attrNameLst>
+                                      </p:cBhvr>
+                                      <p:to>
+                                        <p:strVal val="visible"/>
+                                      </p:to>
+                                    </p:set>
+                                    <p:animEffect transition="in" filter="fade">
+                                      <p:cBhvr>
+                                        <p:cTn id="81" dur="500"/>
+                                        <p:tgtEl>
+                                          <p:spTgt spid="49"/>
+                                        </p:tgtEl>
+                                      </p:cBhvr>
+                                    </p:animEffect>
+                                  </p:childTnLst>
+                                </p:cTn>
+                              </p:par>
+                              <p:par>
+                                <p:cTn id="82" presetID="10" presetClass="entr" presetSubtype="0" fill="hold" grpId="0" nodeType="withEffect">
+                                  <p:stCondLst>
+                                    <p:cond delay="0"/>
+                                  </p:stCondLst>
+                                  <p:childTnLst>
+                                    <p:set>
+                                      <p:cBhvr>
+                                        <p:cTn id="83" dur="1" fill="hold">
+                                          <p:stCondLst>
+                                            <p:cond delay="0"/>
+                                          </p:stCondLst>
+                                        </p:cTn>
+                                        <p:tgtEl>
+                                          <p:spTgt spid="50"/>
+                                        </p:tgtEl>
+                                        <p:attrNameLst>
+                                          <p:attrName>style.visibility</p:attrName>
+                                        </p:attrNameLst>
+                                      </p:cBhvr>
+                                      <p:to>
+                                        <p:strVal val="visible"/>
+                                      </p:to>
+                                    </p:set>
+                                    <p:animEffect transition="in" filter="fade">
+                                      <p:cBhvr>
+                                        <p:cTn id="84" dur="500"/>
+                                        <p:tgtEl>
+                                          <p:spTgt spid="50"/>
+                                        </p:tgtEl>
+                                      </p:cBhvr>
+                                    </p:animEffect>
+                                  </p:childTnLst>
+                                </p:cTn>
+                              </p:par>
+                            </p:childTnLst>
+                          </p:cTn>
+                        </p:par>
+                      </p:childTnLst>
+                    </p:cTn>
+                  </p:par>
+                  <p:par>
+                    <p:cTn id="85" fill="hold">
+                      <p:stCondLst>
+                        <p:cond delay="indefinite"/>
+                      </p:stCondLst>
+                      <p:childTnLst>
+                        <p:par>
+                          <p:cTn id="86" fill="hold">
+                            <p:stCondLst>
+                              <p:cond delay="0"/>
+                            </p:stCondLst>
+                            <p:childTnLst>
+                              <p:par>
+                                <p:cTn id="87" presetID="10" presetClass="entr" presetSubtype="0" fill="hold" grpId="0" nodeType="clickEffect">
+                                  <p:stCondLst>
+                                    <p:cond delay="0"/>
+                                  </p:stCondLst>
+                                  <p:childTnLst>
+                                    <p:set>
+                                      <p:cBhvr>
+                                        <p:cTn id="88" dur="1" fill="hold">
+                                          <p:stCondLst>
+                                            <p:cond delay="0"/>
+                                          </p:stCondLst>
+                                        </p:cTn>
+                                        <p:tgtEl>
+                                          <p:spTgt spid="52"/>
+                                        </p:tgtEl>
+                                        <p:attrNameLst>
+                                          <p:attrName>style.visibility</p:attrName>
+                                        </p:attrNameLst>
+                                      </p:cBhvr>
+                                      <p:to>
+                                        <p:strVal val="visible"/>
+                                      </p:to>
+                                    </p:set>
+                                    <p:animEffect transition="in" filter="fade">
+                                      <p:cBhvr>
+                                        <p:cTn id="89" dur="500"/>
+                                        <p:tgtEl>
+                                          <p:spTgt spid="52"/>
+                                        </p:tgtEl>
+                                      </p:cBhvr>
+                                    </p:animEffect>
+                                  </p:childTnLst>
+                                </p:cTn>
+                              </p:par>
+                            </p:childTnLst>
+                          </p:cTn>
+                        </p:par>
+                      </p:childTnLst>
+                    </p:cTn>
+                  </p:par>
+                </p:childTnLst>
+              </p:cTn>
+              <p:prevCondLst>
+                <p:cond evt="onPrev" delay="0">
+                  <p:tgtEl>
+                    <p:sldTgt/>
+                  </p:tgtEl>
+                </p:cond>
+              </p:prevCondLst>
+              <p:nextCondLst>
+                <p:cond evt="onNext" delay="0">
+                  <p:tgtEl>
+                    <p:sldTgt/>
+                  </p:tgtEl>
+                </p:cond>
+              </p:nextCondLst>
+            </p:seq>
+          </p:childTnLst>
+        </p:cTn>
+      </p:par>
+    </p:tnLst>
+    <p:bldLst>
+      <p:bldP spid="5" grpId="0" animBg="1"/>
+      <p:bldP spid="6" grpId="0" animBg="1"/>
+      <p:bldP spid="7" grpId="0" animBg="1"/>
+      <p:bldP spid="12" grpId="0"/>
+      <p:bldP spid="14" grpId="0" animBg="1"/>
+      <p:bldP spid="15" grpId="0" animBg="1"/>
+      <p:bldP spid="19" grpId="0"/>
+      <p:bldP spid="20" grpId="0" animBg="1"/>
+      <p:bldP spid="25" grpId="0" animBg="1"/>
+      <p:bldP spid="32" grpId="0"/>
+      <p:bldP spid="37" grpId="0" animBg="1"/>
+      <p:bldP spid="39" grpId="0" animBg="1"/>
+      <p:bldP spid="42" grpId="0" animBg="1"/>
+      <p:bldP spid="46" grpId="0" animBg="1"/>
+      <p:bldP spid="49" grpId="0" animBg="1"/>
+      <p:bldP spid="50" grpId="0" animBg="1"/>
+      <p:bldP spid="52" grpId="0"/>
+    </p:bldLst>
+  </p:timing>
 </p:sld>
 </file>
 

</xml_diff>

<commit_message>
Modified the aggregators post
</commit_message>
<xml_diff>
--- a/illustrations/illustrations.pptx
+++ b/illustrations/illustrations.pptx
@@ -5,7 +5,7 @@
     <p:sldMasterId id="2147483648" r:id="rId1"/>
   </p:sldMasterIdLst>
   <p:notesMasterIdLst>
-    <p:notesMasterId r:id="rId10"/>
+    <p:notesMasterId r:id="rId11"/>
   </p:notesMasterIdLst>
   <p:sldIdLst>
     <p:sldId id="574" r:id="rId2"/>
@@ -16,6 +16,7 @@
     <p:sldId id="579" r:id="rId7"/>
     <p:sldId id="580" r:id="rId8"/>
     <p:sldId id="581" r:id="rId9"/>
+    <p:sldId id="582" r:id="rId10"/>
   </p:sldIdLst>
   <p:sldSz cx="9144000" cy="6858000" type="screen4x3"/>
   <p:notesSz cx="6858000" cy="9144000"/>
@@ -237,7 +238,7 @@
             <a:fld id="{1C54B592-DDDB-4FBB-91F2-233647701935}" type="datetimeFigureOut">
               <a:rPr lang="en-US" smtClean="0"/>
               <a:pPr/>
-              <a:t>1/30/2016</a:t>
+              <a:t>2/3/2016</a:t>
             </a:fld>
             <a:endParaRPr lang="en-US" dirty="0"/>
           </a:p>
@@ -795,7 +796,7 @@
           <a:p>
             <a:fld id="{C7AE018C-EBF3-4294-9E53-BB9692A1B238}" type="datetime1">
               <a:rPr lang="en-US" smtClean="0"/>
-              <a:t>1/30/2016</a:t>
+              <a:t>2/3/2016</a:t>
             </a:fld>
             <a:endParaRPr lang="en-US" dirty="0"/>
           </a:p>
@@ -951,7 +952,7 @@
           <a:p>
             <a:fld id="{AC5D3C69-66A1-4D00-B513-42CC0FCC59B6}" type="datetime1">
               <a:rPr lang="en-US" smtClean="0"/>
-              <a:t>1/30/2016</a:t>
+              <a:t>2/3/2016</a:t>
             </a:fld>
             <a:endParaRPr lang="en-US" dirty="0"/>
           </a:p>
@@ -1047,7 +1048,7 @@
           <a:p>
             <a:fld id="{DF081C4C-367B-4CA1-BFE5-DD5EF40A8C1E}" type="datetime1">
               <a:rPr lang="en-US" smtClean="0"/>
-              <a:t>1/30/2016</a:t>
+              <a:t>2/3/2016</a:t>
             </a:fld>
             <a:endParaRPr lang="en-US" dirty="0"/>
           </a:p>
@@ -1337,7 +1338,7 @@
           <a:p>
             <a:fld id="{7284FD7A-D0F1-4BFD-9AB1-D45A3214561B}" type="datetime1">
               <a:rPr lang="en-US" smtClean="0"/>
-              <a:t>1/30/2016</a:t>
+              <a:t>2/3/2016</a:t>
             </a:fld>
             <a:endParaRPr lang="en-US" dirty="0"/>
           </a:p>
@@ -1634,7 +1635,7 @@
           <a:p>
             <a:fld id="{7C1E8470-7002-4B16-912E-F3381BBFC303}" type="datetime1">
               <a:rPr lang="en-US" smtClean="0"/>
-              <a:t>1/30/2016</a:t>
+              <a:t>2/3/2016</a:t>
             </a:fld>
             <a:endParaRPr lang="en-US" dirty="0"/>
           </a:p>
@@ -2065,7 +2066,7 @@
           <a:p>
             <a:fld id="{2668835A-C4A1-487E-A7B8-3E3B6A85266C}" type="datetime1">
               <a:rPr lang="en-US" smtClean="0"/>
-              <a:t>1/30/2016</a:t>
+              <a:t>2/3/2016</a:t>
             </a:fld>
             <a:endParaRPr lang="en-US" dirty="0"/>
           </a:p>
@@ -2161,7 +2162,7 @@
           <a:p>
             <a:fld id="{83E71AAB-E703-47FE-974E-9D2B932F9534}" type="datetime1">
               <a:rPr lang="en-US" smtClean="0"/>
-              <a:t>1/30/2016</a:t>
+              <a:t>2/3/2016</a:t>
             </a:fld>
             <a:endParaRPr lang="en-US" dirty="0"/>
           </a:p>
@@ -2347,7 +2348,7 @@
           <a:p>
             <a:fld id="{C6C74358-98AB-4C1A-82FF-49E7FEE02080}" type="datetime1">
               <a:rPr lang="en-US" smtClean="0"/>
-              <a:t>1/30/2016</a:t>
+              <a:t>2/3/2016</a:t>
             </a:fld>
             <a:endParaRPr lang="en-US" dirty="0"/>
           </a:p>
@@ -11831,7 +11832,7 @@
           <a:prstGeom prst="straightConnector1">
             <a:avLst/>
           </a:prstGeom>
-          <a:ln>
+          <a:ln w="25400">
             <a:tailEnd type="triangle"/>
           </a:ln>
         </p:spPr>
@@ -11867,7 +11868,7 @@
           <a:prstGeom prst="straightConnector1">
             <a:avLst/>
           </a:prstGeom>
-          <a:ln>
+          <a:ln w="25400">
             <a:tailEnd type="triangle"/>
           </a:ln>
         </p:spPr>
@@ -11903,7 +11904,7 @@
           <a:prstGeom prst="straightConnector1">
             <a:avLst/>
           </a:prstGeom>
-          <a:ln>
+          <a:ln w="25400">
             <a:tailEnd type="triangle"/>
           </a:ln>
         </p:spPr>
@@ -11939,7 +11940,1661 @@
           <a:prstGeom prst="straightConnector1">
             <a:avLst/>
           </a:prstGeom>
-          <a:ln>
+          <a:ln w="25400">
+            <a:tailEnd type="triangle"/>
+          </a:ln>
+        </p:spPr>
+        <p:style>
+          <a:lnRef idx="1">
+            <a:schemeClr val="accent1"/>
+          </a:lnRef>
+          <a:fillRef idx="0">
+            <a:schemeClr val="accent1"/>
+          </a:fillRef>
+          <a:effectRef idx="0">
+            <a:schemeClr val="accent1"/>
+          </a:effectRef>
+          <a:fontRef idx="minor">
+            <a:schemeClr val="tx1"/>
+          </a:fontRef>
+        </p:style>
+      </p:cxnSp>
+      <p:sp>
+        <p:nvSpPr>
+          <p:cNvPr id="59" name="Down Arrow 58"/>
+          <p:cNvSpPr/>
+          <p:nvPr/>
+        </p:nvSpPr>
+        <p:spPr>
+          <a:xfrm rot="10800000">
+            <a:off x="6934200" y="5257800"/>
+            <a:ext cx="457200" cy="609600"/>
+          </a:xfrm>
+          <a:prstGeom prst="downArrow">
+            <a:avLst/>
+          </a:prstGeom>
+        </p:spPr>
+        <p:style>
+          <a:lnRef idx="2">
+            <a:schemeClr val="dk1">
+              <a:shade val="50000"/>
+            </a:schemeClr>
+          </a:lnRef>
+          <a:fillRef idx="1">
+            <a:schemeClr val="dk1"/>
+          </a:fillRef>
+          <a:effectRef idx="0">
+            <a:schemeClr val="dk1"/>
+          </a:effectRef>
+          <a:fontRef idx="minor">
+            <a:schemeClr val="lt1"/>
+          </a:fontRef>
+        </p:style>
+        <p:txBody>
+          <a:bodyPr rtlCol="0" anchor="ctr"/>
+          <a:lstStyle/>
+          <a:p>
+            <a:pPr algn="ctr"/>
+            <a:endParaRPr lang="en-US"/>
+          </a:p>
+        </p:txBody>
+      </p:sp>
+      <p:sp>
+        <p:nvSpPr>
+          <p:cNvPr id="60" name="TextBox 59"/>
+          <p:cNvSpPr txBox="1"/>
+          <p:nvPr/>
+        </p:nvSpPr>
+        <p:spPr>
+          <a:xfrm>
+            <a:off x="6477000" y="5867400"/>
+            <a:ext cx="1371599" cy="369332"/>
+          </a:xfrm>
+          <a:prstGeom prst="rect">
+            <a:avLst/>
+          </a:prstGeom>
+          <a:noFill/>
+        </p:spPr>
+        <p:txBody>
+          <a:bodyPr wrap="square" rtlCol="0">
+            <a:spAutoFit/>
+          </a:bodyPr>
+          <a:lstStyle/>
+          <a:p>
+            <a:pPr algn="ctr"/>
+            <a:r>
+              <a:rPr lang="en-US" dirty="0" smtClean="0"/>
+              <a:t>RE-PROCESS</a:t>
+            </a:r>
+            <a:endParaRPr lang="en-US" dirty="0"/>
+          </a:p>
+        </p:txBody>
+      </p:sp>
+    </p:spTree>
+    <p:extLst>
+      <p:ext uri="{BB962C8B-B14F-4D97-AF65-F5344CB8AC3E}">
+        <p14:creationId xmlns:p14="http://schemas.microsoft.com/office/powerpoint/2010/main" val="294220895"/>
+      </p:ext>
+    </p:extLst>
+  </p:cSld>
+  <p:clrMapOvr>
+    <a:masterClrMapping/>
+  </p:clrMapOvr>
+</p:sld>
+</file>
+
+<file path=ppt/slides/slide9.xml><?xml version="1.0" encoding="utf-8"?>
+<p:sld xmlns:a="http://schemas.openxmlformats.org/drawingml/2006/main" xmlns:r="http://schemas.openxmlformats.org/officeDocument/2006/relationships" xmlns:p="http://schemas.openxmlformats.org/presentationml/2006/main">
+  <p:cSld>
+    <p:spTree>
+      <p:nvGrpSpPr>
+        <p:cNvPr id="1" name=""/>
+        <p:cNvGrpSpPr/>
+        <p:nvPr/>
+      </p:nvGrpSpPr>
+      <p:grpSpPr>
+        <a:xfrm>
+          <a:off x="0" y="0"/>
+          <a:ext cx="0" cy="0"/>
+          <a:chOff x="0" y="0"/>
+          <a:chExt cx="0" cy="0"/>
+        </a:xfrm>
+      </p:grpSpPr>
+      <p:sp>
+        <p:nvSpPr>
+          <p:cNvPr id="3" name="Rectangle 2"/>
+          <p:cNvSpPr/>
+          <p:nvPr/>
+        </p:nvSpPr>
+        <p:spPr>
+          <a:xfrm>
+            <a:off x="220518" y="3038186"/>
+            <a:ext cx="1600200" cy="533400"/>
+          </a:xfrm>
+          <a:prstGeom prst="rect">
+            <a:avLst/>
+          </a:prstGeom>
+        </p:spPr>
+        <p:style>
+          <a:lnRef idx="2">
+            <a:schemeClr val="accent3">
+              <a:shade val="50000"/>
+            </a:schemeClr>
+          </a:lnRef>
+          <a:fillRef idx="1">
+            <a:schemeClr val="accent3"/>
+          </a:fillRef>
+          <a:effectRef idx="0">
+            <a:schemeClr val="accent3"/>
+          </a:effectRef>
+          <a:fontRef idx="minor">
+            <a:schemeClr val="lt1"/>
+          </a:fontRef>
+        </p:style>
+        <p:txBody>
+          <a:bodyPr rtlCol="0" anchor="ctr"/>
+          <a:lstStyle/>
+          <a:p>
+            <a:pPr algn="ctr"/>
+            <a:r>
+              <a:rPr lang="en-US" dirty="0" smtClean="0"/>
+              <a:t>CALL CENTER 1</a:t>
+            </a:r>
+            <a:endParaRPr lang="en-US" dirty="0"/>
+          </a:p>
+        </p:txBody>
+      </p:sp>
+      <p:sp>
+        <p:nvSpPr>
+          <p:cNvPr id="4" name="Rectangle 3"/>
+          <p:cNvSpPr/>
+          <p:nvPr/>
+        </p:nvSpPr>
+        <p:spPr>
+          <a:xfrm>
+            <a:off x="2738582" y="3038186"/>
+            <a:ext cx="990600" cy="533400"/>
+          </a:xfrm>
+          <a:prstGeom prst="rect">
+            <a:avLst/>
+          </a:prstGeom>
+        </p:spPr>
+        <p:style>
+          <a:lnRef idx="2">
+            <a:schemeClr val="accent3">
+              <a:shade val="50000"/>
+            </a:schemeClr>
+          </a:lnRef>
+          <a:fillRef idx="1">
+            <a:schemeClr val="accent3"/>
+          </a:fillRef>
+          <a:effectRef idx="0">
+            <a:schemeClr val="accent3"/>
+          </a:effectRef>
+          <a:fontRef idx="minor">
+            <a:schemeClr val="lt1"/>
+          </a:fontRef>
+        </p:style>
+        <p:txBody>
+          <a:bodyPr rtlCol="0" anchor="ctr"/>
+          <a:lstStyle/>
+          <a:p>
+            <a:pPr algn="ctr"/>
+            <a:r>
+              <a:rPr lang="en-US" dirty="0" smtClean="0"/>
+              <a:t>1/2016</a:t>
+            </a:r>
+            <a:endParaRPr lang="en-US" dirty="0"/>
+          </a:p>
+        </p:txBody>
+      </p:sp>
+      <p:sp>
+        <p:nvSpPr>
+          <p:cNvPr id="5" name="Rectangle 4"/>
+          <p:cNvSpPr/>
+          <p:nvPr/>
+        </p:nvSpPr>
+        <p:spPr>
+          <a:xfrm>
+            <a:off x="4033982" y="3038186"/>
+            <a:ext cx="990600" cy="533400"/>
+          </a:xfrm>
+          <a:prstGeom prst="rect">
+            <a:avLst/>
+          </a:prstGeom>
+        </p:spPr>
+        <p:style>
+          <a:lnRef idx="2">
+            <a:schemeClr val="accent3">
+              <a:shade val="50000"/>
+            </a:schemeClr>
+          </a:lnRef>
+          <a:fillRef idx="1">
+            <a:schemeClr val="accent3"/>
+          </a:fillRef>
+          <a:effectRef idx="0">
+            <a:schemeClr val="accent3"/>
+          </a:effectRef>
+          <a:fontRef idx="minor">
+            <a:schemeClr val="lt1"/>
+          </a:fontRef>
+        </p:style>
+        <p:txBody>
+          <a:bodyPr rtlCol="0" anchor="ctr"/>
+          <a:lstStyle/>
+          <a:p>
+            <a:pPr algn="ctr"/>
+            <a:r>
+              <a:rPr lang="en-US" dirty="0"/>
+              <a:t>2</a:t>
+            </a:r>
+            <a:r>
+              <a:rPr lang="en-US" dirty="0" smtClean="0"/>
+              <a:t>/2016</a:t>
+            </a:r>
+            <a:endParaRPr lang="en-US" dirty="0"/>
+          </a:p>
+        </p:txBody>
+      </p:sp>
+      <p:sp>
+        <p:nvSpPr>
+          <p:cNvPr id="6" name="Rectangle 5"/>
+          <p:cNvSpPr/>
+          <p:nvPr/>
+        </p:nvSpPr>
+        <p:spPr>
+          <a:xfrm>
+            <a:off x="5329382" y="3038186"/>
+            <a:ext cx="990600" cy="533400"/>
+          </a:xfrm>
+          <a:prstGeom prst="rect">
+            <a:avLst/>
+          </a:prstGeom>
+        </p:spPr>
+        <p:style>
+          <a:lnRef idx="2">
+            <a:schemeClr val="accent3">
+              <a:shade val="50000"/>
+            </a:schemeClr>
+          </a:lnRef>
+          <a:fillRef idx="1">
+            <a:schemeClr val="accent3"/>
+          </a:fillRef>
+          <a:effectRef idx="0">
+            <a:schemeClr val="accent3"/>
+          </a:effectRef>
+          <a:fontRef idx="minor">
+            <a:schemeClr val="lt1"/>
+          </a:fontRef>
+        </p:style>
+        <p:txBody>
+          <a:bodyPr rtlCol="0" anchor="ctr"/>
+          <a:lstStyle/>
+          <a:p>
+            <a:pPr algn="ctr"/>
+            <a:r>
+              <a:rPr lang="en-US" dirty="0" smtClean="0"/>
+              <a:t>3/2016</a:t>
+            </a:r>
+            <a:endParaRPr lang="en-US" dirty="0"/>
+          </a:p>
+        </p:txBody>
+      </p:sp>
+      <p:sp>
+        <p:nvSpPr>
+          <p:cNvPr id="7" name="Rectangle 6"/>
+          <p:cNvSpPr/>
+          <p:nvPr/>
+        </p:nvSpPr>
+        <p:spPr>
+          <a:xfrm>
+            <a:off x="6624782" y="3038186"/>
+            <a:ext cx="990600" cy="533400"/>
+          </a:xfrm>
+          <a:prstGeom prst="rect">
+            <a:avLst/>
+          </a:prstGeom>
+        </p:spPr>
+        <p:style>
+          <a:lnRef idx="2">
+            <a:schemeClr val="accent3">
+              <a:shade val="50000"/>
+            </a:schemeClr>
+          </a:lnRef>
+          <a:fillRef idx="1">
+            <a:schemeClr val="accent3"/>
+          </a:fillRef>
+          <a:effectRef idx="0">
+            <a:schemeClr val="accent3"/>
+          </a:effectRef>
+          <a:fontRef idx="minor">
+            <a:schemeClr val="lt1"/>
+          </a:fontRef>
+        </p:style>
+        <p:txBody>
+          <a:bodyPr rtlCol="0" anchor="ctr"/>
+          <a:lstStyle/>
+          <a:p>
+            <a:pPr algn="ctr"/>
+            <a:r>
+              <a:rPr lang="en-US" dirty="0" smtClean="0"/>
+              <a:t>4/2016</a:t>
+            </a:r>
+            <a:endParaRPr lang="en-US" dirty="0"/>
+          </a:p>
+        </p:txBody>
+      </p:sp>
+      <p:sp>
+        <p:nvSpPr>
+          <p:cNvPr id="8" name="Rectangle 7"/>
+          <p:cNvSpPr/>
+          <p:nvPr/>
+        </p:nvSpPr>
+        <p:spPr>
+          <a:xfrm>
+            <a:off x="7916718" y="3038186"/>
+            <a:ext cx="990600" cy="533400"/>
+          </a:xfrm>
+          <a:prstGeom prst="rect">
+            <a:avLst/>
+          </a:prstGeom>
+        </p:spPr>
+        <p:style>
+          <a:lnRef idx="2">
+            <a:schemeClr val="accent3">
+              <a:shade val="50000"/>
+            </a:schemeClr>
+          </a:lnRef>
+          <a:fillRef idx="1">
+            <a:schemeClr val="accent3"/>
+          </a:fillRef>
+          <a:effectRef idx="0">
+            <a:schemeClr val="accent3"/>
+          </a:effectRef>
+          <a:fontRef idx="minor">
+            <a:schemeClr val="lt1"/>
+          </a:fontRef>
+        </p:style>
+        <p:txBody>
+          <a:bodyPr rtlCol="0" anchor="ctr"/>
+          <a:lstStyle/>
+          <a:p>
+            <a:pPr algn="ctr"/>
+            <a:r>
+              <a:rPr lang="en-US" dirty="0" smtClean="0"/>
+              <a:t>5/2016</a:t>
+            </a:r>
+            <a:endParaRPr lang="en-US" dirty="0"/>
+          </a:p>
+        </p:txBody>
+      </p:sp>
+      <p:sp>
+        <p:nvSpPr>
+          <p:cNvPr id="9" name="Rectangle 8"/>
+          <p:cNvSpPr/>
+          <p:nvPr/>
+        </p:nvSpPr>
+        <p:spPr>
+          <a:xfrm>
+            <a:off x="225136" y="2123786"/>
+            <a:ext cx="1600200" cy="533400"/>
+          </a:xfrm>
+          <a:prstGeom prst="rect">
+            <a:avLst/>
+          </a:prstGeom>
+        </p:spPr>
+        <p:style>
+          <a:lnRef idx="2">
+            <a:schemeClr val="accent5">
+              <a:shade val="50000"/>
+            </a:schemeClr>
+          </a:lnRef>
+          <a:fillRef idx="1">
+            <a:schemeClr val="accent5"/>
+          </a:fillRef>
+          <a:effectRef idx="0">
+            <a:schemeClr val="accent5"/>
+          </a:effectRef>
+          <a:fontRef idx="minor">
+            <a:schemeClr val="lt1"/>
+          </a:fontRef>
+        </p:style>
+        <p:txBody>
+          <a:bodyPr rtlCol="0" anchor="ctr"/>
+          <a:lstStyle/>
+          <a:p>
+            <a:pPr algn="ctr"/>
+            <a:r>
+              <a:rPr lang="en-US" dirty="0" smtClean="0"/>
+              <a:t>COUNTRY 1</a:t>
+            </a:r>
+            <a:endParaRPr lang="en-US" dirty="0"/>
+          </a:p>
+        </p:txBody>
+      </p:sp>
+      <p:sp>
+        <p:nvSpPr>
+          <p:cNvPr id="10" name="Rectangle 9"/>
+          <p:cNvSpPr/>
+          <p:nvPr/>
+        </p:nvSpPr>
+        <p:spPr>
+          <a:xfrm>
+            <a:off x="2743200" y="2123786"/>
+            <a:ext cx="990600" cy="533400"/>
+          </a:xfrm>
+          <a:prstGeom prst="rect">
+            <a:avLst/>
+          </a:prstGeom>
+        </p:spPr>
+        <p:style>
+          <a:lnRef idx="2">
+            <a:schemeClr val="accent5">
+              <a:shade val="50000"/>
+            </a:schemeClr>
+          </a:lnRef>
+          <a:fillRef idx="1">
+            <a:schemeClr val="accent5"/>
+          </a:fillRef>
+          <a:effectRef idx="0">
+            <a:schemeClr val="accent5"/>
+          </a:effectRef>
+          <a:fontRef idx="minor">
+            <a:schemeClr val="lt1"/>
+          </a:fontRef>
+        </p:style>
+        <p:txBody>
+          <a:bodyPr rtlCol="0" anchor="ctr"/>
+          <a:lstStyle/>
+          <a:p>
+            <a:pPr algn="ctr"/>
+            <a:r>
+              <a:rPr lang="en-US" dirty="0" smtClean="0"/>
+              <a:t>1/2016</a:t>
+            </a:r>
+            <a:endParaRPr lang="en-US" dirty="0"/>
+          </a:p>
+        </p:txBody>
+      </p:sp>
+      <p:sp>
+        <p:nvSpPr>
+          <p:cNvPr id="11" name="Rectangle 10"/>
+          <p:cNvSpPr/>
+          <p:nvPr/>
+        </p:nvSpPr>
+        <p:spPr>
+          <a:xfrm>
+            <a:off x="4038600" y="2123786"/>
+            <a:ext cx="990600" cy="533400"/>
+          </a:xfrm>
+          <a:prstGeom prst="rect">
+            <a:avLst/>
+          </a:prstGeom>
+        </p:spPr>
+        <p:style>
+          <a:lnRef idx="2">
+            <a:schemeClr val="accent5">
+              <a:shade val="50000"/>
+            </a:schemeClr>
+          </a:lnRef>
+          <a:fillRef idx="1">
+            <a:schemeClr val="accent5"/>
+          </a:fillRef>
+          <a:effectRef idx="0">
+            <a:schemeClr val="accent5"/>
+          </a:effectRef>
+          <a:fontRef idx="minor">
+            <a:schemeClr val="lt1"/>
+          </a:fontRef>
+        </p:style>
+        <p:txBody>
+          <a:bodyPr rtlCol="0" anchor="ctr"/>
+          <a:lstStyle/>
+          <a:p>
+            <a:pPr algn="ctr"/>
+            <a:r>
+              <a:rPr lang="en-US" dirty="0"/>
+              <a:t>2</a:t>
+            </a:r>
+            <a:r>
+              <a:rPr lang="en-US" dirty="0" smtClean="0"/>
+              <a:t>/2016</a:t>
+            </a:r>
+            <a:endParaRPr lang="en-US" dirty="0"/>
+          </a:p>
+        </p:txBody>
+      </p:sp>
+      <p:sp>
+        <p:nvSpPr>
+          <p:cNvPr id="12" name="Rectangle 11"/>
+          <p:cNvSpPr/>
+          <p:nvPr/>
+        </p:nvSpPr>
+        <p:spPr>
+          <a:xfrm>
+            <a:off x="5334000" y="2123786"/>
+            <a:ext cx="990600" cy="533400"/>
+          </a:xfrm>
+          <a:prstGeom prst="rect">
+            <a:avLst/>
+          </a:prstGeom>
+        </p:spPr>
+        <p:style>
+          <a:lnRef idx="2">
+            <a:schemeClr val="accent5">
+              <a:shade val="50000"/>
+            </a:schemeClr>
+          </a:lnRef>
+          <a:fillRef idx="1">
+            <a:schemeClr val="accent5"/>
+          </a:fillRef>
+          <a:effectRef idx="0">
+            <a:schemeClr val="accent5"/>
+          </a:effectRef>
+          <a:fontRef idx="minor">
+            <a:schemeClr val="lt1"/>
+          </a:fontRef>
+        </p:style>
+        <p:txBody>
+          <a:bodyPr rtlCol="0" anchor="ctr"/>
+          <a:lstStyle/>
+          <a:p>
+            <a:pPr algn="ctr"/>
+            <a:r>
+              <a:rPr lang="en-US" dirty="0" smtClean="0"/>
+              <a:t>3/2016</a:t>
+            </a:r>
+            <a:endParaRPr lang="en-US" dirty="0"/>
+          </a:p>
+        </p:txBody>
+      </p:sp>
+      <p:sp>
+        <p:nvSpPr>
+          <p:cNvPr id="13" name="Rectangle 12"/>
+          <p:cNvSpPr/>
+          <p:nvPr/>
+        </p:nvSpPr>
+        <p:spPr>
+          <a:xfrm>
+            <a:off x="6629400" y="2123786"/>
+            <a:ext cx="990600" cy="533400"/>
+          </a:xfrm>
+          <a:prstGeom prst="rect">
+            <a:avLst/>
+          </a:prstGeom>
+        </p:spPr>
+        <p:style>
+          <a:lnRef idx="2">
+            <a:schemeClr val="accent5">
+              <a:shade val="50000"/>
+            </a:schemeClr>
+          </a:lnRef>
+          <a:fillRef idx="1">
+            <a:schemeClr val="accent5"/>
+          </a:fillRef>
+          <a:effectRef idx="0">
+            <a:schemeClr val="accent5"/>
+          </a:effectRef>
+          <a:fontRef idx="minor">
+            <a:schemeClr val="lt1"/>
+          </a:fontRef>
+        </p:style>
+        <p:txBody>
+          <a:bodyPr rtlCol="0" anchor="ctr"/>
+          <a:lstStyle/>
+          <a:p>
+            <a:pPr algn="ctr"/>
+            <a:r>
+              <a:rPr lang="en-US" dirty="0" smtClean="0"/>
+              <a:t>4/2016</a:t>
+            </a:r>
+            <a:endParaRPr lang="en-US" dirty="0"/>
+          </a:p>
+        </p:txBody>
+      </p:sp>
+      <p:sp>
+        <p:nvSpPr>
+          <p:cNvPr id="14" name="Rectangle 13"/>
+          <p:cNvSpPr/>
+          <p:nvPr/>
+        </p:nvSpPr>
+        <p:spPr>
+          <a:xfrm>
+            <a:off x="7921336" y="2123786"/>
+            <a:ext cx="990600" cy="533400"/>
+          </a:xfrm>
+          <a:prstGeom prst="rect">
+            <a:avLst/>
+          </a:prstGeom>
+        </p:spPr>
+        <p:style>
+          <a:lnRef idx="2">
+            <a:schemeClr val="accent5">
+              <a:shade val="50000"/>
+            </a:schemeClr>
+          </a:lnRef>
+          <a:fillRef idx="1">
+            <a:schemeClr val="accent5"/>
+          </a:fillRef>
+          <a:effectRef idx="0">
+            <a:schemeClr val="accent5"/>
+          </a:effectRef>
+          <a:fontRef idx="minor">
+            <a:schemeClr val="lt1"/>
+          </a:fontRef>
+        </p:style>
+        <p:txBody>
+          <a:bodyPr rtlCol="0" anchor="ctr"/>
+          <a:lstStyle/>
+          <a:p>
+            <a:pPr algn="ctr"/>
+            <a:r>
+              <a:rPr lang="en-US" dirty="0" smtClean="0"/>
+              <a:t>5/2016</a:t>
+            </a:r>
+            <a:endParaRPr lang="en-US" dirty="0"/>
+          </a:p>
+        </p:txBody>
+      </p:sp>
+      <p:sp>
+        <p:nvSpPr>
+          <p:cNvPr id="15" name="Rectangle 14"/>
+          <p:cNvSpPr/>
+          <p:nvPr/>
+        </p:nvSpPr>
+        <p:spPr>
+          <a:xfrm>
+            <a:off x="220518" y="1186584"/>
+            <a:ext cx="1600200" cy="533400"/>
+          </a:xfrm>
+          <a:prstGeom prst="rect">
+            <a:avLst/>
+          </a:prstGeom>
+        </p:spPr>
+        <p:style>
+          <a:lnRef idx="2">
+            <a:schemeClr val="accent6">
+              <a:shade val="50000"/>
+            </a:schemeClr>
+          </a:lnRef>
+          <a:fillRef idx="1">
+            <a:schemeClr val="accent6"/>
+          </a:fillRef>
+          <a:effectRef idx="0">
+            <a:schemeClr val="accent6"/>
+          </a:effectRef>
+          <a:fontRef idx="minor">
+            <a:schemeClr val="lt1"/>
+          </a:fontRef>
+        </p:style>
+        <p:txBody>
+          <a:bodyPr rtlCol="0" anchor="ctr"/>
+          <a:lstStyle/>
+          <a:p>
+            <a:pPr algn="ctr"/>
+            <a:r>
+              <a:rPr lang="en-US" dirty="0" smtClean="0"/>
+              <a:t>REGION 1</a:t>
+            </a:r>
+            <a:endParaRPr lang="en-US" dirty="0"/>
+          </a:p>
+        </p:txBody>
+      </p:sp>
+      <p:sp>
+        <p:nvSpPr>
+          <p:cNvPr id="16" name="Rectangle 15"/>
+          <p:cNvSpPr/>
+          <p:nvPr/>
+        </p:nvSpPr>
+        <p:spPr>
+          <a:xfrm>
+            <a:off x="2738582" y="1186584"/>
+            <a:ext cx="990600" cy="533400"/>
+          </a:xfrm>
+          <a:prstGeom prst="rect">
+            <a:avLst/>
+          </a:prstGeom>
+        </p:spPr>
+        <p:style>
+          <a:lnRef idx="2">
+            <a:schemeClr val="accent6">
+              <a:shade val="50000"/>
+            </a:schemeClr>
+          </a:lnRef>
+          <a:fillRef idx="1">
+            <a:schemeClr val="accent6"/>
+          </a:fillRef>
+          <a:effectRef idx="0">
+            <a:schemeClr val="accent6"/>
+          </a:effectRef>
+          <a:fontRef idx="minor">
+            <a:schemeClr val="lt1"/>
+          </a:fontRef>
+        </p:style>
+        <p:txBody>
+          <a:bodyPr rtlCol="0" anchor="ctr"/>
+          <a:lstStyle/>
+          <a:p>
+            <a:pPr algn="ctr"/>
+            <a:r>
+              <a:rPr lang="en-US" dirty="0" smtClean="0"/>
+              <a:t>1/2016</a:t>
+            </a:r>
+            <a:endParaRPr lang="en-US" dirty="0"/>
+          </a:p>
+        </p:txBody>
+      </p:sp>
+      <p:sp>
+        <p:nvSpPr>
+          <p:cNvPr id="17" name="Rectangle 16"/>
+          <p:cNvSpPr/>
+          <p:nvPr/>
+        </p:nvSpPr>
+        <p:spPr>
+          <a:xfrm>
+            <a:off x="4033982" y="1186584"/>
+            <a:ext cx="990600" cy="533400"/>
+          </a:xfrm>
+          <a:prstGeom prst="rect">
+            <a:avLst/>
+          </a:prstGeom>
+        </p:spPr>
+        <p:style>
+          <a:lnRef idx="2">
+            <a:schemeClr val="accent6">
+              <a:shade val="50000"/>
+            </a:schemeClr>
+          </a:lnRef>
+          <a:fillRef idx="1">
+            <a:schemeClr val="accent6"/>
+          </a:fillRef>
+          <a:effectRef idx="0">
+            <a:schemeClr val="accent6"/>
+          </a:effectRef>
+          <a:fontRef idx="minor">
+            <a:schemeClr val="lt1"/>
+          </a:fontRef>
+        </p:style>
+        <p:txBody>
+          <a:bodyPr rtlCol="0" anchor="ctr"/>
+          <a:lstStyle/>
+          <a:p>
+            <a:pPr algn="ctr"/>
+            <a:r>
+              <a:rPr lang="en-US" dirty="0"/>
+              <a:t>2</a:t>
+            </a:r>
+            <a:r>
+              <a:rPr lang="en-US" dirty="0" smtClean="0"/>
+              <a:t>/2016</a:t>
+            </a:r>
+            <a:endParaRPr lang="en-US" dirty="0"/>
+          </a:p>
+        </p:txBody>
+      </p:sp>
+      <p:sp>
+        <p:nvSpPr>
+          <p:cNvPr id="18" name="Rectangle 17"/>
+          <p:cNvSpPr/>
+          <p:nvPr/>
+        </p:nvSpPr>
+        <p:spPr>
+          <a:xfrm>
+            <a:off x="5329382" y="1186584"/>
+            <a:ext cx="990600" cy="533400"/>
+          </a:xfrm>
+          <a:prstGeom prst="rect">
+            <a:avLst/>
+          </a:prstGeom>
+        </p:spPr>
+        <p:style>
+          <a:lnRef idx="2">
+            <a:schemeClr val="accent6">
+              <a:shade val="50000"/>
+            </a:schemeClr>
+          </a:lnRef>
+          <a:fillRef idx="1">
+            <a:schemeClr val="accent6"/>
+          </a:fillRef>
+          <a:effectRef idx="0">
+            <a:schemeClr val="accent6"/>
+          </a:effectRef>
+          <a:fontRef idx="minor">
+            <a:schemeClr val="lt1"/>
+          </a:fontRef>
+        </p:style>
+        <p:txBody>
+          <a:bodyPr rtlCol="0" anchor="ctr"/>
+          <a:lstStyle/>
+          <a:p>
+            <a:pPr algn="ctr"/>
+            <a:r>
+              <a:rPr lang="en-US" dirty="0" smtClean="0"/>
+              <a:t>3/2016</a:t>
+            </a:r>
+            <a:endParaRPr lang="en-US" dirty="0"/>
+          </a:p>
+        </p:txBody>
+      </p:sp>
+      <p:sp>
+        <p:nvSpPr>
+          <p:cNvPr id="19" name="Rectangle 18"/>
+          <p:cNvSpPr/>
+          <p:nvPr/>
+        </p:nvSpPr>
+        <p:spPr>
+          <a:xfrm>
+            <a:off x="6624782" y="1186584"/>
+            <a:ext cx="990600" cy="533400"/>
+          </a:xfrm>
+          <a:prstGeom prst="rect">
+            <a:avLst/>
+          </a:prstGeom>
+        </p:spPr>
+        <p:style>
+          <a:lnRef idx="2">
+            <a:schemeClr val="accent6">
+              <a:shade val="50000"/>
+            </a:schemeClr>
+          </a:lnRef>
+          <a:fillRef idx="1">
+            <a:schemeClr val="accent6"/>
+          </a:fillRef>
+          <a:effectRef idx="0">
+            <a:schemeClr val="accent6"/>
+          </a:effectRef>
+          <a:fontRef idx="minor">
+            <a:schemeClr val="lt1"/>
+          </a:fontRef>
+        </p:style>
+        <p:txBody>
+          <a:bodyPr rtlCol="0" anchor="ctr"/>
+          <a:lstStyle/>
+          <a:p>
+            <a:pPr algn="ctr"/>
+            <a:r>
+              <a:rPr lang="en-US" dirty="0" smtClean="0"/>
+              <a:t>4/2016</a:t>
+            </a:r>
+            <a:endParaRPr lang="en-US" dirty="0"/>
+          </a:p>
+        </p:txBody>
+      </p:sp>
+      <p:sp>
+        <p:nvSpPr>
+          <p:cNvPr id="20" name="Rectangle 19"/>
+          <p:cNvSpPr/>
+          <p:nvPr/>
+        </p:nvSpPr>
+        <p:spPr>
+          <a:xfrm>
+            <a:off x="7916718" y="1186584"/>
+            <a:ext cx="990600" cy="533400"/>
+          </a:xfrm>
+          <a:prstGeom prst="rect">
+            <a:avLst/>
+          </a:prstGeom>
+        </p:spPr>
+        <p:style>
+          <a:lnRef idx="2">
+            <a:schemeClr val="accent6">
+              <a:shade val="50000"/>
+            </a:schemeClr>
+          </a:lnRef>
+          <a:fillRef idx="1">
+            <a:schemeClr val="accent6"/>
+          </a:fillRef>
+          <a:effectRef idx="0">
+            <a:schemeClr val="accent6"/>
+          </a:effectRef>
+          <a:fontRef idx="minor">
+            <a:schemeClr val="lt1"/>
+          </a:fontRef>
+        </p:style>
+        <p:txBody>
+          <a:bodyPr rtlCol="0" anchor="ctr"/>
+          <a:lstStyle/>
+          <a:p>
+            <a:pPr algn="ctr"/>
+            <a:r>
+              <a:rPr lang="en-US" dirty="0" smtClean="0"/>
+              <a:t>5/2016</a:t>
+            </a:r>
+            <a:endParaRPr lang="en-US" dirty="0"/>
+          </a:p>
+        </p:txBody>
+      </p:sp>
+      <p:sp>
+        <p:nvSpPr>
+          <p:cNvPr id="21" name="Rectangle 20"/>
+          <p:cNvSpPr/>
+          <p:nvPr/>
+        </p:nvSpPr>
+        <p:spPr>
+          <a:xfrm>
+            <a:off x="220518" y="3994150"/>
+            <a:ext cx="1600200" cy="533400"/>
+          </a:xfrm>
+          <a:prstGeom prst="rect">
+            <a:avLst/>
+          </a:prstGeom>
+        </p:spPr>
+        <p:style>
+          <a:lnRef idx="2">
+            <a:schemeClr val="accent2">
+              <a:shade val="50000"/>
+            </a:schemeClr>
+          </a:lnRef>
+          <a:fillRef idx="1">
+            <a:schemeClr val="accent2"/>
+          </a:fillRef>
+          <a:effectRef idx="0">
+            <a:schemeClr val="accent2"/>
+          </a:effectRef>
+          <a:fontRef idx="minor">
+            <a:schemeClr val="lt1"/>
+          </a:fontRef>
+        </p:style>
+        <p:txBody>
+          <a:bodyPr rtlCol="0" anchor="ctr"/>
+          <a:lstStyle/>
+          <a:p>
+            <a:pPr algn="ctr"/>
+            <a:r>
+              <a:rPr lang="en-US" dirty="0" smtClean="0"/>
+              <a:t>REVENUE UNIT 1</a:t>
+            </a:r>
+            <a:endParaRPr lang="en-US" dirty="0"/>
+          </a:p>
+        </p:txBody>
+      </p:sp>
+      <p:sp>
+        <p:nvSpPr>
+          <p:cNvPr id="22" name="Rectangle 21"/>
+          <p:cNvSpPr/>
+          <p:nvPr/>
+        </p:nvSpPr>
+        <p:spPr>
+          <a:xfrm>
+            <a:off x="2738582" y="3994150"/>
+            <a:ext cx="990600" cy="533400"/>
+          </a:xfrm>
+          <a:prstGeom prst="rect">
+            <a:avLst/>
+          </a:prstGeom>
+        </p:spPr>
+        <p:style>
+          <a:lnRef idx="2">
+            <a:schemeClr val="accent2">
+              <a:shade val="50000"/>
+            </a:schemeClr>
+          </a:lnRef>
+          <a:fillRef idx="1">
+            <a:schemeClr val="accent2"/>
+          </a:fillRef>
+          <a:effectRef idx="0">
+            <a:schemeClr val="accent2"/>
+          </a:effectRef>
+          <a:fontRef idx="minor">
+            <a:schemeClr val="lt1"/>
+          </a:fontRef>
+        </p:style>
+        <p:txBody>
+          <a:bodyPr rtlCol="0" anchor="ctr"/>
+          <a:lstStyle/>
+          <a:p>
+            <a:pPr algn="ctr"/>
+            <a:r>
+              <a:rPr lang="en-US" dirty="0" smtClean="0"/>
+              <a:t>1/2016</a:t>
+            </a:r>
+            <a:endParaRPr lang="en-US" dirty="0"/>
+          </a:p>
+        </p:txBody>
+      </p:sp>
+      <p:sp>
+        <p:nvSpPr>
+          <p:cNvPr id="23" name="Rectangle 22"/>
+          <p:cNvSpPr/>
+          <p:nvPr/>
+        </p:nvSpPr>
+        <p:spPr>
+          <a:xfrm>
+            <a:off x="4033982" y="3994150"/>
+            <a:ext cx="990600" cy="533400"/>
+          </a:xfrm>
+          <a:prstGeom prst="rect">
+            <a:avLst/>
+          </a:prstGeom>
+        </p:spPr>
+        <p:style>
+          <a:lnRef idx="2">
+            <a:schemeClr val="accent2">
+              <a:shade val="50000"/>
+            </a:schemeClr>
+          </a:lnRef>
+          <a:fillRef idx="1">
+            <a:schemeClr val="accent2"/>
+          </a:fillRef>
+          <a:effectRef idx="0">
+            <a:schemeClr val="accent2"/>
+          </a:effectRef>
+          <a:fontRef idx="minor">
+            <a:schemeClr val="lt1"/>
+          </a:fontRef>
+        </p:style>
+        <p:txBody>
+          <a:bodyPr rtlCol="0" anchor="ctr"/>
+          <a:lstStyle/>
+          <a:p>
+            <a:pPr algn="ctr"/>
+            <a:r>
+              <a:rPr lang="en-US" dirty="0"/>
+              <a:t>2</a:t>
+            </a:r>
+            <a:r>
+              <a:rPr lang="en-US" dirty="0" smtClean="0"/>
+              <a:t>/2016</a:t>
+            </a:r>
+            <a:endParaRPr lang="en-US" dirty="0"/>
+          </a:p>
+        </p:txBody>
+      </p:sp>
+      <p:sp>
+        <p:nvSpPr>
+          <p:cNvPr id="24" name="Rectangle 23"/>
+          <p:cNvSpPr/>
+          <p:nvPr/>
+        </p:nvSpPr>
+        <p:spPr>
+          <a:xfrm>
+            <a:off x="5329382" y="3994150"/>
+            <a:ext cx="990600" cy="533400"/>
+          </a:xfrm>
+          <a:prstGeom prst="rect">
+            <a:avLst/>
+          </a:prstGeom>
+        </p:spPr>
+        <p:style>
+          <a:lnRef idx="2">
+            <a:schemeClr val="accent2">
+              <a:shade val="50000"/>
+            </a:schemeClr>
+          </a:lnRef>
+          <a:fillRef idx="1">
+            <a:schemeClr val="accent2"/>
+          </a:fillRef>
+          <a:effectRef idx="0">
+            <a:schemeClr val="accent2"/>
+          </a:effectRef>
+          <a:fontRef idx="minor">
+            <a:schemeClr val="lt1"/>
+          </a:fontRef>
+        </p:style>
+        <p:txBody>
+          <a:bodyPr rtlCol="0" anchor="ctr"/>
+          <a:lstStyle/>
+          <a:p>
+            <a:pPr algn="ctr"/>
+            <a:r>
+              <a:rPr lang="en-US" dirty="0" smtClean="0"/>
+              <a:t>3/2016</a:t>
+            </a:r>
+            <a:endParaRPr lang="en-US" dirty="0"/>
+          </a:p>
+        </p:txBody>
+      </p:sp>
+      <p:sp>
+        <p:nvSpPr>
+          <p:cNvPr id="25" name="Rectangle 24"/>
+          <p:cNvSpPr/>
+          <p:nvPr/>
+        </p:nvSpPr>
+        <p:spPr>
+          <a:xfrm>
+            <a:off x="6624782" y="3994150"/>
+            <a:ext cx="990600" cy="533400"/>
+          </a:xfrm>
+          <a:prstGeom prst="rect">
+            <a:avLst/>
+          </a:prstGeom>
+        </p:spPr>
+        <p:style>
+          <a:lnRef idx="2">
+            <a:schemeClr val="accent2">
+              <a:shade val="50000"/>
+            </a:schemeClr>
+          </a:lnRef>
+          <a:fillRef idx="1">
+            <a:schemeClr val="accent2"/>
+          </a:fillRef>
+          <a:effectRef idx="0">
+            <a:schemeClr val="accent2"/>
+          </a:effectRef>
+          <a:fontRef idx="minor">
+            <a:schemeClr val="lt1"/>
+          </a:fontRef>
+        </p:style>
+        <p:txBody>
+          <a:bodyPr rtlCol="0" anchor="ctr"/>
+          <a:lstStyle/>
+          <a:p>
+            <a:pPr algn="ctr"/>
+            <a:r>
+              <a:rPr lang="en-US" dirty="0" smtClean="0"/>
+              <a:t>4/2016</a:t>
+            </a:r>
+            <a:endParaRPr lang="en-US" dirty="0"/>
+          </a:p>
+        </p:txBody>
+      </p:sp>
+      <p:sp>
+        <p:nvSpPr>
+          <p:cNvPr id="26" name="Rectangle 25"/>
+          <p:cNvSpPr/>
+          <p:nvPr/>
+        </p:nvSpPr>
+        <p:spPr>
+          <a:xfrm>
+            <a:off x="7916718" y="3994150"/>
+            <a:ext cx="990600" cy="533400"/>
+          </a:xfrm>
+          <a:prstGeom prst="rect">
+            <a:avLst/>
+          </a:prstGeom>
+        </p:spPr>
+        <p:style>
+          <a:lnRef idx="2">
+            <a:schemeClr val="accent2">
+              <a:shade val="50000"/>
+            </a:schemeClr>
+          </a:lnRef>
+          <a:fillRef idx="1">
+            <a:schemeClr val="accent2"/>
+          </a:fillRef>
+          <a:effectRef idx="0">
+            <a:schemeClr val="accent2"/>
+          </a:effectRef>
+          <a:fontRef idx="minor">
+            <a:schemeClr val="lt1"/>
+          </a:fontRef>
+        </p:style>
+        <p:txBody>
+          <a:bodyPr rtlCol="0" anchor="ctr"/>
+          <a:lstStyle/>
+          <a:p>
+            <a:pPr algn="ctr"/>
+            <a:r>
+              <a:rPr lang="en-US" dirty="0" smtClean="0"/>
+              <a:t>5/2016</a:t>
+            </a:r>
+            <a:endParaRPr lang="en-US" dirty="0"/>
+          </a:p>
+        </p:txBody>
+      </p:sp>
+      <p:sp>
+        <p:nvSpPr>
+          <p:cNvPr id="27" name="Rectangle 26"/>
+          <p:cNvSpPr/>
+          <p:nvPr/>
+        </p:nvSpPr>
+        <p:spPr>
+          <a:xfrm>
+            <a:off x="225136" y="228600"/>
+            <a:ext cx="1600200" cy="533400"/>
+          </a:xfrm>
+          <a:prstGeom prst="rect">
+            <a:avLst/>
+          </a:prstGeom>
+        </p:spPr>
+        <p:style>
+          <a:lnRef idx="2">
+            <a:schemeClr val="accent1">
+              <a:shade val="50000"/>
+            </a:schemeClr>
+          </a:lnRef>
+          <a:fillRef idx="1">
+            <a:schemeClr val="accent1"/>
+          </a:fillRef>
+          <a:effectRef idx="0">
+            <a:schemeClr val="accent1"/>
+          </a:effectRef>
+          <a:fontRef idx="minor">
+            <a:schemeClr val="lt1"/>
+          </a:fontRef>
+        </p:style>
+        <p:txBody>
+          <a:bodyPr rtlCol="0" anchor="ctr"/>
+          <a:lstStyle/>
+          <a:p>
+            <a:pPr algn="ctr"/>
+            <a:r>
+              <a:rPr lang="en-US" dirty="0" smtClean="0"/>
+              <a:t>GLOBAL</a:t>
+            </a:r>
+            <a:endParaRPr lang="en-US" dirty="0"/>
+          </a:p>
+        </p:txBody>
+      </p:sp>
+      <p:sp>
+        <p:nvSpPr>
+          <p:cNvPr id="28" name="Rectangle 27"/>
+          <p:cNvSpPr/>
+          <p:nvPr/>
+        </p:nvSpPr>
+        <p:spPr>
+          <a:xfrm>
+            <a:off x="2743200" y="228600"/>
+            <a:ext cx="990600" cy="533400"/>
+          </a:xfrm>
+          <a:prstGeom prst="rect">
+            <a:avLst/>
+          </a:prstGeom>
+        </p:spPr>
+        <p:style>
+          <a:lnRef idx="2">
+            <a:schemeClr val="accent1">
+              <a:shade val="50000"/>
+            </a:schemeClr>
+          </a:lnRef>
+          <a:fillRef idx="1">
+            <a:schemeClr val="accent1"/>
+          </a:fillRef>
+          <a:effectRef idx="0">
+            <a:schemeClr val="accent1"/>
+          </a:effectRef>
+          <a:fontRef idx="minor">
+            <a:schemeClr val="lt1"/>
+          </a:fontRef>
+        </p:style>
+        <p:txBody>
+          <a:bodyPr rtlCol="0" anchor="ctr"/>
+          <a:lstStyle/>
+          <a:p>
+            <a:pPr algn="ctr"/>
+            <a:r>
+              <a:rPr lang="en-US" dirty="0" smtClean="0"/>
+              <a:t>1/2016</a:t>
+            </a:r>
+            <a:endParaRPr lang="en-US" dirty="0"/>
+          </a:p>
+        </p:txBody>
+      </p:sp>
+      <p:sp>
+        <p:nvSpPr>
+          <p:cNvPr id="29" name="Rectangle 28"/>
+          <p:cNvSpPr/>
+          <p:nvPr/>
+        </p:nvSpPr>
+        <p:spPr>
+          <a:xfrm>
+            <a:off x="4038600" y="228600"/>
+            <a:ext cx="990600" cy="533400"/>
+          </a:xfrm>
+          <a:prstGeom prst="rect">
+            <a:avLst/>
+          </a:prstGeom>
+        </p:spPr>
+        <p:style>
+          <a:lnRef idx="2">
+            <a:schemeClr val="accent1">
+              <a:shade val="50000"/>
+            </a:schemeClr>
+          </a:lnRef>
+          <a:fillRef idx="1">
+            <a:schemeClr val="accent1"/>
+          </a:fillRef>
+          <a:effectRef idx="0">
+            <a:schemeClr val="accent1"/>
+          </a:effectRef>
+          <a:fontRef idx="minor">
+            <a:schemeClr val="lt1"/>
+          </a:fontRef>
+        </p:style>
+        <p:txBody>
+          <a:bodyPr rtlCol="0" anchor="ctr"/>
+          <a:lstStyle/>
+          <a:p>
+            <a:pPr algn="ctr"/>
+            <a:r>
+              <a:rPr lang="en-US" dirty="0"/>
+              <a:t>2</a:t>
+            </a:r>
+            <a:r>
+              <a:rPr lang="en-US" dirty="0" smtClean="0"/>
+              <a:t>/2016</a:t>
+            </a:r>
+            <a:endParaRPr lang="en-US" dirty="0"/>
+          </a:p>
+        </p:txBody>
+      </p:sp>
+      <p:sp>
+        <p:nvSpPr>
+          <p:cNvPr id="30" name="Rectangle 29"/>
+          <p:cNvSpPr/>
+          <p:nvPr/>
+        </p:nvSpPr>
+        <p:spPr>
+          <a:xfrm>
+            <a:off x="5334000" y="228600"/>
+            <a:ext cx="990600" cy="533400"/>
+          </a:xfrm>
+          <a:prstGeom prst="rect">
+            <a:avLst/>
+          </a:prstGeom>
+        </p:spPr>
+        <p:style>
+          <a:lnRef idx="2">
+            <a:schemeClr val="accent1">
+              <a:shade val="50000"/>
+            </a:schemeClr>
+          </a:lnRef>
+          <a:fillRef idx="1">
+            <a:schemeClr val="accent1"/>
+          </a:fillRef>
+          <a:effectRef idx="0">
+            <a:schemeClr val="accent1"/>
+          </a:effectRef>
+          <a:fontRef idx="minor">
+            <a:schemeClr val="lt1"/>
+          </a:fontRef>
+        </p:style>
+        <p:txBody>
+          <a:bodyPr rtlCol="0" anchor="ctr"/>
+          <a:lstStyle/>
+          <a:p>
+            <a:pPr algn="ctr"/>
+            <a:r>
+              <a:rPr lang="en-US" dirty="0" smtClean="0"/>
+              <a:t>3/2016</a:t>
+            </a:r>
+            <a:endParaRPr lang="en-US" dirty="0"/>
+          </a:p>
+        </p:txBody>
+      </p:sp>
+      <p:sp>
+        <p:nvSpPr>
+          <p:cNvPr id="31" name="Rectangle 30"/>
+          <p:cNvSpPr/>
+          <p:nvPr/>
+        </p:nvSpPr>
+        <p:spPr>
+          <a:xfrm>
+            <a:off x="6629400" y="228600"/>
+            <a:ext cx="990600" cy="533400"/>
+          </a:xfrm>
+          <a:prstGeom prst="rect">
+            <a:avLst/>
+          </a:prstGeom>
+        </p:spPr>
+        <p:style>
+          <a:lnRef idx="2">
+            <a:schemeClr val="accent1">
+              <a:shade val="50000"/>
+            </a:schemeClr>
+          </a:lnRef>
+          <a:fillRef idx="1">
+            <a:schemeClr val="accent1"/>
+          </a:fillRef>
+          <a:effectRef idx="0">
+            <a:schemeClr val="accent1"/>
+          </a:effectRef>
+          <a:fontRef idx="minor">
+            <a:schemeClr val="lt1"/>
+          </a:fontRef>
+        </p:style>
+        <p:txBody>
+          <a:bodyPr rtlCol="0" anchor="ctr"/>
+          <a:lstStyle/>
+          <a:p>
+            <a:pPr algn="ctr"/>
+            <a:r>
+              <a:rPr lang="en-US" dirty="0" smtClean="0"/>
+              <a:t>4/2016</a:t>
+            </a:r>
+            <a:endParaRPr lang="en-US" dirty="0"/>
+          </a:p>
+        </p:txBody>
+      </p:sp>
+      <p:sp>
+        <p:nvSpPr>
+          <p:cNvPr id="32" name="Rectangle 31"/>
+          <p:cNvSpPr/>
+          <p:nvPr/>
+        </p:nvSpPr>
+        <p:spPr>
+          <a:xfrm>
+            <a:off x="7921336" y="228600"/>
+            <a:ext cx="990600" cy="533400"/>
+          </a:xfrm>
+          <a:prstGeom prst="rect">
+            <a:avLst/>
+          </a:prstGeom>
+        </p:spPr>
+        <p:style>
+          <a:lnRef idx="2">
+            <a:schemeClr val="accent1">
+              <a:shade val="50000"/>
+            </a:schemeClr>
+          </a:lnRef>
+          <a:fillRef idx="1">
+            <a:schemeClr val="accent1"/>
+          </a:fillRef>
+          <a:effectRef idx="0">
+            <a:schemeClr val="accent1"/>
+          </a:effectRef>
+          <a:fontRef idx="minor">
+            <a:schemeClr val="lt1"/>
+          </a:fontRef>
+        </p:style>
+        <p:txBody>
+          <a:bodyPr rtlCol="0" anchor="ctr"/>
+          <a:lstStyle/>
+          <a:p>
+            <a:pPr algn="ctr"/>
+            <a:r>
+              <a:rPr lang="en-US" dirty="0" smtClean="0"/>
+              <a:t>5/2016</a:t>
+            </a:r>
+            <a:endParaRPr lang="en-US" dirty="0"/>
+          </a:p>
+        </p:txBody>
+      </p:sp>
+      <p:sp>
+        <p:nvSpPr>
+          <p:cNvPr id="38" name="Right Brace 37"/>
+          <p:cNvSpPr/>
+          <p:nvPr/>
+        </p:nvSpPr>
+        <p:spPr>
+          <a:xfrm rot="5400000">
+            <a:off x="4986482" y="2451388"/>
+            <a:ext cx="381000" cy="4876800"/>
+          </a:xfrm>
+          <a:prstGeom prst="rightBrace">
+            <a:avLst/>
+          </a:prstGeom>
+        </p:spPr>
+        <p:style>
+          <a:lnRef idx="1">
+            <a:schemeClr val="accent1"/>
+          </a:lnRef>
+          <a:fillRef idx="0">
+            <a:schemeClr val="accent1"/>
+          </a:fillRef>
+          <a:effectRef idx="0">
+            <a:schemeClr val="accent1"/>
+          </a:effectRef>
+          <a:fontRef idx="minor">
+            <a:schemeClr val="tx1"/>
+          </a:fontRef>
+        </p:style>
+        <p:txBody>
+          <a:bodyPr rtlCol="0" anchor="ctr"/>
+          <a:lstStyle/>
+          <a:p>
+            <a:pPr algn="ctr"/>
+            <a:endParaRPr lang="en-US"/>
+          </a:p>
+        </p:txBody>
+      </p:sp>
+      <p:sp>
+        <p:nvSpPr>
+          <p:cNvPr id="39" name="TextBox 38"/>
+          <p:cNvSpPr txBox="1"/>
+          <p:nvPr/>
+        </p:nvSpPr>
+        <p:spPr>
+          <a:xfrm>
+            <a:off x="2738582" y="5080289"/>
+            <a:ext cx="4876800" cy="369332"/>
+          </a:xfrm>
+          <a:prstGeom prst="rect">
+            <a:avLst/>
+          </a:prstGeom>
+          <a:noFill/>
+        </p:spPr>
+        <p:txBody>
+          <a:bodyPr wrap="square" rtlCol="0">
+            <a:spAutoFit/>
+          </a:bodyPr>
+          <a:lstStyle/>
+          <a:p>
+            <a:pPr algn="ctr"/>
+            <a:r>
+              <a:rPr lang="en-US" dirty="0" smtClean="0"/>
+              <a:t>quarter &amp; year weeks </a:t>
+            </a:r>
+            <a:endParaRPr lang="en-US" dirty="0"/>
+          </a:p>
+        </p:txBody>
+      </p:sp>
+      <p:cxnSp>
+        <p:nvCxnSpPr>
+          <p:cNvPr id="41" name="Straight Arrow Connector 40"/>
+          <p:cNvCxnSpPr>
+            <a:stCxn id="25" idx="0"/>
+            <a:endCxn id="7" idx="2"/>
+          </p:cNvCxnSpPr>
+          <p:nvPr/>
+        </p:nvCxnSpPr>
+        <p:spPr>
+          <a:xfrm flipV="1">
+            <a:off x="7120082" y="3571586"/>
+            <a:ext cx="0" cy="422564"/>
+          </a:xfrm>
+          <a:prstGeom prst="straightConnector1">
+            <a:avLst/>
+          </a:prstGeom>
+          <a:ln w="25400">
+            <a:tailEnd type="triangle"/>
+          </a:ln>
+        </p:spPr>
+        <p:style>
+          <a:lnRef idx="1">
+            <a:schemeClr val="accent1"/>
+          </a:lnRef>
+          <a:fillRef idx="0">
+            <a:schemeClr val="accent1"/>
+          </a:fillRef>
+          <a:effectRef idx="0">
+            <a:schemeClr val="accent1"/>
+          </a:effectRef>
+          <a:fontRef idx="minor">
+            <a:schemeClr val="tx1"/>
+          </a:fontRef>
+        </p:style>
+      </p:cxnSp>
+      <p:cxnSp>
+        <p:nvCxnSpPr>
+          <p:cNvPr id="43" name="Straight Arrow Connector 42"/>
+          <p:cNvCxnSpPr>
+            <a:stCxn id="7" idx="0"/>
+            <a:endCxn id="13" idx="2"/>
+          </p:cNvCxnSpPr>
+          <p:nvPr/>
+        </p:nvCxnSpPr>
+        <p:spPr>
+          <a:xfrm flipV="1">
+            <a:off x="7120082" y="2657186"/>
+            <a:ext cx="4618" cy="381000"/>
+          </a:xfrm>
+          <a:prstGeom prst="straightConnector1">
+            <a:avLst/>
+          </a:prstGeom>
+          <a:ln w="25400">
+            <a:tailEnd type="triangle"/>
+          </a:ln>
+        </p:spPr>
+        <p:style>
+          <a:lnRef idx="1">
+            <a:schemeClr val="accent1"/>
+          </a:lnRef>
+          <a:fillRef idx="0">
+            <a:schemeClr val="accent1"/>
+          </a:fillRef>
+          <a:effectRef idx="0">
+            <a:schemeClr val="accent1"/>
+          </a:effectRef>
+          <a:fontRef idx="minor">
+            <a:schemeClr val="tx1"/>
+          </a:fontRef>
+        </p:style>
+      </p:cxnSp>
+      <p:cxnSp>
+        <p:nvCxnSpPr>
+          <p:cNvPr id="45" name="Straight Arrow Connector 44"/>
+          <p:cNvCxnSpPr>
+            <a:stCxn id="13" idx="0"/>
+            <a:endCxn id="19" idx="2"/>
+          </p:cNvCxnSpPr>
+          <p:nvPr/>
+        </p:nvCxnSpPr>
+        <p:spPr>
+          <a:xfrm flipH="1" flipV="1">
+            <a:off x="7120082" y="1719984"/>
+            <a:ext cx="4618" cy="403802"/>
+          </a:xfrm>
+          <a:prstGeom prst="straightConnector1">
+            <a:avLst/>
+          </a:prstGeom>
+          <a:ln w="25400">
+            <a:tailEnd type="triangle"/>
+          </a:ln>
+        </p:spPr>
+        <p:style>
+          <a:lnRef idx="1">
+            <a:schemeClr val="accent1"/>
+          </a:lnRef>
+          <a:fillRef idx="0">
+            <a:schemeClr val="accent1"/>
+          </a:fillRef>
+          <a:effectRef idx="0">
+            <a:schemeClr val="accent1"/>
+          </a:effectRef>
+          <a:fontRef idx="minor">
+            <a:schemeClr val="tx1"/>
+          </a:fontRef>
+        </p:style>
+      </p:cxnSp>
+      <p:cxnSp>
+        <p:nvCxnSpPr>
+          <p:cNvPr id="47" name="Straight Arrow Connector 46"/>
+          <p:cNvCxnSpPr>
+            <a:stCxn id="19" idx="0"/>
+            <a:endCxn id="31" idx="2"/>
+          </p:cNvCxnSpPr>
+          <p:nvPr/>
+        </p:nvCxnSpPr>
+        <p:spPr>
+          <a:xfrm flipV="1">
+            <a:off x="7120082" y="762000"/>
+            <a:ext cx="4618" cy="424584"/>
+          </a:xfrm>
+          <a:prstGeom prst="straightConnector1">
+            <a:avLst/>
+          </a:prstGeom>
+          <a:ln w="25400">
             <a:tailEnd type="triangle"/>
           </a:ln>
         </p:spPr>
@@ -11975,7 +13630,10 @@
           <a:prstGeom prst="straightConnector1">
             <a:avLst/>
           </a:prstGeom>
-          <a:ln>
+          <a:ln w="28575">
+            <a:solidFill>
+              <a:srgbClr val="FF0000"/>
+            </a:solidFill>
             <a:tailEnd type="triangle"/>
           </a:ln>
         </p:spPr>
@@ -12011,7 +13669,10 @@
           <a:prstGeom prst="straightConnector1">
             <a:avLst/>
           </a:prstGeom>
-          <a:ln>
+          <a:ln w="28575">
+            <a:solidFill>
+              <a:srgbClr val="FF0000"/>
+            </a:solidFill>
             <a:tailEnd type="triangle"/>
           </a:ln>
         </p:spPr>
@@ -12047,7 +13708,10 @@
           <a:prstGeom prst="straightConnector1">
             <a:avLst/>
           </a:prstGeom>
-          <a:ln>
+          <a:ln w="28575">
+            <a:solidFill>
+              <a:srgbClr val="FF0000"/>
+            </a:solidFill>
             <a:tailEnd type="triangle"/>
           </a:ln>
         </p:spPr>
@@ -12083,7 +13747,10 @@
           <a:prstGeom prst="straightConnector1">
             <a:avLst/>
           </a:prstGeom>
-          <a:ln>
+          <a:ln w="28575">
+            <a:solidFill>
+              <a:srgbClr val="FF0000"/>
+            </a:solidFill>
             <a:tailEnd type="triangle"/>
           </a:ln>
         </p:spPr>
@@ -12119,7 +13786,10 @@
           <a:prstGeom prst="straightConnector1">
             <a:avLst/>
           </a:prstGeom>
-          <a:ln>
+          <a:ln w="28575">
+            <a:solidFill>
+              <a:srgbClr val="FF0000"/>
+            </a:solidFill>
             <a:tailEnd type="triangle"/>
           </a:ln>
         </p:spPr>
@@ -12212,7 +13882,7 @@
     </p:spTree>
     <p:extLst>
       <p:ext uri="{BB962C8B-B14F-4D97-AF65-F5344CB8AC3E}">
-        <p14:creationId xmlns:p14="http://schemas.microsoft.com/office/powerpoint/2010/main" val="294220895"/>
+        <p14:creationId xmlns:p14="http://schemas.microsoft.com/office/powerpoint/2010/main" val="4074299455"/>
       </p:ext>
     </p:extLst>
   </p:cSld>

</xml_diff>

<commit_message>
Modified service fabric post
</commit_message>
<xml_diff>
--- a/illustrations/illustrations.pptx
+++ b/illustrations/illustrations.pptx
@@ -238,7 +238,7 @@
             <a:fld id="{1C54B592-DDDB-4FBB-91F2-233647701935}" type="datetimeFigureOut">
               <a:rPr lang="en-US" smtClean="0"/>
               <a:pPr/>
-              <a:t>2/3/2016</a:t>
+              <a:t>2/6/2016</a:t>
             </a:fld>
             <a:endParaRPr lang="en-US" dirty="0"/>
           </a:p>
@@ -796,7 +796,7 @@
           <a:p>
             <a:fld id="{C7AE018C-EBF3-4294-9E53-BB9692A1B238}" type="datetime1">
               <a:rPr lang="en-US" smtClean="0"/>
-              <a:t>2/3/2016</a:t>
+              <a:t>2/6/2016</a:t>
             </a:fld>
             <a:endParaRPr lang="en-US" dirty="0"/>
           </a:p>
@@ -952,7 +952,7 @@
           <a:p>
             <a:fld id="{AC5D3C69-66A1-4D00-B513-42CC0FCC59B6}" type="datetime1">
               <a:rPr lang="en-US" smtClean="0"/>
-              <a:t>2/3/2016</a:t>
+              <a:t>2/6/2016</a:t>
             </a:fld>
             <a:endParaRPr lang="en-US" dirty="0"/>
           </a:p>
@@ -1048,7 +1048,7 @@
           <a:p>
             <a:fld id="{DF081C4C-367B-4CA1-BFE5-DD5EF40A8C1E}" type="datetime1">
               <a:rPr lang="en-US" smtClean="0"/>
-              <a:t>2/3/2016</a:t>
+              <a:t>2/6/2016</a:t>
             </a:fld>
             <a:endParaRPr lang="en-US" dirty="0"/>
           </a:p>
@@ -1338,7 +1338,7 @@
           <a:p>
             <a:fld id="{7284FD7A-D0F1-4BFD-9AB1-D45A3214561B}" type="datetime1">
               <a:rPr lang="en-US" smtClean="0"/>
-              <a:t>2/3/2016</a:t>
+              <a:t>2/6/2016</a:t>
             </a:fld>
             <a:endParaRPr lang="en-US" dirty="0"/>
           </a:p>
@@ -1635,7 +1635,7 @@
           <a:p>
             <a:fld id="{7C1E8470-7002-4B16-912E-F3381BBFC303}" type="datetime1">
               <a:rPr lang="en-US" smtClean="0"/>
-              <a:t>2/3/2016</a:t>
+              <a:t>2/6/2016</a:t>
             </a:fld>
             <a:endParaRPr lang="en-US" dirty="0"/>
           </a:p>
@@ -2066,7 +2066,7 @@
           <a:p>
             <a:fld id="{2668835A-C4A1-487E-A7B8-3E3B6A85266C}" type="datetime1">
               <a:rPr lang="en-US" smtClean="0"/>
-              <a:t>2/3/2016</a:t>
+              <a:t>2/6/2016</a:t>
             </a:fld>
             <a:endParaRPr lang="en-US" dirty="0"/>
           </a:p>
@@ -2162,7 +2162,7 @@
           <a:p>
             <a:fld id="{83E71AAB-E703-47FE-974E-9D2B932F9534}" type="datetime1">
               <a:rPr lang="en-US" smtClean="0"/>
-              <a:t>2/3/2016</a:t>
+              <a:t>2/6/2016</a:t>
             </a:fld>
             <a:endParaRPr lang="en-US" dirty="0"/>
           </a:p>
@@ -2348,7 +2348,7 @@
           <a:p>
             <a:fld id="{C6C74358-98AB-4C1A-82FF-49E7FEE02080}" type="datetime1">
               <a:rPr lang="en-US" smtClean="0"/>
-              <a:t>2/3/2016</a:t>
+              <a:t>2/6/2016</a:t>
             </a:fld>
             <a:endParaRPr lang="en-US" dirty="0"/>
           </a:p>
@@ -13193,13 +13193,13 @@
       </p:sp>
       <p:sp>
         <p:nvSpPr>
-          <p:cNvPr id="6" name="Rectangle 5"/>
+          <p:cNvPr id="7" name="Rectangle 6"/>
           <p:cNvSpPr/>
           <p:nvPr/>
         </p:nvSpPr>
         <p:spPr>
           <a:xfrm>
-            <a:off x="1295400" y="2895599"/>
+            <a:off x="5119255" y="2895599"/>
             <a:ext cx="1905000" cy="762000"/>
           </a:xfrm>
           <a:prstGeom prst="rect">
@@ -13229,57 +13229,6 @@
             <a:pPr algn="ctr"/>
             <a:r>
               <a:rPr lang="en-US" dirty="0" smtClean="0"/>
-              <a:t>Entity Service</a:t>
-            </a:r>
-          </a:p>
-          <a:p>
-            <a:pPr algn="ctr"/>
-            <a:r>
-              <a:rPr lang="en-US" sz="1050" dirty="0" smtClean="0"/>
-              <a:t>Caching</a:t>
-            </a:r>
-            <a:endParaRPr lang="en-US" sz="1050" dirty="0"/>
-          </a:p>
-        </p:txBody>
-      </p:sp>
-      <p:sp>
-        <p:nvSpPr>
-          <p:cNvPr id="7" name="Rectangle 6"/>
-          <p:cNvSpPr/>
-          <p:nvPr/>
-        </p:nvSpPr>
-        <p:spPr>
-          <a:xfrm>
-            <a:off x="5119255" y="2895599"/>
-            <a:ext cx="1905000" cy="762000"/>
-          </a:xfrm>
-          <a:prstGeom prst="rect">
-            <a:avLst/>
-          </a:prstGeom>
-        </p:spPr>
-        <p:style>
-          <a:lnRef idx="2">
-            <a:schemeClr val="accent3">
-              <a:shade val="50000"/>
-            </a:schemeClr>
-          </a:lnRef>
-          <a:fillRef idx="1">
-            <a:schemeClr val="accent3"/>
-          </a:fillRef>
-          <a:effectRef idx="0">
-            <a:schemeClr val="accent3"/>
-          </a:effectRef>
-          <a:fontRef idx="minor">
-            <a:schemeClr val="lt1"/>
-          </a:fontRef>
-        </p:style>
-        <p:txBody>
-          <a:bodyPr rtlCol="0" anchor="ctr"/>
-          <a:lstStyle/>
-          <a:p>
-            <a:pPr algn="ctr"/>
-            <a:r>
-              <a:rPr lang="en-US" dirty="0" smtClean="0"/>
               <a:t>Enqueuer Service</a:t>
             </a:r>
           </a:p>
@@ -13440,48 +13389,16 @@
             <a:pPr algn="ctr"/>
             <a:r>
               <a:rPr lang="en-US" sz="1050" dirty="0" smtClean="0"/>
-              <a:t>Forward Week</a:t>
+              <a:t>Forward </a:t>
+            </a:r>
+            <a:r>
+              <a:rPr lang="en-US" sz="1050" dirty="0" smtClean="0"/>
+              <a:t>Period</a:t>
             </a:r>
             <a:endParaRPr lang="en-US" sz="1050" dirty="0"/>
           </a:p>
         </p:txBody>
       </p:sp>
-      <p:cxnSp>
-        <p:nvCxnSpPr>
-          <p:cNvPr id="14" name="Curved Connector 13"/>
-          <p:cNvCxnSpPr>
-            <a:stCxn id="8" idx="1"/>
-            <a:endCxn id="6" idx="2"/>
-          </p:cNvCxnSpPr>
-          <p:nvPr/>
-        </p:nvCxnSpPr>
-        <p:spPr>
-          <a:xfrm rot="10800000">
-            <a:off x="2247901" y="3657599"/>
-            <a:ext cx="3176155" cy="1371600"/>
-          </a:xfrm>
-          <a:prstGeom prst="curvedConnector2">
-            <a:avLst/>
-          </a:prstGeom>
-          <a:ln>
-            <a:tailEnd type="triangle"/>
-          </a:ln>
-        </p:spPr>
-        <p:style>
-          <a:lnRef idx="1">
-            <a:schemeClr val="accent1"/>
-          </a:lnRef>
-          <a:fillRef idx="0">
-            <a:schemeClr val="accent1"/>
-          </a:fillRef>
-          <a:effectRef idx="0">
-            <a:schemeClr val="accent1"/>
-          </a:effectRef>
-          <a:fontRef idx="minor">
-            <a:schemeClr val="tx1"/>
-          </a:fontRef>
-        </p:style>
-      </p:cxnSp>
       <p:cxnSp>
         <p:nvCxnSpPr>
           <p:cNvPr id="16" name="Curved Connector 15"/>
@@ -13634,7 +13551,6 @@
           <p:cNvPr id="24" name="Elbow Connector 23"/>
           <p:cNvCxnSpPr>
             <a:stCxn id="3" idx="1"/>
-            <a:endCxn id="6" idx="0"/>
           </p:cNvCxnSpPr>
           <p:nvPr/>
         </p:nvCxnSpPr>
@@ -13828,37 +13744,6 @@
       </p:sp>
       <p:sp>
         <p:nvSpPr>
-          <p:cNvPr id="32" name="TextBox 31"/>
-          <p:cNvSpPr txBox="1"/>
-          <p:nvPr/>
-        </p:nvSpPr>
-        <p:spPr>
-          <a:xfrm>
-            <a:off x="2908302" y="4523600"/>
-            <a:ext cx="990600" cy="276999"/>
-          </a:xfrm>
-          <a:prstGeom prst="rect">
-            <a:avLst/>
-          </a:prstGeom>
-          <a:noFill/>
-        </p:spPr>
-        <p:txBody>
-          <a:bodyPr wrap="square" rtlCol="0">
-            <a:spAutoFit/>
-          </a:bodyPr>
-          <a:lstStyle/>
-          <a:p>
-            <a:pPr algn="ctr"/>
-            <a:r>
-              <a:rPr lang="en-US" sz="1200" dirty="0" smtClean="0"/>
-              <a:t>Cache</a:t>
-            </a:r>
-            <a:endParaRPr lang="en-US" sz="1200" dirty="0"/>
-          </a:p>
-        </p:txBody>
-      </p:sp>
-      <p:sp>
-        <p:nvSpPr>
           <p:cNvPr id="33" name="TextBox 32"/>
           <p:cNvSpPr txBox="1"/>
           <p:nvPr/>
@@ -14022,6 +13907,122 @@
             <a:r>
               <a:rPr lang="en-US" sz="1200" dirty="0" smtClean="0"/>
               <a:t>API Posts</a:t>
+            </a:r>
+            <a:endParaRPr lang="en-US" sz="1200" dirty="0"/>
+          </a:p>
+        </p:txBody>
+      </p:sp>
+      <p:sp>
+        <p:nvSpPr>
+          <p:cNvPr id="35" name="Rectangle 34"/>
+          <p:cNvSpPr/>
+          <p:nvPr/>
+        </p:nvSpPr>
+        <p:spPr>
+          <a:xfrm>
+            <a:off x="1676401" y="4611254"/>
+            <a:ext cx="1295400" cy="762000"/>
+          </a:xfrm>
+          <a:prstGeom prst="rect">
+            <a:avLst/>
+          </a:prstGeom>
+        </p:spPr>
+        <p:style>
+          <a:lnRef idx="2">
+            <a:schemeClr val="accent6">
+              <a:shade val="50000"/>
+            </a:schemeClr>
+          </a:lnRef>
+          <a:fillRef idx="1">
+            <a:schemeClr val="accent6"/>
+          </a:fillRef>
+          <a:effectRef idx="0">
+            <a:schemeClr val="accent6"/>
+          </a:effectRef>
+          <a:fontRef idx="minor">
+            <a:schemeClr val="lt1"/>
+          </a:fontRef>
+        </p:style>
+        <p:txBody>
+          <a:bodyPr rtlCol="0" anchor="ctr"/>
+          <a:lstStyle/>
+          <a:p>
+            <a:pPr algn="ctr"/>
+            <a:r>
+              <a:rPr lang="en-US" dirty="0" smtClean="0"/>
+              <a:t>Hierarchical </a:t>
+            </a:r>
+            <a:r>
+              <a:rPr lang="en-US" dirty="0" smtClean="0"/>
+              <a:t>Actor</a:t>
+            </a:r>
+          </a:p>
+          <a:p>
+            <a:pPr algn="ctr"/>
+            <a:endParaRPr lang="en-US" sz="1050" dirty="0"/>
+          </a:p>
+        </p:txBody>
+      </p:sp>
+      <p:sp>
+        <p:nvSpPr>
+          <p:cNvPr id="36" name="TextBox 35"/>
+          <p:cNvSpPr txBox="1"/>
+          <p:nvPr/>
+        </p:nvSpPr>
+        <p:spPr>
+          <a:xfrm>
+            <a:off x="1034474" y="5488803"/>
+            <a:ext cx="2792845" cy="276999"/>
+          </a:xfrm>
+          <a:prstGeom prst="rect">
+            <a:avLst/>
+          </a:prstGeom>
+          <a:noFill/>
+        </p:spPr>
+        <p:txBody>
+          <a:bodyPr wrap="square" rtlCol="0">
+            <a:spAutoFit/>
+          </a:bodyPr>
+          <a:lstStyle/>
+          <a:p>
+            <a:r>
+              <a:rPr lang="en-US" sz="1200" dirty="0" smtClean="0"/>
+              <a:t>Serves as entities and periods state store</a:t>
+            </a:r>
+            <a:endParaRPr lang="en-US" sz="1200" dirty="0"/>
+          </a:p>
+        </p:txBody>
+      </p:sp>
+      <p:sp>
+        <p:nvSpPr>
+          <p:cNvPr id="37" name="TextBox 36"/>
+          <p:cNvSpPr txBox="1"/>
+          <p:nvPr/>
+        </p:nvSpPr>
+        <p:spPr>
+          <a:xfrm>
+            <a:off x="685800" y="2935069"/>
+            <a:ext cx="3048000" cy="646331"/>
+          </a:xfrm>
+          <a:prstGeom prst="rect">
+            <a:avLst/>
+          </a:prstGeom>
+          <a:noFill/>
+          <a:ln>
+            <a:solidFill>
+              <a:schemeClr val="accent1"/>
+            </a:solidFill>
+          </a:ln>
+        </p:spPr>
+        <p:txBody>
+          <a:bodyPr wrap="square" rtlCol="0">
+            <a:spAutoFit/>
+          </a:bodyPr>
+          <a:lstStyle/>
+          <a:p>
+            <a:r>
+              <a:rPr lang="en-US" sz="1200" dirty="0" smtClean="0"/>
+              <a:t>Activates the required entity actor, its parent and its children and aggregate their state into a response</a:t>
             </a:r>
             <a:endParaRPr lang="en-US" sz="1200" dirty="0"/>
           </a:p>

</xml_diff>

<commit_message>
Added a first post about Service Fabric
</commit_message>
<xml_diff>
--- a/illustrations/illustrations.pptx
+++ b/illustrations/illustrations.pptx
@@ -5,7 +5,7 @@
     <p:sldMasterId id="2147483648" r:id="rId1"/>
   </p:sldMasterIdLst>
   <p:notesMasterIdLst>
-    <p:notesMasterId r:id="rId17"/>
+    <p:notesMasterId r:id="rId18"/>
   </p:notesMasterIdLst>
   <p:sldIdLst>
     <p:sldId id="574" r:id="rId2"/>
@@ -23,6 +23,7 @@
     <p:sldId id="586" r:id="rId14"/>
     <p:sldId id="587" r:id="rId15"/>
     <p:sldId id="588" r:id="rId16"/>
+    <p:sldId id="589" r:id="rId17"/>
   </p:sldIdLst>
   <p:sldSz cx="9144000" cy="6858000" type="screen4x3"/>
   <p:notesSz cx="6858000" cy="9144000"/>
@@ -1977,22 +1978,22 @@
     </dgm:pt>
   </dgm:ptLst>
   <dgm:cxnLst>
+    <dgm:cxn modelId="{6F36FE41-029D-49FF-83B1-373D29A2262C}" type="presOf" srcId="{B1C23AF6-BE31-4914-818C-D393C108EC10}" destId="{37BA5629-FAFC-412A-90CD-731215C7A978}" srcOrd="0" destOrd="0" presId="urn:microsoft.com/office/officeart/2005/8/layout/process4"/>
+    <dgm:cxn modelId="{5FD16841-95BF-4B41-A4E7-AE6413BC0FB4}" srcId="{DEFEEA8C-B625-46EB-80FD-8036FD4F5303}" destId="{66C197CC-BD55-4780-96DB-FFC14484B6F4}" srcOrd="0" destOrd="0" parTransId="{4B100D52-6AC8-4E7A-B2E0-9BE05AA4D77F}" sibTransId="{5BC94DCE-9E38-44EB-9E41-46759D062B81}"/>
+    <dgm:cxn modelId="{8960B50A-8489-4BB3-ADB4-23568788FC4A}" type="presOf" srcId="{AF5DDCCF-7B53-4A4C-B16E-39CF90B0B9F2}" destId="{5392887C-2905-4E40-8FF8-A9BCA74D5336}" srcOrd="0" destOrd="0" presId="urn:microsoft.com/office/officeart/2005/8/layout/process4"/>
+    <dgm:cxn modelId="{3727209C-D399-49BA-975D-34906BF26614}" type="presOf" srcId="{D67728B6-92E8-4009-AF69-2D48B766590A}" destId="{D0E5A419-A8C3-4EF2-B67D-F59D92AFFF5C}" srcOrd="0" destOrd="0" presId="urn:microsoft.com/office/officeart/2005/8/layout/process4"/>
+    <dgm:cxn modelId="{B7A6575D-38FD-4DB9-804B-6161B9C31898}" type="presOf" srcId="{DEFEEA8C-B625-46EB-80FD-8036FD4F5303}" destId="{6BB44E00-F442-4F25-9FE5-5B179876D08F}" srcOrd="0" destOrd="0" presId="urn:microsoft.com/office/officeart/2005/8/layout/process4"/>
     <dgm:cxn modelId="{A09F15EC-1400-4F16-9959-003918DF7A7E}" type="presOf" srcId="{BCACD718-32BE-45F5-A691-B9EE3D302E1E}" destId="{698DB033-4727-4E3C-BCFC-6EC35C5DF62E}" srcOrd="0" destOrd="0" presId="urn:microsoft.com/office/officeart/2005/8/layout/process4"/>
+    <dgm:cxn modelId="{FABF78A1-B7CE-4C9C-99A2-14A03F8BCD47}" type="presOf" srcId="{66C197CC-BD55-4780-96DB-FFC14484B6F4}" destId="{54A6DB46-4E13-4153-BD8C-D6279691D80C}" srcOrd="0" destOrd="0" presId="urn:microsoft.com/office/officeart/2005/8/layout/process4"/>
+    <dgm:cxn modelId="{EB4A50D6-95CB-4D43-A4F7-D35E4A73B5D4}" srcId="{F99380A9-B668-449B-920D-51F879F1D912}" destId="{DEFEEA8C-B625-46EB-80FD-8036FD4F5303}" srcOrd="2" destOrd="0" parTransId="{EDBDE7BE-D6D0-4703-A2B0-226A24124F33}" sibTransId="{8C34E643-4E2F-427D-B1B8-4EF161F3BA87}"/>
+    <dgm:cxn modelId="{2C0F271A-9DC3-4874-8512-544D4DA2466A}" srcId="{BCACD718-32BE-45F5-A691-B9EE3D302E1E}" destId="{B1C23AF6-BE31-4914-818C-D393C108EC10}" srcOrd="0" destOrd="0" parTransId="{C223CFEE-25DD-43D7-A029-7F94691B435F}" sibTransId="{7E469D0A-54AF-4D30-9C2F-77F6AC72E6D1}"/>
+    <dgm:cxn modelId="{E42AB08B-CCF6-485D-B438-83FFAEE130A0}" type="presOf" srcId="{AF5DDCCF-7B53-4A4C-B16E-39CF90B0B9F2}" destId="{99145A6D-7000-4445-B530-229FB8F1789A}" srcOrd="1" destOrd="0" presId="urn:microsoft.com/office/officeart/2005/8/layout/process4"/>
+    <dgm:cxn modelId="{EDD64CC0-B960-4961-A8CA-E2C259E9C0C3}" type="presOf" srcId="{DEFEEA8C-B625-46EB-80FD-8036FD4F5303}" destId="{9631F43F-71D5-439A-86EB-4907586BC29B}" srcOrd="1" destOrd="0" presId="urn:microsoft.com/office/officeart/2005/8/layout/process4"/>
     <dgm:cxn modelId="{4BB6292B-DD56-48D3-9197-BBA14AF5C9A7}" srcId="{F99380A9-B668-449B-920D-51F879F1D912}" destId="{BCACD718-32BE-45F5-A691-B9EE3D302E1E}" srcOrd="1" destOrd="0" parTransId="{24AA74BD-90C3-4800-A1A3-D270A267950D}" sibTransId="{499878E2-56A0-48DF-8DFC-116485555A64}"/>
-    <dgm:cxn modelId="{E42AB08B-CCF6-485D-B438-83FFAEE130A0}" type="presOf" srcId="{AF5DDCCF-7B53-4A4C-B16E-39CF90B0B9F2}" destId="{99145A6D-7000-4445-B530-229FB8F1789A}" srcOrd="1" destOrd="0" presId="urn:microsoft.com/office/officeart/2005/8/layout/process4"/>
-    <dgm:cxn modelId="{B7A6575D-38FD-4DB9-804B-6161B9C31898}" type="presOf" srcId="{DEFEEA8C-B625-46EB-80FD-8036FD4F5303}" destId="{6BB44E00-F442-4F25-9FE5-5B179876D08F}" srcOrd="0" destOrd="0" presId="urn:microsoft.com/office/officeart/2005/8/layout/process4"/>
-    <dgm:cxn modelId="{6F36FE41-029D-49FF-83B1-373D29A2262C}" type="presOf" srcId="{B1C23AF6-BE31-4914-818C-D393C108EC10}" destId="{37BA5629-FAFC-412A-90CD-731215C7A978}" srcOrd="0" destOrd="0" presId="urn:microsoft.com/office/officeart/2005/8/layout/process4"/>
-    <dgm:cxn modelId="{60284354-1283-4E49-8A2A-6BDAF10A67EC}" type="presOf" srcId="{BCACD718-32BE-45F5-A691-B9EE3D302E1E}" destId="{BF6C8519-5E48-48CB-BE06-DDDDCA6D630D}" srcOrd="1" destOrd="0" presId="urn:microsoft.com/office/officeart/2005/8/layout/process4"/>
-    <dgm:cxn modelId="{2C0F271A-9DC3-4874-8512-544D4DA2466A}" srcId="{BCACD718-32BE-45F5-A691-B9EE3D302E1E}" destId="{B1C23AF6-BE31-4914-818C-D393C108EC10}" srcOrd="0" destOrd="0" parTransId="{C223CFEE-25DD-43D7-A029-7F94691B435F}" sibTransId="{7E469D0A-54AF-4D30-9C2F-77F6AC72E6D1}"/>
-    <dgm:cxn modelId="{EDD64CC0-B960-4961-A8CA-E2C259E9C0C3}" type="presOf" srcId="{DEFEEA8C-B625-46EB-80FD-8036FD4F5303}" destId="{9631F43F-71D5-439A-86EB-4907586BC29B}" srcOrd="1" destOrd="0" presId="urn:microsoft.com/office/officeart/2005/8/layout/process4"/>
-    <dgm:cxn modelId="{3727209C-D399-49BA-975D-34906BF26614}" type="presOf" srcId="{D67728B6-92E8-4009-AF69-2D48B766590A}" destId="{D0E5A419-A8C3-4EF2-B67D-F59D92AFFF5C}" srcOrd="0" destOrd="0" presId="urn:microsoft.com/office/officeart/2005/8/layout/process4"/>
-    <dgm:cxn modelId="{FABF78A1-B7CE-4C9C-99A2-14A03F8BCD47}" type="presOf" srcId="{66C197CC-BD55-4780-96DB-FFC14484B6F4}" destId="{54A6DB46-4E13-4153-BD8C-D6279691D80C}" srcOrd="0" destOrd="0" presId="urn:microsoft.com/office/officeart/2005/8/layout/process4"/>
-    <dgm:cxn modelId="{8960B50A-8489-4BB3-ADB4-23568788FC4A}" type="presOf" srcId="{AF5DDCCF-7B53-4A4C-B16E-39CF90B0B9F2}" destId="{5392887C-2905-4E40-8FF8-A9BCA74D5336}" srcOrd="0" destOrd="0" presId="urn:microsoft.com/office/officeart/2005/8/layout/process4"/>
-    <dgm:cxn modelId="{5FD16841-95BF-4B41-A4E7-AE6413BC0FB4}" srcId="{DEFEEA8C-B625-46EB-80FD-8036FD4F5303}" destId="{66C197CC-BD55-4780-96DB-FFC14484B6F4}" srcOrd="0" destOrd="0" parTransId="{4B100D52-6AC8-4E7A-B2E0-9BE05AA4D77F}" sibTransId="{5BC94DCE-9E38-44EB-9E41-46759D062B81}"/>
-    <dgm:cxn modelId="{8A78FD57-467D-48C8-A90D-A3736DD1D8A7}" type="presOf" srcId="{F99380A9-B668-449B-920D-51F879F1D912}" destId="{42A4C1D8-DA21-497B-AD89-C3F1BD36FC1F}" srcOrd="0" destOrd="0" presId="urn:microsoft.com/office/officeart/2005/8/layout/process4"/>
     <dgm:cxn modelId="{51035011-0488-4BE7-A87A-2C3725D7D1F3}" srcId="{AF5DDCCF-7B53-4A4C-B16E-39CF90B0B9F2}" destId="{D67728B6-92E8-4009-AF69-2D48B766590A}" srcOrd="0" destOrd="0" parTransId="{9CAA8F85-7896-4A6C-95BD-5F459416FE75}" sibTransId="{37B92E8C-6F31-4F44-83F6-FAA9B09C5FE2}"/>
     <dgm:cxn modelId="{048A2377-7277-4D45-94BD-550681A57AB6}" srcId="{F99380A9-B668-449B-920D-51F879F1D912}" destId="{AF5DDCCF-7B53-4A4C-B16E-39CF90B0B9F2}" srcOrd="0" destOrd="0" parTransId="{8C8E70BC-9E4D-4023-A47E-827D82FC4EDA}" sibTransId="{7C380EF4-200F-4795-B540-E1B1F36C0852}"/>
-    <dgm:cxn modelId="{EB4A50D6-95CB-4D43-A4F7-D35E4A73B5D4}" srcId="{F99380A9-B668-449B-920D-51F879F1D912}" destId="{DEFEEA8C-B625-46EB-80FD-8036FD4F5303}" srcOrd="2" destOrd="0" parTransId="{EDBDE7BE-D6D0-4703-A2B0-226A24124F33}" sibTransId="{8C34E643-4E2F-427D-B1B8-4EF161F3BA87}"/>
+    <dgm:cxn modelId="{8A78FD57-467D-48C8-A90D-A3736DD1D8A7}" type="presOf" srcId="{F99380A9-B668-449B-920D-51F879F1D912}" destId="{42A4C1D8-DA21-497B-AD89-C3F1BD36FC1F}" srcOrd="0" destOrd="0" presId="urn:microsoft.com/office/officeart/2005/8/layout/process4"/>
+    <dgm:cxn modelId="{60284354-1283-4E49-8A2A-6BDAF10A67EC}" type="presOf" srcId="{BCACD718-32BE-45F5-A691-B9EE3D302E1E}" destId="{BF6C8519-5E48-48CB-BE06-DDDDCA6D630D}" srcOrd="1" destOrd="0" presId="urn:microsoft.com/office/officeart/2005/8/layout/process4"/>
     <dgm:cxn modelId="{FF4C1400-1108-4DCE-9371-BE6F1C78C323}" type="presParOf" srcId="{42A4C1D8-DA21-497B-AD89-C3F1BD36FC1F}" destId="{AB831EBA-42C9-42E3-BE38-860137BBD197}" srcOrd="0" destOrd="0" presId="urn:microsoft.com/office/officeart/2005/8/layout/process4"/>
     <dgm:cxn modelId="{9D6C4966-9CCD-4422-B42E-DA5FBBF2378A}" type="presParOf" srcId="{AB831EBA-42C9-42E3-BE38-860137BBD197}" destId="{6BB44E00-F442-4F25-9FE5-5B179876D08F}" srcOrd="0" destOrd="0" presId="urn:microsoft.com/office/officeart/2005/8/layout/process4"/>
     <dgm:cxn modelId="{6A4D93F8-7C42-4481-98C9-2F6A513766FF}" type="presParOf" srcId="{AB831EBA-42C9-42E3-BE38-860137BBD197}" destId="{9631F43F-71D5-439A-86EB-4907586BC29B}" srcOrd="1" destOrd="0" presId="urn:microsoft.com/office/officeart/2005/8/layout/process4"/>
@@ -2353,8 +2354,8 @@
     <dgm:cxn modelId="{5FD16841-95BF-4B41-A4E7-AE6413BC0FB4}" srcId="{DEFEEA8C-B625-46EB-80FD-8036FD4F5303}" destId="{66C197CC-BD55-4780-96DB-FFC14484B6F4}" srcOrd="0" destOrd="0" parTransId="{4B100D52-6AC8-4E7A-B2E0-9BE05AA4D77F}" sibTransId="{5BC94DCE-9E38-44EB-9E41-46759D062B81}"/>
     <dgm:cxn modelId="{B7A6575D-38FD-4DB9-804B-6161B9C31898}" type="presOf" srcId="{DEFEEA8C-B625-46EB-80FD-8036FD4F5303}" destId="{6BB44E00-F442-4F25-9FE5-5B179876D08F}" srcOrd="0" destOrd="0" presId="urn:microsoft.com/office/officeart/2005/8/layout/process4"/>
     <dgm:cxn modelId="{3727209C-D399-49BA-975D-34906BF26614}" type="presOf" srcId="{D67728B6-92E8-4009-AF69-2D48B766590A}" destId="{D0E5A419-A8C3-4EF2-B67D-F59D92AFFF5C}" srcOrd="0" destOrd="0" presId="urn:microsoft.com/office/officeart/2005/8/layout/process4"/>
+    <dgm:cxn modelId="{A09F15EC-1400-4F16-9959-003918DF7A7E}" type="presOf" srcId="{BCACD718-32BE-45F5-A691-B9EE3D302E1E}" destId="{698DB033-4727-4E3C-BCFC-6EC35C5DF62E}" srcOrd="0" destOrd="0" presId="urn:microsoft.com/office/officeart/2005/8/layout/process4"/>
     <dgm:cxn modelId="{E42AB08B-CCF6-485D-B438-83FFAEE130A0}" type="presOf" srcId="{AF5DDCCF-7B53-4A4C-B16E-39CF90B0B9F2}" destId="{99145A6D-7000-4445-B530-229FB8F1789A}" srcOrd="1" destOrd="0" presId="urn:microsoft.com/office/officeart/2005/8/layout/process4"/>
-    <dgm:cxn modelId="{A09F15EC-1400-4F16-9959-003918DF7A7E}" type="presOf" srcId="{BCACD718-32BE-45F5-A691-B9EE3D302E1E}" destId="{698DB033-4727-4E3C-BCFC-6EC35C5DF62E}" srcOrd="0" destOrd="0" presId="urn:microsoft.com/office/officeart/2005/8/layout/process4"/>
     <dgm:cxn modelId="{60284354-1283-4E49-8A2A-6BDAF10A67EC}" type="presOf" srcId="{BCACD718-32BE-45F5-A691-B9EE3D302E1E}" destId="{BF6C8519-5E48-48CB-BE06-DDDDCA6D630D}" srcOrd="1" destOrd="0" presId="urn:microsoft.com/office/officeart/2005/8/layout/process4"/>
     <dgm:cxn modelId="{EDD64CC0-B960-4961-A8CA-E2C259E9C0C3}" type="presOf" srcId="{DEFEEA8C-B625-46EB-80FD-8036FD4F5303}" destId="{9631F43F-71D5-439A-86EB-4907586BC29B}" srcOrd="1" destOrd="0" presId="urn:microsoft.com/office/officeart/2005/8/layout/process4"/>
     <dgm:cxn modelId="{8A78FD57-467D-48C8-A90D-A3736DD1D8A7}" type="presOf" srcId="{F99380A9-B668-449B-920D-51F879F1D912}" destId="{42A4C1D8-DA21-497B-AD89-C3F1BD36FC1F}" srcOrd="0" destOrd="0" presId="urn:microsoft.com/office/officeart/2005/8/layout/process4"/>
@@ -6204,7 +6205,7 @@
             <a:fld id="{1C54B592-DDDB-4FBB-91F2-233647701935}" type="datetimeFigureOut">
               <a:rPr lang="en-US" smtClean="0"/>
               <a:pPr/>
-              <a:t>5/29/2016</a:t>
+              <a:t>12/5/2016</a:t>
             </a:fld>
             <a:endParaRPr lang="en-US" dirty="0"/>
           </a:p>
@@ -6759,7 +6760,7 @@
           <a:p>
             <a:fld id="{C7AE018C-EBF3-4294-9E53-BB9692A1B238}" type="datetime1">
               <a:rPr lang="en-US" smtClean="0"/>
-              <a:t>5/29/2016</a:t>
+              <a:t>12/5/2016</a:t>
             </a:fld>
             <a:endParaRPr lang="en-US" dirty="0"/>
           </a:p>
@@ -6914,7 +6915,7 @@
           <a:p>
             <a:fld id="{AC5D3C69-66A1-4D00-B513-42CC0FCC59B6}" type="datetime1">
               <a:rPr lang="en-US" smtClean="0"/>
-              <a:t>5/29/2016</a:t>
+              <a:t>12/5/2016</a:t>
             </a:fld>
             <a:endParaRPr lang="en-US" dirty="0"/>
           </a:p>
@@ -7010,7 +7011,7 @@
           <a:p>
             <a:fld id="{DF081C4C-367B-4CA1-BFE5-DD5EF40A8C1E}" type="datetime1">
               <a:rPr lang="en-US" smtClean="0"/>
-              <a:t>5/29/2016</a:t>
+              <a:t>12/5/2016</a:t>
             </a:fld>
             <a:endParaRPr lang="en-US" dirty="0"/>
           </a:p>
@@ -7298,7 +7299,7 @@
           <a:p>
             <a:fld id="{7284FD7A-D0F1-4BFD-9AB1-D45A3214561B}" type="datetime1">
               <a:rPr lang="en-US" smtClean="0"/>
-              <a:t>5/29/2016</a:t>
+              <a:t>12/5/2016</a:t>
             </a:fld>
             <a:endParaRPr lang="en-US" dirty="0"/>
           </a:p>
@@ -7592,7 +7593,7 @@
           <a:p>
             <a:fld id="{7C1E8470-7002-4B16-912E-F3381BBFC303}" type="datetime1">
               <a:rPr lang="en-US" smtClean="0"/>
-              <a:t>5/29/2016</a:t>
+              <a:t>12/5/2016</a:t>
             </a:fld>
             <a:endParaRPr lang="en-US" dirty="0"/>
           </a:p>
@@ -8020,7 +8021,7 @@
           <a:p>
             <a:fld id="{2668835A-C4A1-487E-A7B8-3E3B6A85266C}" type="datetime1">
               <a:rPr lang="en-US" smtClean="0"/>
-              <a:t>5/29/2016</a:t>
+              <a:t>12/5/2016</a:t>
             </a:fld>
             <a:endParaRPr lang="en-US" dirty="0"/>
           </a:p>
@@ -8116,7 +8117,7 @@
           <a:p>
             <a:fld id="{83E71AAB-E703-47FE-974E-9D2B932F9534}" type="datetime1">
               <a:rPr lang="en-US" smtClean="0"/>
-              <a:t>5/29/2016</a:t>
+              <a:t>12/5/2016</a:t>
             </a:fld>
             <a:endParaRPr lang="en-US" dirty="0"/>
           </a:p>
@@ -8301,7 +8302,7 @@
           <a:p>
             <a:fld id="{C6C74358-98AB-4C1A-82FF-49E7FEE02080}" type="datetime1">
               <a:rPr lang="en-US" smtClean="0"/>
-              <a:t>5/29/2016</a:t>
+              <a:t>12/5/2016</a:t>
             </a:fld>
             <a:endParaRPr lang="en-US" dirty="0"/>
           </a:p>
@@ -11155,7 +11156,7 @@
                   </a:extLst>
                 </a:gridCol>
               </a:tblGrid>
-              <a:tr h="294640">
+              <a:tr h="365760">
                 <a:tc>
                   <a:txBody>
                     <a:bodyPr/>
@@ -11209,6 +11210,1367 @@
                   </a:extLst>
                 </a:gridCol>
               </a:tblGrid>
+              <a:tr h="365760">
+                <a:tc>
+                  <a:txBody>
+                    <a:bodyPr/>
+                    <a:lstStyle/>
+                    <a:p>
+                      <a:r>
+                        <a:rPr lang="en-US" dirty="0"/>
+                        <a:t>1</a:t>
+                      </a:r>
+                    </a:p>
+                  </a:txBody>
+                  <a:tcPr/>
+                </a:tc>
+                <a:extLst>
+                  <a:ext uri="{0D108BD9-81ED-4DB2-BD59-A6C34878D82A}">
+                    <a16:rowId xmlns:a16="http://schemas.microsoft.com/office/drawing/2014/main" val="1705318490"/>
+                  </a:ext>
+                </a:extLst>
+              </a:tr>
+            </a:tbl>
+          </a:graphicData>
+        </a:graphic>
+      </p:graphicFrame>
+      <p:sp>
+        <p:nvSpPr>
+          <p:cNvPr id="8" name="Rectangle 7"/>
+          <p:cNvSpPr/>
+          <p:nvPr/>
+        </p:nvSpPr>
+        <p:spPr>
+          <a:xfrm>
+            <a:off x="4325516" y="457200"/>
+            <a:ext cx="1447800" cy="1371600"/>
+          </a:xfrm>
+          <a:prstGeom prst="rect">
+            <a:avLst/>
+          </a:prstGeom>
+        </p:spPr>
+        <p:style>
+          <a:lnRef idx="1">
+            <a:schemeClr val="dk1"/>
+          </a:lnRef>
+          <a:fillRef idx="2">
+            <a:schemeClr val="dk1"/>
+          </a:fillRef>
+          <a:effectRef idx="1">
+            <a:schemeClr val="dk1"/>
+          </a:effectRef>
+          <a:fontRef idx="minor">
+            <a:schemeClr val="dk1"/>
+          </a:fontRef>
+        </p:style>
+        <p:txBody>
+          <a:bodyPr rtlCol="0" anchor="ctr"/>
+          <a:lstStyle/>
+          <a:p>
+            <a:pPr algn="ctr"/>
+            <a:r>
+              <a:rPr lang="en-US" dirty="0"/>
+              <a:t>DATA SCREEN LEVEL 2</a:t>
+            </a:r>
+          </a:p>
+        </p:txBody>
+      </p:sp>
+      <p:sp>
+        <p:nvSpPr>
+          <p:cNvPr id="9" name="Rectangle 8"/>
+          <p:cNvSpPr/>
+          <p:nvPr/>
+        </p:nvSpPr>
+        <p:spPr>
+          <a:xfrm>
+            <a:off x="6288832" y="457200"/>
+            <a:ext cx="1447800" cy="1371600"/>
+          </a:xfrm>
+          <a:prstGeom prst="rect">
+            <a:avLst/>
+          </a:prstGeom>
+        </p:spPr>
+        <p:style>
+          <a:lnRef idx="1">
+            <a:schemeClr val="dk1"/>
+          </a:lnRef>
+          <a:fillRef idx="2">
+            <a:schemeClr val="dk1"/>
+          </a:fillRef>
+          <a:effectRef idx="1">
+            <a:schemeClr val="dk1"/>
+          </a:effectRef>
+          <a:fontRef idx="minor">
+            <a:schemeClr val="dk1"/>
+          </a:fontRef>
+        </p:style>
+        <p:txBody>
+          <a:bodyPr rtlCol="0" anchor="ctr"/>
+          <a:lstStyle/>
+          <a:p>
+            <a:pPr algn="ctr"/>
+            <a:r>
+              <a:rPr lang="en-US" dirty="0"/>
+              <a:t>DATA SCREEN LEVEL 3</a:t>
+            </a:r>
+          </a:p>
+        </p:txBody>
+      </p:sp>
+      <p:graphicFrame>
+        <p:nvGraphicFramePr>
+          <p:cNvPr id="10" name="Table 9"/>
+          <p:cNvGraphicFramePr>
+            <a:graphicFrameLocks noGrp="1"/>
+          </p:cNvGraphicFramePr>
+          <p:nvPr>
+            <p:extLst>
+              <p:ext uri="{D42A27DB-BD31-4B8C-83A1-F6EECF244321}">
+                <p14:modId xmlns:p14="http://schemas.microsoft.com/office/powerpoint/2010/main" val="1457566905"/>
+              </p:ext>
+            </p:extLst>
+          </p:nvPr>
+        </p:nvGraphicFramePr>
+        <p:xfrm>
+          <a:off x="5345663" y="2563430"/>
+          <a:ext cx="1447800" cy="731520"/>
+        </p:xfrm>
+        <a:graphic>
+          <a:graphicData uri="http://schemas.openxmlformats.org/drawingml/2006/table">
+            <a:tbl>
+              <a:tblPr firstRow="1" bandRow="1">
+                <a:tableStyleId>{5C22544A-7EE6-4342-B048-85BDC9FD1C3A}</a:tableStyleId>
+              </a:tblPr>
+              <a:tblGrid>
+                <a:gridCol w="1447800">
+                  <a:extLst>
+                    <a:ext uri="{9D8B030D-6E8A-4147-A177-3AD203B41FA5}">
+                      <a16:colId xmlns:a16="http://schemas.microsoft.com/office/drawing/2014/main" val="1657470181"/>
+                    </a:ext>
+                  </a:extLst>
+                </a:gridCol>
+              </a:tblGrid>
+              <a:tr h="365760">
+                <a:tc>
+                  <a:txBody>
+                    <a:bodyPr/>
+                    <a:lstStyle/>
+                    <a:p>
+                      <a:r>
+                        <a:rPr lang="en-US" dirty="0"/>
+                        <a:t>1</a:t>
+                      </a:r>
+                    </a:p>
+                  </a:txBody>
+                  <a:tcPr/>
+                </a:tc>
+                <a:extLst>
+                  <a:ext uri="{0D108BD9-81ED-4DB2-BD59-A6C34878D82A}">
+                    <a16:rowId xmlns:a16="http://schemas.microsoft.com/office/drawing/2014/main" val="1705318490"/>
+                  </a:ext>
+                </a:extLst>
+              </a:tr>
+              <a:tr h="365760">
+                <a:tc>
+                  <a:txBody>
+                    <a:bodyPr/>
+                    <a:lstStyle/>
+                    <a:p>
+                      <a:r>
+                        <a:rPr lang="en-US" dirty="0"/>
+                        <a:t>2</a:t>
+                      </a:r>
+                    </a:p>
+                  </a:txBody>
+                  <a:tcPr/>
+                </a:tc>
+                <a:extLst>
+                  <a:ext uri="{0D108BD9-81ED-4DB2-BD59-A6C34878D82A}">
+                    <a16:rowId xmlns:a16="http://schemas.microsoft.com/office/drawing/2014/main" val="2049377669"/>
+                  </a:ext>
+                </a:extLst>
+              </a:tr>
+            </a:tbl>
+          </a:graphicData>
+        </a:graphic>
+      </p:graphicFrame>
+      <p:graphicFrame>
+        <p:nvGraphicFramePr>
+          <p:cNvPr id="11" name="Table 10"/>
+          <p:cNvGraphicFramePr>
+            <a:graphicFrameLocks noGrp="1"/>
+          </p:cNvGraphicFramePr>
+          <p:nvPr>
+            <p:extLst>
+              <p:ext uri="{D42A27DB-BD31-4B8C-83A1-F6EECF244321}">
+                <p14:modId xmlns:p14="http://schemas.microsoft.com/office/powerpoint/2010/main" val="2213426084"/>
+              </p:ext>
+            </p:extLst>
+          </p:nvPr>
+        </p:nvGraphicFramePr>
+        <p:xfrm>
+          <a:off x="7353300" y="2560320"/>
+          <a:ext cx="1447800" cy="1097280"/>
+        </p:xfrm>
+        <a:graphic>
+          <a:graphicData uri="http://schemas.openxmlformats.org/drawingml/2006/table">
+            <a:tbl>
+              <a:tblPr firstRow="1" bandRow="1">
+                <a:tableStyleId>{5C22544A-7EE6-4342-B048-85BDC9FD1C3A}</a:tableStyleId>
+              </a:tblPr>
+              <a:tblGrid>
+                <a:gridCol w="1447800">
+                  <a:extLst>
+                    <a:ext uri="{9D8B030D-6E8A-4147-A177-3AD203B41FA5}">
+                      <a16:colId xmlns:a16="http://schemas.microsoft.com/office/drawing/2014/main" val="1657470181"/>
+                    </a:ext>
+                  </a:extLst>
+                </a:gridCol>
+              </a:tblGrid>
+              <a:tr h="365760">
+                <a:tc>
+                  <a:txBody>
+                    <a:bodyPr/>
+                    <a:lstStyle/>
+                    <a:p>
+                      <a:r>
+                        <a:rPr lang="en-US" dirty="0"/>
+                        <a:t>1</a:t>
+                      </a:r>
+                    </a:p>
+                  </a:txBody>
+                  <a:tcPr/>
+                </a:tc>
+                <a:extLst>
+                  <a:ext uri="{0D108BD9-81ED-4DB2-BD59-A6C34878D82A}">
+                    <a16:rowId xmlns:a16="http://schemas.microsoft.com/office/drawing/2014/main" val="1705318490"/>
+                  </a:ext>
+                </a:extLst>
+              </a:tr>
+              <a:tr h="365760">
+                <a:tc>
+                  <a:txBody>
+                    <a:bodyPr/>
+                    <a:lstStyle/>
+                    <a:p>
+                      <a:r>
+                        <a:rPr lang="en-US" dirty="0"/>
+                        <a:t>2</a:t>
+                      </a:r>
+                    </a:p>
+                  </a:txBody>
+                  <a:tcPr/>
+                </a:tc>
+                <a:extLst>
+                  <a:ext uri="{0D108BD9-81ED-4DB2-BD59-A6C34878D82A}">
+                    <a16:rowId xmlns:a16="http://schemas.microsoft.com/office/drawing/2014/main" val="4215921882"/>
+                  </a:ext>
+                </a:extLst>
+              </a:tr>
+              <a:tr h="365760">
+                <a:tc>
+                  <a:txBody>
+                    <a:bodyPr/>
+                    <a:lstStyle/>
+                    <a:p>
+                      <a:r>
+                        <a:rPr lang="en-US" dirty="0"/>
+                        <a:t>3</a:t>
+                      </a:r>
+                    </a:p>
+                  </a:txBody>
+                  <a:tcPr/>
+                </a:tc>
+                <a:extLst>
+                  <a:ext uri="{0D108BD9-81ED-4DB2-BD59-A6C34878D82A}">
+                    <a16:rowId xmlns:a16="http://schemas.microsoft.com/office/drawing/2014/main" val="1420056192"/>
+                  </a:ext>
+                </a:extLst>
+              </a:tr>
+            </a:tbl>
+          </a:graphicData>
+        </a:graphic>
+      </p:graphicFrame>
+      <p:cxnSp>
+        <p:nvCxnSpPr>
+          <p:cNvPr id="16" name="Elbow Connector 15"/>
+          <p:cNvCxnSpPr>
+            <a:stCxn id="3" idx="3"/>
+            <a:endCxn id="5" idx="0"/>
+          </p:cNvCxnSpPr>
+          <p:nvPr/>
+        </p:nvCxnSpPr>
+        <p:spPr>
+          <a:xfrm>
+            <a:off x="1676400" y="1143000"/>
+            <a:ext cx="304800" cy="1420430"/>
+          </a:xfrm>
+          <a:prstGeom prst="bentConnector2">
+            <a:avLst/>
+          </a:prstGeom>
+          <a:ln>
+            <a:tailEnd type="triangle"/>
+          </a:ln>
+        </p:spPr>
+        <p:style>
+          <a:lnRef idx="1">
+            <a:schemeClr val="accent1"/>
+          </a:lnRef>
+          <a:fillRef idx="0">
+            <a:schemeClr val="accent1"/>
+          </a:fillRef>
+          <a:effectRef idx="0">
+            <a:schemeClr val="accent1"/>
+          </a:effectRef>
+          <a:fontRef idx="minor">
+            <a:schemeClr val="tx1"/>
+          </a:fontRef>
+        </p:style>
+      </p:cxnSp>
+      <p:cxnSp>
+        <p:nvCxnSpPr>
+          <p:cNvPr id="18" name="Elbow Connector 17"/>
+          <p:cNvCxnSpPr>
+            <a:stCxn id="4" idx="3"/>
+            <a:endCxn id="7" idx="0"/>
+          </p:cNvCxnSpPr>
+          <p:nvPr/>
+        </p:nvCxnSpPr>
+        <p:spPr>
+          <a:xfrm>
+            <a:off x="3810000" y="1143000"/>
+            <a:ext cx="266700" cy="1417320"/>
+          </a:xfrm>
+          <a:prstGeom prst="bentConnector2">
+            <a:avLst/>
+          </a:prstGeom>
+          <a:ln>
+            <a:tailEnd type="triangle"/>
+          </a:ln>
+        </p:spPr>
+        <p:style>
+          <a:lnRef idx="1">
+            <a:schemeClr val="accent1"/>
+          </a:lnRef>
+          <a:fillRef idx="0">
+            <a:schemeClr val="accent1"/>
+          </a:fillRef>
+          <a:effectRef idx="0">
+            <a:schemeClr val="accent1"/>
+          </a:effectRef>
+          <a:fontRef idx="minor">
+            <a:schemeClr val="tx1"/>
+          </a:fontRef>
+        </p:style>
+      </p:cxnSp>
+      <p:cxnSp>
+        <p:nvCxnSpPr>
+          <p:cNvPr id="20" name="Elbow Connector 19"/>
+          <p:cNvCxnSpPr>
+            <a:stCxn id="8" idx="3"/>
+            <a:endCxn id="10" idx="0"/>
+          </p:cNvCxnSpPr>
+          <p:nvPr/>
+        </p:nvCxnSpPr>
+        <p:spPr>
+          <a:xfrm>
+            <a:off x="5773316" y="1143000"/>
+            <a:ext cx="296247" cy="1420430"/>
+          </a:xfrm>
+          <a:prstGeom prst="bentConnector2">
+            <a:avLst/>
+          </a:prstGeom>
+          <a:ln>
+            <a:tailEnd type="triangle"/>
+          </a:ln>
+        </p:spPr>
+        <p:style>
+          <a:lnRef idx="1">
+            <a:schemeClr val="accent1"/>
+          </a:lnRef>
+          <a:fillRef idx="0">
+            <a:schemeClr val="accent1"/>
+          </a:fillRef>
+          <a:effectRef idx="0">
+            <a:schemeClr val="accent1"/>
+          </a:effectRef>
+          <a:fontRef idx="minor">
+            <a:schemeClr val="tx1"/>
+          </a:fontRef>
+        </p:style>
+      </p:cxnSp>
+      <p:cxnSp>
+        <p:nvCxnSpPr>
+          <p:cNvPr id="22" name="Elbow Connector 21"/>
+          <p:cNvCxnSpPr>
+            <a:stCxn id="9" idx="3"/>
+            <a:endCxn id="11" idx="0"/>
+          </p:cNvCxnSpPr>
+          <p:nvPr/>
+        </p:nvCxnSpPr>
+        <p:spPr>
+          <a:xfrm>
+            <a:off x="7736632" y="1143000"/>
+            <a:ext cx="340568" cy="1417320"/>
+          </a:xfrm>
+          <a:prstGeom prst="bentConnector2">
+            <a:avLst/>
+          </a:prstGeom>
+          <a:ln>
+            <a:tailEnd type="triangle"/>
+          </a:ln>
+        </p:spPr>
+        <p:style>
+          <a:lnRef idx="1">
+            <a:schemeClr val="accent1"/>
+          </a:lnRef>
+          <a:fillRef idx="0">
+            <a:schemeClr val="accent1"/>
+          </a:fillRef>
+          <a:effectRef idx="0">
+            <a:schemeClr val="accent1"/>
+          </a:effectRef>
+          <a:fontRef idx="minor">
+            <a:schemeClr val="tx1"/>
+          </a:fontRef>
+        </p:style>
+      </p:cxnSp>
+      <p:sp>
+        <p:nvSpPr>
+          <p:cNvPr id="23" name="Right Arrow 22"/>
+          <p:cNvSpPr/>
+          <p:nvPr/>
+        </p:nvSpPr>
+        <p:spPr>
+          <a:xfrm>
+            <a:off x="1844350" y="609600"/>
+            <a:ext cx="381000" cy="381000"/>
+          </a:xfrm>
+          <a:prstGeom prst="rightArrow">
+            <a:avLst/>
+          </a:prstGeom>
+        </p:spPr>
+        <p:style>
+          <a:lnRef idx="2">
+            <a:schemeClr val="accent1">
+              <a:shade val="50000"/>
+            </a:schemeClr>
+          </a:lnRef>
+          <a:fillRef idx="1">
+            <a:schemeClr val="accent1"/>
+          </a:fillRef>
+          <a:effectRef idx="0">
+            <a:schemeClr val="accent1"/>
+          </a:effectRef>
+          <a:fontRef idx="minor">
+            <a:schemeClr val="lt1"/>
+          </a:fontRef>
+        </p:style>
+        <p:txBody>
+          <a:bodyPr rtlCol="0" anchor="ctr"/>
+          <a:lstStyle/>
+          <a:p>
+            <a:pPr algn="ctr"/>
+            <a:endParaRPr lang="en-US"/>
+          </a:p>
+        </p:txBody>
+      </p:sp>
+      <p:sp>
+        <p:nvSpPr>
+          <p:cNvPr id="24" name="Right Arrow 23"/>
+          <p:cNvSpPr/>
+          <p:nvPr/>
+        </p:nvSpPr>
+        <p:spPr>
+          <a:xfrm>
+            <a:off x="3868316" y="609600"/>
+            <a:ext cx="381000" cy="381000"/>
+          </a:xfrm>
+          <a:prstGeom prst="rightArrow">
+            <a:avLst/>
+          </a:prstGeom>
+        </p:spPr>
+        <p:style>
+          <a:lnRef idx="2">
+            <a:schemeClr val="accent1">
+              <a:shade val="50000"/>
+            </a:schemeClr>
+          </a:lnRef>
+          <a:fillRef idx="1">
+            <a:schemeClr val="accent1"/>
+          </a:fillRef>
+          <a:effectRef idx="0">
+            <a:schemeClr val="accent1"/>
+          </a:effectRef>
+          <a:fontRef idx="minor">
+            <a:schemeClr val="lt1"/>
+          </a:fontRef>
+        </p:style>
+        <p:txBody>
+          <a:bodyPr rtlCol="0" anchor="ctr"/>
+          <a:lstStyle/>
+          <a:p>
+            <a:pPr algn="ctr"/>
+            <a:endParaRPr lang="en-US"/>
+          </a:p>
+        </p:txBody>
+      </p:sp>
+      <p:sp>
+        <p:nvSpPr>
+          <p:cNvPr id="25" name="Right Arrow 24"/>
+          <p:cNvSpPr/>
+          <p:nvPr/>
+        </p:nvSpPr>
+        <p:spPr>
+          <a:xfrm>
+            <a:off x="5840574" y="609600"/>
+            <a:ext cx="381000" cy="381000"/>
+          </a:xfrm>
+          <a:prstGeom prst="rightArrow">
+            <a:avLst/>
+          </a:prstGeom>
+        </p:spPr>
+        <p:style>
+          <a:lnRef idx="2">
+            <a:schemeClr val="accent1">
+              <a:shade val="50000"/>
+            </a:schemeClr>
+          </a:lnRef>
+          <a:fillRef idx="1">
+            <a:schemeClr val="accent1"/>
+          </a:fillRef>
+          <a:effectRef idx="0">
+            <a:schemeClr val="accent1"/>
+          </a:effectRef>
+          <a:fontRef idx="minor">
+            <a:schemeClr val="lt1"/>
+          </a:fontRef>
+        </p:style>
+        <p:txBody>
+          <a:bodyPr rtlCol="0" anchor="ctr"/>
+          <a:lstStyle/>
+          <a:p>
+            <a:pPr algn="ctr"/>
+            <a:endParaRPr lang="en-US"/>
+          </a:p>
+        </p:txBody>
+      </p:sp>
+      <p:sp>
+        <p:nvSpPr>
+          <p:cNvPr id="27" name="TextBox 26"/>
+          <p:cNvSpPr txBox="1"/>
+          <p:nvPr/>
+        </p:nvSpPr>
+        <p:spPr>
+          <a:xfrm>
+            <a:off x="1152331" y="2201583"/>
+            <a:ext cx="990600" cy="276999"/>
+          </a:xfrm>
+          <a:prstGeom prst="rect">
+            <a:avLst/>
+          </a:prstGeom>
+          <a:noFill/>
+        </p:spPr>
+        <p:txBody>
+          <a:bodyPr wrap="square" rtlCol="0">
+            <a:spAutoFit/>
+          </a:bodyPr>
+          <a:lstStyle/>
+          <a:p>
+            <a:pPr algn="ctr"/>
+            <a:r>
+              <a:rPr lang="en-US" sz="1200" dirty="0"/>
+              <a:t>Clear</a:t>
+            </a:r>
+          </a:p>
+        </p:txBody>
+      </p:sp>
+      <p:sp>
+        <p:nvSpPr>
+          <p:cNvPr id="28" name="TextBox 27"/>
+          <p:cNvSpPr txBox="1"/>
+          <p:nvPr/>
+        </p:nvSpPr>
+        <p:spPr>
+          <a:xfrm>
+            <a:off x="3152969" y="2226369"/>
+            <a:ext cx="990600" cy="276999"/>
+          </a:xfrm>
+          <a:prstGeom prst="rect">
+            <a:avLst/>
+          </a:prstGeom>
+          <a:noFill/>
+        </p:spPr>
+        <p:txBody>
+          <a:bodyPr wrap="square" rtlCol="0">
+            <a:spAutoFit/>
+          </a:bodyPr>
+          <a:lstStyle/>
+          <a:p>
+            <a:pPr algn="ctr"/>
+            <a:r>
+              <a:rPr lang="en-US" sz="1200" dirty="0"/>
+              <a:t>Push 1</a:t>
+            </a:r>
+          </a:p>
+        </p:txBody>
+      </p:sp>
+      <p:sp>
+        <p:nvSpPr>
+          <p:cNvPr id="29" name="TextBox 28"/>
+          <p:cNvSpPr txBox="1"/>
+          <p:nvPr/>
+        </p:nvSpPr>
+        <p:spPr>
+          <a:xfrm>
+            <a:off x="5049416" y="2197814"/>
+            <a:ext cx="990600" cy="276999"/>
+          </a:xfrm>
+          <a:prstGeom prst="rect">
+            <a:avLst/>
+          </a:prstGeom>
+          <a:noFill/>
+        </p:spPr>
+        <p:txBody>
+          <a:bodyPr wrap="square" rtlCol="0">
+            <a:spAutoFit/>
+          </a:bodyPr>
+          <a:lstStyle/>
+          <a:p>
+            <a:pPr algn="ctr"/>
+            <a:r>
+              <a:rPr lang="en-US" sz="1200" dirty="0"/>
+              <a:t>Push 2</a:t>
+            </a:r>
+          </a:p>
+        </p:txBody>
+      </p:sp>
+      <p:sp>
+        <p:nvSpPr>
+          <p:cNvPr id="30" name="TextBox 29"/>
+          <p:cNvSpPr txBox="1"/>
+          <p:nvPr/>
+        </p:nvSpPr>
+        <p:spPr>
+          <a:xfrm>
+            <a:off x="7124700" y="2202037"/>
+            <a:ext cx="990600" cy="276999"/>
+          </a:xfrm>
+          <a:prstGeom prst="rect">
+            <a:avLst/>
+          </a:prstGeom>
+          <a:noFill/>
+        </p:spPr>
+        <p:txBody>
+          <a:bodyPr wrap="square" rtlCol="0">
+            <a:spAutoFit/>
+          </a:bodyPr>
+          <a:lstStyle/>
+          <a:p>
+            <a:pPr algn="ctr"/>
+            <a:r>
+              <a:rPr lang="en-US" sz="1200" dirty="0"/>
+              <a:t>Push 3</a:t>
+            </a:r>
+          </a:p>
+        </p:txBody>
+      </p:sp>
+      <p:sp>
+        <p:nvSpPr>
+          <p:cNvPr id="31" name="Rectangle 30"/>
+          <p:cNvSpPr/>
+          <p:nvPr/>
+        </p:nvSpPr>
+        <p:spPr>
+          <a:xfrm>
+            <a:off x="228600" y="4309656"/>
+            <a:ext cx="1447800" cy="1371600"/>
+          </a:xfrm>
+          <a:prstGeom prst="rect">
+            <a:avLst/>
+          </a:prstGeom>
+        </p:spPr>
+        <p:style>
+          <a:lnRef idx="1">
+            <a:schemeClr val="dk1"/>
+          </a:lnRef>
+          <a:fillRef idx="2">
+            <a:schemeClr val="dk1"/>
+          </a:fillRef>
+          <a:effectRef idx="1">
+            <a:schemeClr val="dk1"/>
+          </a:effectRef>
+          <a:fontRef idx="minor">
+            <a:schemeClr val="dk1"/>
+          </a:fontRef>
+        </p:style>
+        <p:txBody>
+          <a:bodyPr rtlCol="0" anchor="ctr"/>
+          <a:lstStyle/>
+          <a:p>
+            <a:pPr algn="ctr"/>
+            <a:r>
+              <a:rPr lang="en-US" dirty="0"/>
+              <a:t>INITIAL SCREEN</a:t>
+            </a:r>
+          </a:p>
+        </p:txBody>
+      </p:sp>
+      <p:sp>
+        <p:nvSpPr>
+          <p:cNvPr id="32" name="Rectangle 31"/>
+          <p:cNvSpPr/>
+          <p:nvPr/>
+        </p:nvSpPr>
+        <p:spPr>
+          <a:xfrm>
+            <a:off x="2362200" y="4309656"/>
+            <a:ext cx="1447800" cy="1371600"/>
+          </a:xfrm>
+          <a:prstGeom prst="rect">
+            <a:avLst/>
+          </a:prstGeom>
+        </p:spPr>
+        <p:style>
+          <a:lnRef idx="1">
+            <a:schemeClr val="dk1"/>
+          </a:lnRef>
+          <a:fillRef idx="2">
+            <a:schemeClr val="dk1"/>
+          </a:fillRef>
+          <a:effectRef idx="1">
+            <a:schemeClr val="dk1"/>
+          </a:effectRef>
+          <a:fontRef idx="minor">
+            <a:schemeClr val="dk1"/>
+          </a:fontRef>
+        </p:style>
+        <p:txBody>
+          <a:bodyPr rtlCol="0" anchor="ctr"/>
+          <a:lstStyle/>
+          <a:p>
+            <a:pPr algn="ctr"/>
+            <a:r>
+              <a:rPr lang="en-US" dirty="0"/>
+              <a:t>DATA SCREEN LEVEL 1</a:t>
+            </a:r>
+          </a:p>
+        </p:txBody>
+      </p:sp>
+      <p:sp>
+        <p:nvSpPr>
+          <p:cNvPr id="33" name="Rectangle 32"/>
+          <p:cNvSpPr/>
+          <p:nvPr/>
+        </p:nvSpPr>
+        <p:spPr>
+          <a:xfrm>
+            <a:off x="4325516" y="4309656"/>
+            <a:ext cx="1447800" cy="1371600"/>
+          </a:xfrm>
+          <a:prstGeom prst="rect">
+            <a:avLst/>
+          </a:prstGeom>
+        </p:spPr>
+        <p:style>
+          <a:lnRef idx="1">
+            <a:schemeClr val="dk1"/>
+          </a:lnRef>
+          <a:fillRef idx="2">
+            <a:schemeClr val="dk1"/>
+          </a:fillRef>
+          <a:effectRef idx="1">
+            <a:schemeClr val="dk1"/>
+          </a:effectRef>
+          <a:fontRef idx="minor">
+            <a:schemeClr val="dk1"/>
+          </a:fontRef>
+        </p:style>
+        <p:txBody>
+          <a:bodyPr rtlCol="0" anchor="ctr"/>
+          <a:lstStyle/>
+          <a:p>
+            <a:pPr algn="ctr"/>
+            <a:r>
+              <a:rPr lang="en-US" dirty="0"/>
+              <a:t>DATA SCREEN LEVEL 2</a:t>
+            </a:r>
+          </a:p>
+        </p:txBody>
+      </p:sp>
+      <p:sp>
+        <p:nvSpPr>
+          <p:cNvPr id="34" name="Rectangle 33"/>
+          <p:cNvSpPr/>
+          <p:nvPr/>
+        </p:nvSpPr>
+        <p:spPr>
+          <a:xfrm>
+            <a:off x="6288832" y="4309656"/>
+            <a:ext cx="1447800" cy="1371600"/>
+          </a:xfrm>
+          <a:prstGeom prst="rect">
+            <a:avLst/>
+          </a:prstGeom>
+        </p:spPr>
+        <p:style>
+          <a:lnRef idx="1">
+            <a:schemeClr val="dk1"/>
+          </a:lnRef>
+          <a:fillRef idx="2">
+            <a:schemeClr val="dk1"/>
+          </a:fillRef>
+          <a:effectRef idx="1">
+            <a:schemeClr val="dk1"/>
+          </a:effectRef>
+          <a:fontRef idx="minor">
+            <a:schemeClr val="dk1"/>
+          </a:fontRef>
+        </p:style>
+        <p:txBody>
+          <a:bodyPr rtlCol="0" anchor="ctr"/>
+          <a:lstStyle/>
+          <a:p>
+            <a:pPr algn="ctr"/>
+            <a:r>
+              <a:rPr lang="en-US" dirty="0"/>
+              <a:t>DATA SCREEN LEVEL 3</a:t>
+            </a:r>
+          </a:p>
+        </p:txBody>
+      </p:sp>
+      <p:sp>
+        <p:nvSpPr>
+          <p:cNvPr id="35" name="Right Arrow 34"/>
+          <p:cNvSpPr/>
+          <p:nvPr/>
+        </p:nvSpPr>
+        <p:spPr>
+          <a:xfrm>
+            <a:off x="7812054" y="609600"/>
+            <a:ext cx="381000" cy="381000"/>
+          </a:xfrm>
+          <a:prstGeom prst="rightArrow">
+            <a:avLst/>
+          </a:prstGeom>
+        </p:spPr>
+        <p:style>
+          <a:lnRef idx="2">
+            <a:schemeClr val="accent1">
+              <a:shade val="50000"/>
+            </a:schemeClr>
+          </a:lnRef>
+          <a:fillRef idx="1">
+            <a:schemeClr val="accent1"/>
+          </a:fillRef>
+          <a:effectRef idx="0">
+            <a:schemeClr val="accent1"/>
+          </a:effectRef>
+          <a:fontRef idx="minor">
+            <a:schemeClr val="lt1"/>
+          </a:fontRef>
+        </p:style>
+        <p:txBody>
+          <a:bodyPr rtlCol="0" anchor="ctr"/>
+          <a:lstStyle/>
+          <a:p>
+            <a:pPr algn="ctr"/>
+            <a:endParaRPr lang="en-US"/>
+          </a:p>
+        </p:txBody>
+      </p:sp>
+      <p:cxnSp>
+        <p:nvCxnSpPr>
+          <p:cNvPr id="37" name="Elbow Connector 36"/>
+          <p:cNvCxnSpPr>
+            <a:stCxn id="34" idx="1"/>
+            <a:endCxn id="10" idx="2"/>
+          </p:cNvCxnSpPr>
+          <p:nvPr/>
+        </p:nvCxnSpPr>
+        <p:spPr>
+          <a:xfrm rot="10800000">
+            <a:off x="6069564" y="3294950"/>
+            <a:ext cx="219269" cy="1700506"/>
+          </a:xfrm>
+          <a:prstGeom prst="bentConnector2">
+            <a:avLst/>
+          </a:prstGeom>
+          <a:ln>
+            <a:headEnd type="triangle"/>
+            <a:tailEnd type="none"/>
+          </a:ln>
+        </p:spPr>
+        <p:style>
+          <a:lnRef idx="1">
+            <a:schemeClr val="accent1"/>
+          </a:lnRef>
+          <a:fillRef idx="0">
+            <a:schemeClr val="accent1"/>
+          </a:fillRef>
+          <a:effectRef idx="0">
+            <a:schemeClr val="accent1"/>
+          </a:effectRef>
+          <a:fontRef idx="minor">
+            <a:schemeClr val="tx1"/>
+          </a:fontRef>
+        </p:style>
+      </p:cxnSp>
+      <p:sp>
+        <p:nvSpPr>
+          <p:cNvPr id="38" name="TextBox 37"/>
+          <p:cNvSpPr txBox="1"/>
+          <p:nvPr/>
+        </p:nvSpPr>
+        <p:spPr>
+          <a:xfrm>
+            <a:off x="5086738" y="3360850"/>
+            <a:ext cx="990600" cy="276999"/>
+          </a:xfrm>
+          <a:prstGeom prst="rect">
+            <a:avLst/>
+          </a:prstGeom>
+          <a:noFill/>
+        </p:spPr>
+        <p:txBody>
+          <a:bodyPr wrap="square" rtlCol="0">
+            <a:spAutoFit/>
+          </a:bodyPr>
+          <a:lstStyle/>
+          <a:p>
+            <a:pPr algn="ctr"/>
+            <a:r>
+              <a:rPr lang="en-US" sz="1200" dirty="0"/>
+              <a:t>Pop 2</a:t>
+            </a:r>
+          </a:p>
+        </p:txBody>
+      </p:sp>
+      <p:cxnSp>
+        <p:nvCxnSpPr>
+          <p:cNvPr id="40" name="Elbow Connector 39"/>
+          <p:cNvCxnSpPr>
+            <a:stCxn id="33" idx="1"/>
+            <a:endCxn id="7" idx="2"/>
+          </p:cNvCxnSpPr>
+          <p:nvPr/>
+        </p:nvCxnSpPr>
+        <p:spPr>
+          <a:xfrm rot="10800000">
+            <a:off x="4076700" y="2926080"/>
+            <a:ext cx="248816" cy="2069376"/>
+          </a:xfrm>
+          <a:prstGeom prst="bentConnector2">
+            <a:avLst/>
+          </a:prstGeom>
+          <a:ln>
+            <a:headEnd type="triangle"/>
+            <a:tailEnd type="none"/>
+          </a:ln>
+        </p:spPr>
+        <p:style>
+          <a:lnRef idx="1">
+            <a:schemeClr val="accent1"/>
+          </a:lnRef>
+          <a:fillRef idx="0">
+            <a:schemeClr val="accent1"/>
+          </a:fillRef>
+          <a:effectRef idx="0">
+            <a:schemeClr val="accent1"/>
+          </a:effectRef>
+          <a:fontRef idx="minor">
+            <a:schemeClr val="tx1"/>
+          </a:fontRef>
+        </p:style>
+      </p:cxnSp>
+      <p:sp>
+        <p:nvSpPr>
+          <p:cNvPr id="41" name="TextBox 40"/>
+          <p:cNvSpPr txBox="1"/>
+          <p:nvPr/>
+        </p:nvSpPr>
+        <p:spPr>
+          <a:xfrm>
+            <a:off x="3170852" y="2991013"/>
+            <a:ext cx="990600" cy="276999"/>
+          </a:xfrm>
+          <a:prstGeom prst="rect">
+            <a:avLst/>
+          </a:prstGeom>
+          <a:noFill/>
+        </p:spPr>
+        <p:txBody>
+          <a:bodyPr wrap="square" rtlCol="0">
+            <a:spAutoFit/>
+          </a:bodyPr>
+          <a:lstStyle/>
+          <a:p>
+            <a:pPr algn="ctr"/>
+            <a:r>
+              <a:rPr lang="en-US" sz="1200" dirty="0"/>
+              <a:t>Pop 1</a:t>
+            </a:r>
+          </a:p>
+        </p:txBody>
+      </p:sp>
+      <p:sp>
+        <p:nvSpPr>
+          <p:cNvPr id="42" name="Right Arrow 41"/>
+          <p:cNvSpPr/>
+          <p:nvPr/>
+        </p:nvSpPr>
+        <p:spPr>
+          <a:xfrm rot="10800000">
+            <a:off x="5856914" y="5263756"/>
+            <a:ext cx="367736" cy="406301"/>
+          </a:xfrm>
+          <a:prstGeom prst="rightArrow">
+            <a:avLst/>
+          </a:prstGeom>
+        </p:spPr>
+        <p:style>
+          <a:lnRef idx="2">
+            <a:schemeClr val="accent1">
+              <a:shade val="50000"/>
+            </a:schemeClr>
+          </a:lnRef>
+          <a:fillRef idx="1">
+            <a:schemeClr val="accent1"/>
+          </a:fillRef>
+          <a:effectRef idx="0">
+            <a:schemeClr val="accent1"/>
+          </a:effectRef>
+          <a:fontRef idx="minor">
+            <a:schemeClr val="lt1"/>
+          </a:fontRef>
+        </p:style>
+        <p:txBody>
+          <a:bodyPr rtlCol="0" anchor="ctr"/>
+          <a:lstStyle/>
+          <a:p>
+            <a:pPr algn="ctr"/>
+            <a:endParaRPr lang="en-US"/>
+          </a:p>
+        </p:txBody>
+      </p:sp>
+      <p:sp>
+        <p:nvSpPr>
+          <p:cNvPr id="43" name="Right Arrow 42"/>
+          <p:cNvSpPr/>
+          <p:nvPr/>
+        </p:nvSpPr>
+        <p:spPr>
+          <a:xfrm rot="10800000">
+            <a:off x="3893598" y="5263757"/>
+            <a:ext cx="367736" cy="406301"/>
+          </a:xfrm>
+          <a:prstGeom prst="rightArrow">
+            <a:avLst/>
+          </a:prstGeom>
+        </p:spPr>
+        <p:style>
+          <a:lnRef idx="2">
+            <a:schemeClr val="accent1">
+              <a:shade val="50000"/>
+            </a:schemeClr>
+          </a:lnRef>
+          <a:fillRef idx="1">
+            <a:schemeClr val="accent1"/>
+          </a:fillRef>
+          <a:effectRef idx="0">
+            <a:schemeClr val="accent1"/>
+          </a:effectRef>
+          <a:fontRef idx="minor">
+            <a:schemeClr val="lt1"/>
+          </a:fontRef>
+        </p:style>
+        <p:txBody>
+          <a:bodyPr rtlCol="0" anchor="ctr"/>
+          <a:lstStyle/>
+          <a:p>
+            <a:pPr algn="ctr"/>
+            <a:endParaRPr lang="en-US"/>
+          </a:p>
+        </p:txBody>
+      </p:sp>
+      <p:sp>
+        <p:nvSpPr>
+          <p:cNvPr id="45" name="Left Brace 44"/>
+          <p:cNvSpPr/>
+          <p:nvPr/>
+        </p:nvSpPr>
+        <p:spPr>
+          <a:xfrm>
+            <a:off x="677248" y="2336313"/>
+            <a:ext cx="475084" cy="1473687"/>
+          </a:xfrm>
+          <a:prstGeom prst="leftBrace">
+            <a:avLst/>
+          </a:prstGeom>
+        </p:spPr>
+        <p:style>
+          <a:lnRef idx="1">
+            <a:schemeClr val="accent1"/>
+          </a:lnRef>
+          <a:fillRef idx="0">
+            <a:schemeClr val="accent1"/>
+          </a:fillRef>
+          <a:effectRef idx="0">
+            <a:schemeClr val="accent1"/>
+          </a:effectRef>
+          <a:fontRef idx="minor">
+            <a:schemeClr val="tx1"/>
+          </a:fontRef>
+        </p:style>
+        <p:txBody>
+          <a:bodyPr rtlCol="0" anchor="ctr"/>
+          <a:lstStyle/>
+          <a:p>
+            <a:pPr algn="ctr"/>
+            <a:endParaRPr lang="en-US"/>
+          </a:p>
+        </p:txBody>
+      </p:sp>
+      <p:sp>
+        <p:nvSpPr>
+          <p:cNvPr id="46" name="TextBox 45"/>
+          <p:cNvSpPr txBox="1"/>
+          <p:nvPr/>
+        </p:nvSpPr>
+        <p:spPr>
+          <a:xfrm>
+            <a:off x="-102635" y="2814935"/>
+            <a:ext cx="990600" cy="461665"/>
+          </a:xfrm>
+          <a:prstGeom prst="rect">
+            <a:avLst/>
+          </a:prstGeom>
+          <a:noFill/>
+        </p:spPr>
+        <p:txBody>
+          <a:bodyPr wrap="square" rtlCol="0">
+            <a:spAutoFit/>
+          </a:bodyPr>
+          <a:lstStyle/>
+          <a:p>
+            <a:pPr algn="ctr"/>
+            <a:r>
+              <a:rPr lang="en-US" sz="1200" dirty="0"/>
+              <a:t>Stack Collection</a:t>
+            </a:r>
+          </a:p>
+        </p:txBody>
+      </p:sp>
+    </p:spTree>
+    <p:extLst>
+      <p:ext uri="{BB962C8B-B14F-4D97-AF65-F5344CB8AC3E}">
+        <p14:creationId xmlns:p14="http://schemas.microsoft.com/office/powerpoint/2010/main" val="748101416"/>
+      </p:ext>
+    </p:extLst>
+  </p:cSld>
+  <p:clrMapOvr>
+    <a:masterClrMapping/>
+  </p:clrMapOvr>
+</p:sld>
+</file>
+
+<file path=ppt/slides/slide12.xml><?xml version="1.0" encoding="utf-8"?>
+<p:sld xmlns:a="http://schemas.openxmlformats.org/drawingml/2006/main" xmlns:r="http://schemas.openxmlformats.org/officeDocument/2006/relationships" xmlns:p="http://schemas.openxmlformats.org/presentationml/2006/main">
+  <p:cSld>
+    <p:spTree>
+      <p:nvGrpSpPr>
+        <p:cNvPr id="1" name=""/>
+        <p:cNvGrpSpPr/>
+        <p:nvPr/>
+      </p:nvGrpSpPr>
+      <p:grpSpPr>
+        <a:xfrm>
+          <a:off x="0" y="0"/>
+          <a:ext cx="0" cy="0"/>
+          <a:chOff x="0" y="0"/>
+          <a:chExt cx="0" cy="0"/>
+        </a:xfrm>
+      </p:grpSpPr>
+      <p:sp>
+        <p:nvSpPr>
+          <p:cNvPr id="2" name="Slide Number Placeholder 1"/>
+          <p:cNvSpPr>
+            <a:spLocks noGrp="1"/>
+          </p:cNvSpPr>
+          <p:nvPr>
+            <p:ph type="sldNum" sz="quarter" idx="12"/>
+          </p:nvPr>
+        </p:nvSpPr>
+        <p:spPr/>
+        <p:txBody>
+          <a:bodyPr/>
+          <a:lstStyle/>
+          <a:p>
+            <a:fld id="{7C65DD3B-8E90-4815-956E-D18D24CB454B}" type="slidenum">
+              <a:rPr lang="en-US" smtClean="0"/>
+              <a:pPr/>
+              <a:t>12</a:t>
+            </a:fld>
+            <a:endParaRPr lang="en-US" dirty="0"/>
+          </a:p>
+        </p:txBody>
+      </p:sp>
+      <p:sp>
+        <p:nvSpPr>
+          <p:cNvPr id="3" name="Rectangle 2"/>
+          <p:cNvSpPr/>
+          <p:nvPr/>
+        </p:nvSpPr>
+        <p:spPr>
+          <a:xfrm>
+            <a:off x="228600" y="457200"/>
+            <a:ext cx="1447800" cy="1371600"/>
+          </a:xfrm>
+          <a:prstGeom prst="rect">
+            <a:avLst/>
+          </a:prstGeom>
+        </p:spPr>
+        <p:style>
+          <a:lnRef idx="1">
+            <a:schemeClr val="dk1"/>
+          </a:lnRef>
+          <a:fillRef idx="2">
+            <a:schemeClr val="dk1"/>
+          </a:fillRef>
+          <a:effectRef idx="1">
+            <a:schemeClr val="dk1"/>
+          </a:effectRef>
+          <a:fontRef idx="minor">
+            <a:schemeClr val="dk1"/>
+          </a:fontRef>
+        </p:style>
+        <p:txBody>
+          <a:bodyPr rtlCol="0" anchor="ctr"/>
+          <a:lstStyle/>
+          <a:p>
+            <a:pPr algn="ctr"/>
+            <a:r>
+              <a:rPr lang="en-US" dirty="0"/>
+              <a:t>INITIAL SCREEN</a:t>
+            </a:r>
+          </a:p>
+        </p:txBody>
+      </p:sp>
+      <p:sp>
+        <p:nvSpPr>
+          <p:cNvPr id="4" name="Rectangle 3"/>
+          <p:cNvSpPr/>
+          <p:nvPr/>
+        </p:nvSpPr>
+        <p:spPr>
+          <a:xfrm>
+            <a:off x="2362200" y="457200"/>
+            <a:ext cx="1447800" cy="1371600"/>
+          </a:xfrm>
+          <a:prstGeom prst="rect">
+            <a:avLst/>
+          </a:prstGeom>
+        </p:spPr>
+        <p:style>
+          <a:lnRef idx="1">
+            <a:schemeClr val="dk1"/>
+          </a:lnRef>
+          <a:fillRef idx="2">
+            <a:schemeClr val="dk1"/>
+          </a:fillRef>
+          <a:effectRef idx="1">
+            <a:schemeClr val="dk1"/>
+          </a:effectRef>
+          <a:fontRef idx="minor">
+            <a:schemeClr val="dk1"/>
+          </a:fontRef>
+        </p:style>
+        <p:txBody>
+          <a:bodyPr rtlCol="0" anchor="ctr"/>
+          <a:lstStyle/>
+          <a:p>
+            <a:pPr algn="ctr"/>
+            <a:r>
+              <a:rPr lang="en-US" dirty="0"/>
+              <a:t>DATA SCREEN LEVEL 1</a:t>
+            </a:r>
+          </a:p>
+        </p:txBody>
+      </p:sp>
+      <p:graphicFrame>
+        <p:nvGraphicFramePr>
+          <p:cNvPr id="5" name="Table 4"/>
+          <p:cNvGraphicFramePr>
+            <a:graphicFrameLocks noGrp="1"/>
+          </p:cNvGraphicFramePr>
+          <p:nvPr/>
+        </p:nvGraphicFramePr>
+        <p:xfrm>
+          <a:off x="1257300" y="2563430"/>
+          <a:ext cx="1447800" cy="365760"/>
+        </p:xfrm>
+        <a:graphic>
+          <a:graphicData uri="http://schemas.openxmlformats.org/drawingml/2006/table">
+            <a:tbl>
+              <a:tblPr firstRow="1" bandRow="1">
+                <a:tableStyleId>{5C22544A-7EE6-4342-B048-85BDC9FD1C3A}</a:tableStyleId>
+              </a:tblPr>
+              <a:tblGrid>
+                <a:gridCol w="1447800">
+                  <a:extLst>
+                    <a:ext uri="{9D8B030D-6E8A-4147-A177-3AD203B41FA5}">
+                      <a16:colId xmlns:a16="http://schemas.microsoft.com/office/drawing/2014/main" val="1657470181"/>
+                    </a:ext>
+                  </a:extLst>
+                </a:gridCol>
+              </a:tblGrid>
+              <a:tr h="294640">
+                <a:tc>
+                  <a:txBody>
+                    <a:bodyPr/>
+                    <a:lstStyle/>
+                    <a:p>
+                      <a:endParaRPr lang="en-US" dirty="0"/>
+                    </a:p>
+                  </a:txBody>
+                  <a:tcPr/>
+                </a:tc>
+                <a:extLst>
+                  <a:ext uri="{0D108BD9-81ED-4DB2-BD59-A6C34878D82A}">
+                    <a16:rowId xmlns:a16="http://schemas.microsoft.com/office/drawing/2014/main" val="1705318490"/>
+                  </a:ext>
+                </a:extLst>
+              </a:tr>
+            </a:tbl>
+          </a:graphicData>
+        </a:graphic>
+      </p:graphicFrame>
+      <p:graphicFrame>
+        <p:nvGraphicFramePr>
+          <p:cNvPr id="7" name="Table 6"/>
+          <p:cNvGraphicFramePr>
+            <a:graphicFrameLocks noGrp="1"/>
+          </p:cNvGraphicFramePr>
+          <p:nvPr/>
+        </p:nvGraphicFramePr>
+        <p:xfrm>
+          <a:off x="3352800" y="2560320"/>
+          <a:ext cx="1447800" cy="365760"/>
+        </p:xfrm>
+        <a:graphic>
+          <a:graphicData uri="http://schemas.openxmlformats.org/drawingml/2006/table">
+            <a:tbl>
+              <a:tblPr firstRow="1" bandRow="1">
+                <a:tableStyleId>{5C22544A-7EE6-4342-B048-85BDC9FD1C3A}</a:tableStyleId>
+              </a:tblPr>
+              <a:tblGrid>
+                <a:gridCol w="1447800">
+                  <a:extLst>
+                    <a:ext uri="{9D8B030D-6E8A-4147-A177-3AD203B41FA5}">
+                      <a16:colId xmlns:a16="http://schemas.microsoft.com/office/drawing/2014/main" val="1657470181"/>
+                    </a:ext>
+                  </a:extLst>
+                </a:gridCol>
+              </a:tblGrid>
               <a:tr h="333518">
                 <a:tc>
                   <a:txBody>
@@ -11321,13 +12683,7 @@
           <p:cNvGraphicFramePr>
             <a:graphicFrameLocks noGrp="1"/>
           </p:cNvGraphicFramePr>
-          <p:nvPr>
-            <p:extLst>
-              <p:ext uri="{D42A27DB-BD31-4B8C-83A1-F6EECF244321}">
-                <p14:modId xmlns:p14="http://schemas.microsoft.com/office/powerpoint/2010/main" val="1457566905"/>
-              </p:ext>
-            </p:extLst>
-          </p:nvPr>
+          <p:nvPr/>
         </p:nvGraphicFramePr>
         <p:xfrm>
           <a:off x="5345663" y="2563430"/>
@@ -11398,13 +12754,7 @@
           <p:cNvGraphicFramePr>
             <a:graphicFrameLocks noGrp="1"/>
           </p:cNvGraphicFramePr>
-          <p:nvPr>
-            <p:extLst>
-              <p:ext uri="{D42A27DB-BD31-4B8C-83A1-F6EECF244321}">
-                <p14:modId xmlns:p14="http://schemas.microsoft.com/office/powerpoint/2010/main" val="2213426084"/>
-              </p:ext>
-            </p:extLst>
-          </p:nvPr>
+          <p:nvPr/>
         </p:nvGraphicFramePr>
         <p:xfrm>
           <a:off x="7353300" y="2560320"/>
@@ -12362,1355 +13712,6 @@
     </p:spTree>
     <p:extLst>
       <p:ext uri="{BB962C8B-B14F-4D97-AF65-F5344CB8AC3E}">
-        <p14:creationId xmlns:p14="http://schemas.microsoft.com/office/powerpoint/2010/main" val="748101416"/>
-      </p:ext>
-    </p:extLst>
-  </p:cSld>
-  <p:clrMapOvr>
-    <a:masterClrMapping/>
-  </p:clrMapOvr>
-</p:sld>
-</file>
-
-<file path=ppt/slides/slide12.xml><?xml version="1.0" encoding="utf-8"?>
-<p:sld xmlns:a="http://schemas.openxmlformats.org/drawingml/2006/main" xmlns:r="http://schemas.openxmlformats.org/officeDocument/2006/relationships" xmlns:p="http://schemas.openxmlformats.org/presentationml/2006/main">
-  <p:cSld>
-    <p:spTree>
-      <p:nvGrpSpPr>
-        <p:cNvPr id="1" name=""/>
-        <p:cNvGrpSpPr/>
-        <p:nvPr/>
-      </p:nvGrpSpPr>
-      <p:grpSpPr>
-        <a:xfrm>
-          <a:off x="0" y="0"/>
-          <a:ext cx="0" cy="0"/>
-          <a:chOff x="0" y="0"/>
-          <a:chExt cx="0" cy="0"/>
-        </a:xfrm>
-      </p:grpSpPr>
-      <p:sp>
-        <p:nvSpPr>
-          <p:cNvPr id="2" name="Slide Number Placeholder 1"/>
-          <p:cNvSpPr>
-            <a:spLocks noGrp="1"/>
-          </p:cNvSpPr>
-          <p:nvPr>
-            <p:ph type="sldNum" sz="quarter" idx="12"/>
-          </p:nvPr>
-        </p:nvSpPr>
-        <p:spPr/>
-        <p:txBody>
-          <a:bodyPr/>
-          <a:lstStyle/>
-          <a:p>
-            <a:fld id="{7C65DD3B-8E90-4815-956E-D18D24CB454B}" type="slidenum">
-              <a:rPr lang="en-US" smtClean="0"/>
-              <a:pPr/>
-              <a:t>12</a:t>
-            </a:fld>
-            <a:endParaRPr lang="en-US" dirty="0"/>
-          </a:p>
-        </p:txBody>
-      </p:sp>
-      <p:sp>
-        <p:nvSpPr>
-          <p:cNvPr id="3" name="Rectangle 2"/>
-          <p:cNvSpPr/>
-          <p:nvPr/>
-        </p:nvSpPr>
-        <p:spPr>
-          <a:xfrm>
-            <a:off x="228600" y="457200"/>
-            <a:ext cx="1447800" cy="1371600"/>
-          </a:xfrm>
-          <a:prstGeom prst="rect">
-            <a:avLst/>
-          </a:prstGeom>
-        </p:spPr>
-        <p:style>
-          <a:lnRef idx="1">
-            <a:schemeClr val="dk1"/>
-          </a:lnRef>
-          <a:fillRef idx="2">
-            <a:schemeClr val="dk1"/>
-          </a:fillRef>
-          <a:effectRef idx="1">
-            <a:schemeClr val="dk1"/>
-          </a:effectRef>
-          <a:fontRef idx="minor">
-            <a:schemeClr val="dk1"/>
-          </a:fontRef>
-        </p:style>
-        <p:txBody>
-          <a:bodyPr rtlCol="0" anchor="ctr"/>
-          <a:lstStyle/>
-          <a:p>
-            <a:pPr algn="ctr"/>
-            <a:r>
-              <a:rPr lang="en-US" dirty="0"/>
-              <a:t>INITIAL SCREEN</a:t>
-            </a:r>
-          </a:p>
-        </p:txBody>
-      </p:sp>
-      <p:sp>
-        <p:nvSpPr>
-          <p:cNvPr id="4" name="Rectangle 3"/>
-          <p:cNvSpPr/>
-          <p:nvPr/>
-        </p:nvSpPr>
-        <p:spPr>
-          <a:xfrm>
-            <a:off x="2362200" y="457200"/>
-            <a:ext cx="1447800" cy="1371600"/>
-          </a:xfrm>
-          <a:prstGeom prst="rect">
-            <a:avLst/>
-          </a:prstGeom>
-        </p:spPr>
-        <p:style>
-          <a:lnRef idx="1">
-            <a:schemeClr val="dk1"/>
-          </a:lnRef>
-          <a:fillRef idx="2">
-            <a:schemeClr val="dk1"/>
-          </a:fillRef>
-          <a:effectRef idx="1">
-            <a:schemeClr val="dk1"/>
-          </a:effectRef>
-          <a:fontRef idx="minor">
-            <a:schemeClr val="dk1"/>
-          </a:fontRef>
-        </p:style>
-        <p:txBody>
-          <a:bodyPr rtlCol="0" anchor="ctr"/>
-          <a:lstStyle/>
-          <a:p>
-            <a:pPr algn="ctr"/>
-            <a:r>
-              <a:rPr lang="en-US" dirty="0"/>
-              <a:t>DATA SCREEN LEVEL 1</a:t>
-            </a:r>
-          </a:p>
-        </p:txBody>
-      </p:sp>
-      <p:graphicFrame>
-        <p:nvGraphicFramePr>
-          <p:cNvPr id="5" name="Table 4"/>
-          <p:cNvGraphicFramePr>
-            <a:graphicFrameLocks noGrp="1"/>
-          </p:cNvGraphicFramePr>
-          <p:nvPr/>
-        </p:nvGraphicFramePr>
-        <p:xfrm>
-          <a:off x="1257300" y="2563430"/>
-          <a:ext cx="1447800" cy="365760"/>
-        </p:xfrm>
-        <a:graphic>
-          <a:graphicData uri="http://schemas.openxmlformats.org/drawingml/2006/table">
-            <a:tbl>
-              <a:tblPr firstRow="1" bandRow="1">
-                <a:tableStyleId>{5C22544A-7EE6-4342-B048-85BDC9FD1C3A}</a:tableStyleId>
-              </a:tblPr>
-              <a:tblGrid>
-                <a:gridCol w="1447800">
-                  <a:extLst>
-                    <a:ext uri="{9D8B030D-6E8A-4147-A177-3AD203B41FA5}">
-                      <a16:colId xmlns:a16="http://schemas.microsoft.com/office/drawing/2014/main" val="1657470181"/>
-                    </a:ext>
-                  </a:extLst>
-                </a:gridCol>
-              </a:tblGrid>
-              <a:tr h="294640">
-                <a:tc>
-                  <a:txBody>
-                    <a:bodyPr/>
-                    <a:lstStyle/>
-                    <a:p>
-                      <a:endParaRPr lang="en-US" dirty="0"/>
-                    </a:p>
-                  </a:txBody>
-                  <a:tcPr/>
-                </a:tc>
-                <a:extLst>
-                  <a:ext uri="{0D108BD9-81ED-4DB2-BD59-A6C34878D82A}">
-                    <a16:rowId xmlns:a16="http://schemas.microsoft.com/office/drawing/2014/main" val="1705318490"/>
-                  </a:ext>
-                </a:extLst>
-              </a:tr>
-            </a:tbl>
-          </a:graphicData>
-        </a:graphic>
-      </p:graphicFrame>
-      <p:graphicFrame>
-        <p:nvGraphicFramePr>
-          <p:cNvPr id="7" name="Table 6"/>
-          <p:cNvGraphicFramePr>
-            <a:graphicFrameLocks noGrp="1"/>
-          </p:cNvGraphicFramePr>
-          <p:nvPr/>
-        </p:nvGraphicFramePr>
-        <p:xfrm>
-          <a:off x="3352800" y="2560320"/>
-          <a:ext cx="1447800" cy="365760"/>
-        </p:xfrm>
-        <a:graphic>
-          <a:graphicData uri="http://schemas.openxmlformats.org/drawingml/2006/table">
-            <a:tbl>
-              <a:tblPr firstRow="1" bandRow="1">
-                <a:tableStyleId>{5C22544A-7EE6-4342-B048-85BDC9FD1C3A}</a:tableStyleId>
-              </a:tblPr>
-              <a:tblGrid>
-                <a:gridCol w="1447800">
-                  <a:extLst>
-                    <a:ext uri="{9D8B030D-6E8A-4147-A177-3AD203B41FA5}">
-                      <a16:colId xmlns:a16="http://schemas.microsoft.com/office/drawing/2014/main" val="1657470181"/>
-                    </a:ext>
-                  </a:extLst>
-                </a:gridCol>
-              </a:tblGrid>
-              <a:tr h="333518">
-                <a:tc>
-                  <a:txBody>
-                    <a:bodyPr/>
-                    <a:lstStyle/>
-                    <a:p>
-                      <a:r>
-                        <a:rPr lang="en-US" dirty="0"/>
-                        <a:t>1</a:t>
-                      </a:r>
-                    </a:p>
-                  </a:txBody>
-                  <a:tcPr/>
-                </a:tc>
-                <a:extLst>
-                  <a:ext uri="{0D108BD9-81ED-4DB2-BD59-A6C34878D82A}">
-                    <a16:rowId xmlns:a16="http://schemas.microsoft.com/office/drawing/2014/main" val="1705318490"/>
-                  </a:ext>
-                </a:extLst>
-              </a:tr>
-            </a:tbl>
-          </a:graphicData>
-        </a:graphic>
-      </p:graphicFrame>
-      <p:sp>
-        <p:nvSpPr>
-          <p:cNvPr id="8" name="Rectangle 7"/>
-          <p:cNvSpPr/>
-          <p:nvPr/>
-        </p:nvSpPr>
-        <p:spPr>
-          <a:xfrm>
-            <a:off x="4325516" y="457200"/>
-            <a:ext cx="1447800" cy="1371600"/>
-          </a:xfrm>
-          <a:prstGeom prst="rect">
-            <a:avLst/>
-          </a:prstGeom>
-        </p:spPr>
-        <p:style>
-          <a:lnRef idx="1">
-            <a:schemeClr val="dk1"/>
-          </a:lnRef>
-          <a:fillRef idx="2">
-            <a:schemeClr val="dk1"/>
-          </a:fillRef>
-          <a:effectRef idx="1">
-            <a:schemeClr val="dk1"/>
-          </a:effectRef>
-          <a:fontRef idx="minor">
-            <a:schemeClr val="dk1"/>
-          </a:fontRef>
-        </p:style>
-        <p:txBody>
-          <a:bodyPr rtlCol="0" anchor="ctr"/>
-          <a:lstStyle/>
-          <a:p>
-            <a:pPr algn="ctr"/>
-            <a:r>
-              <a:rPr lang="en-US" dirty="0"/>
-              <a:t>DATA SCREEN LEVEL 2</a:t>
-            </a:r>
-          </a:p>
-        </p:txBody>
-      </p:sp>
-      <p:sp>
-        <p:nvSpPr>
-          <p:cNvPr id="9" name="Rectangle 8"/>
-          <p:cNvSpPr/>
-          <p:nvPr/>
-        </p:nvSpPr>
-        <p:spPr>
-          <a:xfrm>
-            <a:off x="6288832" y="457200"/>
-            <a:ext cx="1447800" cy="1371600"/>
-          </a:xfrm>
-          <a:prstGeom prst="rect">
-            <a:avLst/>
-          </a:prstGeom>
-        </p:spPr>
-        <p:style>
-          <a:lnRef idx="1">
-            <a:schemeClr val="dk1"/>
-          </a:lnRef>
-          <a:fillRef idx="2">
-            <a:schemeClr val="dk1"/>
-          </a:fillRef>
-          <a:effectRef idx="1">
-            <a:schemeClr val="dk1"/>
-          </a:effectRef>
-          <a:fontRef idx="minor">
-            <a:schemeClr val="dk1"/>
-          </a:fontRef>
-        </p:style>
-        <p:txBody>
-          <a:bodyPr rtlCol="0" anchor="ctr"/>
-          <a:lstStyle/>
-          <a:p>
-            <a:pPr algn="ctr"/>
-            <a:r>
-              <a:rPr lang="en-US" dirty="0"/>
-              <a:t>DATA SCREEN LEVEL 3</a:t>
-            </a:r>
-          </a:p>
-        </p:txBody>
-      </p:sp>
-      <p:graphicFrame>
-        <p:nvGraphicFramePr>
-          <p:cNvPr id="10" name="Table 9"/>
-          <p:cNvGraphicFramePr>
-            <a:graphicFrameLocks noGrp="1"/>
-          </p:cNvGraphicFramePr>
-          <p:nvPr/>
-        </p:nvGraphicFramePr>
-        <p:xfrm>
-          <a:off x="5345663" y="2563430"/>
-          <a:ext cx="1447800" cy="731520"/>
-        </p:xfrm>
-        <a:graphic>
-          <a:graphicData uri="http://schemas.openxmlformats.org/drawingml/2006/table">
-            <a:tbl>
-              <a:tblPr firstRow="1" bandRow="1">
-                <a:tableStyleId>{5C22544A-7EE6-4342-B048-85BDC9FD1C3A}</a:tableStyleId>
-              </a:tblPr>
-              <a:tblGrid>
-                <a:gridCol w="1447800">
-                  <a:extLst>
-                    <a:ext uri="{9D8B030D-6E8A-4147-A177-3AD203B41FA5}">
-                      <a16:colId xmlns:a16="http://schemas.microsoft.com/office/drawing/2014/main" val="1657470181"/>
-                    </a:ext>
-                  </a:extLst>
-                </a:gridCol>
-              </a:tblGrid>
-              <a:tr h="333518">
-                <a:tc>
-                  <a:txBody>
-                    <a:bodyPr/>
-                    <a:lstStyle/>
-                    <a:p>
-                      <a:r>
-                        <a:rPr lang="en-US" dirty="0"/>
-                        <a:t>1</a:t>
-                      </a:r>
-                    </a:p>
-                  </a:txBody>
-                  <a:tcPr/>
-                </a:tc>
-                <a:extLst>
-                  <a:ext uri="{0D108BD9-81ED-4DB2-BD59-A6C34878D82A}">
-                    <a16:rowId xmlns:a16="http://schemas.microsoft.com/office/drawing/2014/main" val="1705318490"/>
-                  </a:ext>
-                </a:extLst>
-              </a:tr>
-              <a:tr h="333518">
-                <a:tc>
-                  <a:txBody>
-                    <a:bodyPr/>
-                    <a:lstStyle/>
-                    <a:p>
-                      <a:r>
-                        <a:rPr lang="en-US" dirty="0"/>
-                        <a:t>2</a:t>
-                      </a:r>
-                    </a:p>
-                  </a:txBody>
-                  <a:tcPr/>
-                </a:tc>
-                <a:extLst>
-                  <a:ext uri="{0D108BD9-81ED-4DB2-BD59-A6C34878D82A}">
-                    <a16:rowId xmlns:a16="http://schemas.microsoft.com/office/drawing/2014/main" val="2049377669"/>
-                  </a:ext>
-                </a:extLst>
-              </a:tr>
-            </a:tbl>
-          </a:graphicData>
-        </a:graphic>
-      </p:graphicFrame>
-      <p:graphicFrame>
-        <p:nvGraphicFramePr>
-          <p:cNvPr id="11" name="Table 10"/>
-          <p:cNvGraphicFramePr>
-            <a:graphicFrameLocks noGrp="1"/>
-          </p:cNvGraphicFramePr>
-          <p:nvPr/>
-        </p:nvGraphicFramePr>
-        <p:xfrm>
-          <a:off x="7353300" y="2560320"/>
-          <a:ext cx="1447800" cy="1097280"/>
-        </p:xfrm>
-        <a:graphic>
-          <a:graphicData uri="http://schemas.openxmlformats.org/drawingml/2006/table">
-            <a:tbl>
-              <a:tblPr firstRow="1" bandRow="1">
-                <a:tableStyleId>{5C22544A-7EE6-4342-B048-85BDC9FD1C3A}</a:tableStyleId>
-              </a:tblPr>
-              <a:tblGrid>
-                <a:gridCol w="1447800">
-                  <a:extLst>
-                    <a:ext uri="{9D8B030D-6E8A-4147-A177-3AD203B41FA5}">
-                      <a16:colId xmlns:a16="http://schemas.microsoft.com/office/drawing/2014/main" val="1657470181"/>
-                    </a:ext>
-                  </a:extLst>
-                </a:gridCol>
-              </a:tblGrid>
-              <a:tr h="333518">
-                <a:tc>
-                  <a:txBody>
-                    <a:bodyPr/>
-                    <a:lstStyle/>
-                    <a:p>
-                      <a:r>
-                        <a:rPr lang="en-US" dirty="0"/>
-                        <a:t>1</a:t>
-                      </a:r>
-                    </a:p>
-                  </a:txBody>
-                  <a:tcPr/>
-                </a:tc>
-                <a:extLst>
-                  <a:ext uri="{0D108BD9-81ED-4DB2-BD59-A6C34878D82A}">
-                    <a16:rowId xmlns:a16="http://schemas.microsoft.com/office/drawing/2014/main" val="1705318490"/>
-                  </a:ext>
-                </a:extLst>
-              </a:tr>
-              <a:tr h="333518">
-                <a:tc>
-                  <a:txBody>
-                    <a:bodyPr/>
-                    <a:lstStyle/>
-                    <a:p>
-                      <a:r>
-                        <a:rPr lang="en-US" dirty="0"/>
-                        <a:t>2</a:t>
-                      </a:r>
-                    </a:p>
-                  </a:txBody>
-                  <a:tcPr/>
-                </a:tc>
-                <a:extLst>
-                  <a:ext uri="{0D108BD9-81ED-4DB2-BD59-A6C34878D82A}">
-                    <a16:rowId xmlns:a16="http://schemas.microsoft.com/office/drawing/2014/main" val="4215921882"/>
-                  </a:ext>
-                </a:extLst>
-              </a:tr>
-              <a:tr h="333518">
-                <a:tc>
-                  <a:txBody>
-                    <a:bodyPr/>
-                    <a:lstStyle/>
-                    <a:p>
-                      <a:r>
-                        <a:rPr lang="en-US" dirty="0"/>
-                        <a:t>3</a:t>
-                      </a:r>
-                    </a:p>
-                  </a:txBody>
-                  <a:tcPr/>
-                </a:tc>
-                <a:extLst>
-                  <a:ext uri="{0D108BD9-81ED-4DB2-BD59-A6C34878D82A}">
-                    <a16:rowId xmlns:a16="http://schemas.microsoft.com/office/drawing/2014/main" val="1420056192"/>
-                  </a:ext>
-                </a:extLst>
-              </a:tr>
-            </a:tbl>
-          </a:graphicData>
-        </a:graphic>
-      </p:graphicFrame>
-      <p:cxnSp>
-        <p:nvCxnSpPr>
-          <p:cNvPr id="16" name="Elbow Connector 15"/>
-          <p:cNvCxnSpPr>
-            <a:stCxn id="3" idx="3"/>
-            <a:endCxn id="5" idx="0"/>
-          </p:cNvCxnSpPr>
-          <p:nvPr/>
-        </p:nvCxnSpPr>
-        <p:spPr>
-          <a:xfrm>
-            <a:off x="1676400" y="1143000"/>
-            <a:ext cx="304800" cy="1420430"/>
-          </a:xfrm>
-          <a:prstGeom prst="bentConnector2">
-            <a:avLst/>
-          </a:prstGeom>
-          <a:ln>
-            <a:tailEnd type="triangle"/>
-          </a:ln>
-        </p:spPr>
-        <p:style>
-          <a:lnRef idx="1">
-            <a:schemeClr val="accent1"/>
-          </a:lnRef>
-          <a:fillRef idx="0">
-            <a:schemeClr val="accent1"/>
-          </a:fillRef>
-          <a:effectRef idx="0">
-            <a:schemeClr val="accent1"/>
-          </a:effectRef>
-          <a:fontRef idx="minor">
-            <a:schemeClr val="tx1"/>
-          </a:fontRef>
-        </p:style>
-      </p:cxnSp>
-      <p:cxnSp>
-        <p:nvCxnSpPr>
-          <p:cNvPr id="18" name="Elbow Connector 17"/>
-          <p:cNvCxnSpPr>
-            <a:stCxn id="4" idx="3"/>
-            <a:endCxn id="7" idx="0"/>
-          </p:cNvCxnSpPr>
-          <p:nvPr/>
-        </p:nvCxnSpPr>
-        <p:spPr>
-          <a:xfrm>
-            <a:off x="3810000" y="1143000"/>
-            <a:ext cx="266700" cy="1417320"/>
-          </a:xfrm>
-          <a:prstGeom prst="bentConnector2">
-            <a:avLst/>
-          </a:prstGeom>
-          <a:ln>
-            <a:tailEnd type="triangle"/>
-          </a:ln>
-        </p:spPr>
-        <p:style>
-          <a:lnRef idx="1">
-            <a:schemeClr val="accent1"/>
-          </a:lnRef>
-          <a:fillRef idx="0">
-            <a:schemeClr val="accent1"/>
-          </a:fillRef>
-          <a:effectRef idx="0">
-            <a:schemeClr val="accent1"/>
-          </a:effectRef>
-          <a:fontRef idx="minor">
-            <a:schemeClr val="tx1"/>
-          </a:fontRef>
-        </p:style>
-      </p:cxnSp>
-      <p:cxnSp>
-        <p:nvCxnSpPr>
-          <p:cNvPr id="20" name="Elbow Connector 19"/>
-          <p:cNvCxnSpPr>
-            <a:stCxn id="8" idx="3"/>
-            <a:endCxn id="10" idx="0"/>
-          </p:cNvCxnSpPr>
-          <p:nvPr/>
-        </p:nvCxnSpPr>
-        <p:spPr>
-          <a:xfrm>
-            <a:off x="5773316" y="1143000"/>
-            <a:ext cx="296247" cy="1420430"/>
-          </a:xfrm>
-          <a:prstGeom prst="bentConnector2">
-            <a:avLst/>
-          </a:prstGeom>
-          <a:ln>
-            <a:tailEnd type="triangle"/>
-          </a:ln>
-        </p:spPr>
-        <p:style>
-          <a:lnRef idx="1">
-            <a:schemeClr val="accent1"/>
-          </a:lnRef>
-          <a:fillRef idx="0">
-            <a:schemeClr val="accent1"/>
-          </a:fillRef>
-          <a:effectRef idx="0">
-            <a:schemeClr val="accent1"/>
-          </a:effectRef>
-          <a:fontRef idx="minor">
-            <a:schemeClr val="tx1"/>
-          </a:fontRef>
-        </p:style>
-      </p:cxnSp>
-      <p:cxnSp>
-        <p:nvCxnSpPr>
-          <p:cNvPr id="22" name="Elbow Connector 21"/>
-          <p:cNvCxnSpPr>
-            <a:stCxn id="9" idx="3"/>
-            <a:endCxn id="11" idx="0"/>
-          </p:cNvCxnSpPr>
-          <p:nvPr/>
-        </p:nvCxnSpPr>
-        <p:spPr>
-          <a:xfrm>
-            <a:off x="7736632" y="1143000"/>
-            <a:ext cx="340568" cy="1417320"/>
-          </a:xfrm>
-          <a:prstGeom prst="bentConnector2">
-            <a:avLst/>
-          </a:prstGeom>
-          <a:ln>
-            <a:tailEnd type="triangle"/>
-          </a:ln>
-        </p:spPr>
-        <p:style>
-          <a:lnRef idx="1">
-            <a:schemeClr val="accent1"/>
-          </a:lnRef>
-          <a:fillRef idx="0">
-            <a:schemeClr val="accent1"/>
-          </a:fillRef>
-          <a:effectRef idx="0">
-            <a:schemeClr val="accent1"/>
-          </a:effectRef>
-          <a:fontRef idx="minor">
-            <a:schemeClr val="tx1"/>
-          </a:fontRef>
-        </p:style>
-      </p:cxnSp>
-      <p:sp>
-        <p:nvSpPr>
-          <p:cNvPr id="23" name="Right Arrow 22"/>
-          <p:cNvSpPr/>
-          <p:nvPr/>
-        </p:nvSpPr>
-        <p:spPr>
-          <a:xfrm>
-            <a:off x="1844350" y="609600"/>
-            <a:ext cx="381000" cy="381000"/>
-          </a:xfrm>
-          <a:prstGeom prst="rightArrow">
-            <a:avLst/>
-          </a:prstGeom>
-        </p:spPr>
-        <p:style>
-          <a:lnRef idx="2">
-            <a:schemeClr val="accent1">
-              <a:shade val="50000"/>
-            </a:schemeClr>
-          </a:lnRef>
-          <a:fillRef idx="1">
-            <a:schemeClr val="accent1"/>
-          </a:fillRef>
-          <a:effectRef idx="0">
-            <a:schemeClr val="accent1"/>
-          </a:effectRef>
-          <a:fontRef idx="minor">
-            <a:schemeClr val="lt1"/>
-          </a:fontRef>
-        </p:style>
-        <p:txBody>
-          <a:bodyPr rtlCol="0" anchor="ctr"/>
-          <a:lstStyle/>
-          <a:p>
-            <a:pPr algn="ctr"/>
-            <a:endParaRPr lang="en-US"/>
-          </a:p>
-        </p:txBody>
-      </p:sp>
-      <p:sp>
-        <p:nvSpPr>
-          <p:cNvPr id="24" name="Right Arrow 23"/>
-          <p:cNvSpPr/>
-          <p:nvPr/>
-        </p:nvSpPr>
-        <p:spPr>
-          <a:xfrm>
-            <a:off x="3868316" y="609600"/>
-            <a:ext cx="381000" cy="381000"/>
-          </a:xfrm>
-          <a:prstGeom prst="rightArrow">
-            <a:avLst/>
-          </a:prstGeom>
-        </p:spPr>
-        <p:style>
-          <a:lnRef idx="2">
-            <a:schemeClr val="accent1">
-              <a:shade val="50000"/>
-            </a:schemeClr>
-          </a:lnRef>
-          <a:fillRef idx="1">
-            <a:schemeClr val="accent1"/>
-          </a:fillRef>
-          <a:effectRef idx="0">
-            <a:schemeClr val="accent1"/>
-          </a:effectRef>
-          <a:fontRef idx="minor">
-            <a:schemeClr val="lt1"/>
-          </a:fontRef>
-        </p:style>
-        <p:txBody>
-          <a:bodyPr rtlCol="0" anchor="ctr"/>
-          <a:lstStyle/>
-          <a:p>
-            <a:pPr algn="ctr"/>
-            <a:endParaRPr lang="en-US"/>
-          </a:p>
-        </p:txBody>
-      </p:sp>
-      <p:sp>
-        <p:nvSpPr>
-          <p:cNvPr id="25" name="Right Arrow 24"/>
-          <p:cNvSpPr/>
-          <p:nvPr/>
-        </p:nvSpPr>
-        <p:spPr>
-          <a:xfrm>
-            <a:off x="5840574" y="609600"/>
-            <a:ext cx="381000" cy="381000"/>
-          </a:xfrm>
-          <a:prstGeom prst="rightArrow">
-            <a:avLst/>
-          </a:prstGeom>
-        </p:spPr>
-        <p:style>
-          <a:lnRef idx="2">
-            <a:schemeClr val="accent1">
-              <a:shade val="50000"/>
-            </a:schemeClr>
-          </a:lnRef>
-          <a:fillRef idx="1">
-            <a:schemeClr val="accent1"/>
-          </a:fillRef>
-          <a:effectRef idx="0">
-            <a:schemeClr val="accent1"/>
-          </a:effectRef>
-          <a:fontRef idx="minor">
-            <a:schemeClr val="lt1"/>
-          </a:fontRef>
-        </p:style>
-        <p:txBody>
-          <a:bodyPr rtlCol="0" anchor="ctr"/>
-          <a:lstStyle/>
-          <a:p>
-            <a:pPr algn="ctr"/>
-            <a:endParaRPr lang="en-US"/>
-          </a:p>
-        </p:txBody>
-      </p:sp>
-      <p:sp>
-        <p:nvSpPr>
-          <p:cNvPr id="27" name="TextBox 26"/>
-          <p:cNvSpPr txBox="1"/>
-          <p:nvPr/>
-        </p:nvSpPr>
-        <p:spPr>
-          <a:xfrm>
-            <a:off x="1152331" y="2201583"/>
-            <a:ext cx="990600" cy="276999"/>
-          </a:xfrm>
-          <a:prstGeom prst="rect">
-            <a:avLst/>
-          </a:prstGeom>
-          <a:noFill/>
-        </p:spPr>
-        <p:txBody>
-          <a:bodyPr wrap="square" rtlCol="0">
-            <a:spAutoFit/>
-          </a:bodyPr>
-          <a:lstStyle/>
-          <a:p>
-            <a:pPr algn="ctr"/>
-            <a:r>
-              <a:rPr lang="en-US" sz="1200" dirty="0"/>
-              <a:t>Clear</a:t>
-            </a:r>
-          </a:p>
-        </p:txBody>
-      </p:sp>
-      <p:sp>
-        <p:nvSpPr>
-          <p:cNvPr id="28" name="TextBox 27"/>
-          <p:cNvSpPr txBox="1"/>
-          <p:nvPr/>
-        </p:nvSpPr>
-        <p:spPr>
-          <a:xfrm>
-            <a:off x="3152969" y="2226369"/>
-            <a:ext cx="990600" cy="276999"/>
-          </a:xfrm>
-          <a:prstGeom prst="rect">
-            <a:avLst/>
-          </a:prstGeom>
-          <a:noFill/>
-        </p:spPr>
-        <p:txBody>
-          <a:bodyPr wrap="square" rtlCol="0">
-            <a:spAutoFit/>
-          </a:bodyPr>
-          <a:lstStyle/>
-          <a:p>
-            <a:pPr algn="ctr"/>
-            <a:r>
-              <a:rPr lang="en-US" sz="1200" dirty="0"/>
-              <a:t>Push 1</a:t>
-            </a:r>
-          </a:p>
-        </p:txBody>
-      </p:sp>
-      <p:sp>
-        <p:nvSpPr>
-          <p:cNvPr id="29" name="TextBox 28"/>
-          <p:cNvSpPr txBox="1"/>
-          <p:nvPr/>
-        </p:nvSpPr>
-        <p:spPr>
-          <a:xfrm>
-            <a:off x="5049416" y="2197814"/>
-            <a:ext cx="990600" cy="276999"/>
-          </a:xfrm>
-          <a:prstGeom prst="rect">
-            <a:avLst/>
-          </a:prstGeom>
-          <a:noFill/>
-        </p:spPr>
-        <p:txBody>
-          <a:bodyPr wrap="square" rtlCol="0">
-            <a:spAutoFit/>
-          </a:bodyPr>
-          <a:lstStyle/>
-          <a:p>
-            <a:pPr algn="ctr"/>
-            <a:r>
-              <a:rPr lang="en-US" sz="1200" dirty="0"/>
-              <a:t>Push 2</a:t>
-            </a:r>
-          </a:p>
-        </p:txBody>
-      </p:sp>
-      <p:sp>
-        <p:nvSpPr>
-          <p:cNvPr id="30" name="TextBox 29"/>
-          <p:cNvSpPr txBox="1"/>
-          <p:nvPr/>
-        </p:nvSpPr>
-        <p:spPr>
-          <a:xfrm>
-            <a:off x="7124700" y="2202037"/>
-            <a:ext cx="990600" cy="276999"/>
-          </a:xfrm>
-          <a:prstGeom prst="rect">
-            <a:avLst/>
-          </a:prstGeom>
-          <a:noFill/>
-        </p:spPr>
-        <p:txBody>
-          <a:bodyPr wrap="square" rtlCol="0">
-            <a:spAutoFit/>
-          </a:bodyPr>
-          <a:lstStyle/>
-          <a:p>
-            <a:pPr algn="ctr"/>
-            <a:r>
-              <a:rPr lang="en-US" sz="1200" dirty="0"/>
-              <a:t>Push 3</a:t>
-            </a:r>
-          </a:p>
-        </p:txBody>
-      </p:sp>
-      <p:sp>
-        <p:nvSpPr>
-          <p:cNvPr id="31" name="Rectangle 30"/>
-          <p:cNvSpPr/>
-          <p:nvPr/>
-        </p:nvSpPr>
-        <p:spPr>
-          <a:xfrm>
-            <a:off x="228600" y="4309656"/>
-            <a:ext cx="1447800" cy="1371600"/>
-          </a:xfrm>
-          <a:prstGeom prst="rect">
-            <a:avLst/>
-          </a:prstGeom>
-        </p:spPr>
-        <p:style>
-          <a:lnRef idx="1">
-            <a:schemeClr val="dk1"/>
-          </a:lnRef>
-          <a:fillRef idx="2">
-            <a:schemeClr val="dk1"/>
-          </a:fillRef>
-          <a:effectRef idx="1">
-            <a:schemeClr val="dk1"/>
-          </a:effectRef>
-          <a:fontRef idx="minor">
-            <a:schemeClr val="dk1"/>
-          </a:fontRef>
-        </p:style>
-        <p:txBody>
-          <a:bodyPr rtlCol="0" anchor="ctr"/>
-          <a:lstStyle/>
-          <a:p>
-            <a:pPr algn="ctr"/>
-            <a:r>
-              <a:rPr lang="en-US" dirty="0"/>
-              <a:t>INITIAL SCREEN</a:t>
-            </a:r>
-          </a:p>
-        </p:txBody>
-      </p:sp>
-      <p:sp>
-        <p:nvSpPr>
-          <p:cNvPr id="32" name="Rectangle 31"/>
-          <p:cNvSpPr/>
-          <p:nvPr/>
-        </p:nvSpPr>
-        <p:spPr>
-          <a:xfrm>
-            <a:off x="2362200" y="4309656"/>
-            <a:ext cx="1447800" cy="1371600"/>
-          </a:xfrm>
-          <a:prstGeom prst="rect">
-            <a:avLst/>
-          </a:prstGeom>
-        </p:spPr>
-        <p:style>
-          <a:lnRef idx="1">
-            <a:schemeClr val="dk1"/>
-          </a:lnRef>
-          <a:fillRef idx="2">
-            <a:schemeClr val="dk1"/>
-          </a:fillRef>
-          <a:effectRef idx="1">
-            <a:schemeClr val="dk1"/>
-          </a:effectRef>
-          <a:fontRef idx="minor">
-            <a:schemeClr val="dk1"/>
-          </a:fontRef>
-        </p:style>
-        <p:txBody>
-          <a:bodyPr rtlCol="0" anchor="ctr"/>
-          <a:lstStyle/>
-          <a:p>
-            <a:pPr algn="ctr"/>
-            <a:r>
-              <a:rPr lang="en-US" dirty="0"/>
-              <a:t>DATA SCREEN LEVEL 1</a:t>
-            </a:r>
-          </a:p>
-        </p:txBody>
-      </p:sp>
-      <p:sp>
-        <p:nvSpPr>
-          <p:cNvPr id="33" name="Rectangle 32"/>
-          <p:cNvSpPr/>
-          <p:nvPr/>
-        </p:nvSpPr>
-        <p:spPr>
-          <a:xfrm>
-            <a:off x="4325516" y="4309656"/>
-            <a:ext cx="1447800" cy="1371600"/>
-          </a:xfrm>
-          <a:prstGeom prst="rect">
-            <a:avLst/>
-          </a:prstGeom>
-        </p:spPr>
-        <p:style>
-          <a:lnRef idx="1">
-            <a:schemeClr val="dk1"/>
-          </a:lnRef>
-          <a:fillRef idx="2">
-            <a:schemeClr val="dk1"/>
-          </a:fillRef>
-          <a:effectRef idx="1">
-            <a:schemeClr val="dk1"/>
-          </a:effectRef>
-          <a:fontRef idx="minor">
-            <a:schemeClr val="dk1"/>
-          </a:fontRef>
-        </p:style>
-        <p:txBody>
-          <a:bodyPr rtlCol="0" anchor="ctr"/>
-          <a:lstStyle/>
-          <a:p>
-            <a:pPr algn="ctr"/>
-            <a:r>
-              <a:rPr lang="en-US" dirty="0"/>
-              <a:t>DATA SCREEN LEVEL 2</a:t>
-            </a:r>
-          </a:p>
-        </p:txBody>
-      </p:sp>
-      <p:sp>
-        <p:nvSpPr>
-          <p:cNvPr id="34" name="Rectangle 33"/>
-          <p:cNvSpPr/>
-          <p:nvPr/>
-        </p:nvSpPr>
-        <p:spPr>
-          <a:xfrm>
-            <a:off x="6288832" y="4309656"/>
-            <a:ext cx="1447800" cy="1371600"/>
-          </a:xfrm>
-          <a:prstGeom prst="rect">
-            <a:avLst/>
-          </a:prstGeom>
-        </p:spPr>
-        <p:style>
-          <a:lnRef idx="1">
-            <a:schemeClr val="dk1"/>
-          </a:lnRef>
-          <a:fillRef idx="2">
-            <a:schemeClr val="dk1"/>
-          </a:fillRef>
-          <a:effectRef idx="1">
-            <a:schemeClr val="dk1"/>
-          </a:effectRef>
-          <a:fontRef idx="minor">
-            <a:schemeClr val="dk1"/>
-          </a:fontRef>
-        </p:style>
-        <p:txBody>
-          <a:bodyPr rtlCol="0" anchor="ctr"/>
-          <a:lstStyle/>
-          <a:p>
-            <a:pPr algn="ctr"/>
-            <a:r>
-              <a:rPr lang="en-US" dirty="0"/>
-              <a:t>DATA SCREEN LEVEL 3</a:t>
-            </a:r>
-          </a:p>
-        </p:txBody>
-      </p:sp>
-      <p:sp>
-        <p:nvSpPr>
-          <p:cNvPr id="35" name="Right Arrow 34"/>
-          <p:cNvSpPr/>
-          <p:nvPr/>
-        </p:nvSpPr>
-        <p:spPr>
-          <a:xfrm>
-            <a:off x="7812054" y="609600"/>
-            <a:ext cx="381000" cy="381000"/>
-          </a:xfrm>
-          <a:prstGeom prst="rightArrow">
-            <a:avLst/>
-          </a:prstGeom>
-        </p:spPr>
-        <p:style>
-          <a:lnRef idx="2">
-            <a:schemeClr val="accent1">
-              <a:shade val="50000"/>
-            </a:schemeClr>
-          </a:lnRef>
-          <a:fillRef idx="1">
-            <a:schemeClr val="accent1"/>
-          </a:fillRef>
-          <a:effectRef idx="0">
-            <a:schemeClr val="accent1"/>
-          </a:effectRef>
-          <a:fontRef idx="minor">
-            <a:schemeClr val="lt1"/>
-          </a:fontRef>
-        </p:style>
-        <p:txBody>
-          <a:bodyPr rtlCol="0" anchor="ctr"/>
-          <a:lstStyle/>
-          <a:p>
-            <a:pPr algn="ctr"/>
-            <a:endParaRPr lang="en-US"/>
-          </a:p>
-        </p:txBody>
-      </p:sp>
-      <p:cxnSp>
-        <p:nvCxnSpPr>
-          <p:cNvPr id="37" name="Elbow Connector 36"/>
-          <p:cNvCxnSpPr>
-            <a:stCxn id="34" idx="1"/>
-            <a:endCxn id="10" idx="2"/>
-          </p:cNvCxnSpPr>
-          <p:nvPr/>
-        </p:nvCxnSpPr>
-        <p:spPr>
-          <a:xfrm rot="10800000">
-            <a:off x="6069564" y="3294950"/>
-            <a:ext cx="219269" cy="1700506"/>
-          </a:xfrm>
-          <a:prstGeom prst="bentConnector2">
-            <a:avLst/>
-          </a:prstGeom>
-          <a:ln>
-            <a:headEnd type="triangle"/>
-            <a:tailEnd type="none"/>
-          </a:ln>
-        </p:spPr>
-        <p:style>
-          <a:lnRef idx="1">
-            <a:schemeClr val="accent1"/>
-          </a:lnRef>
-          <a:fillRef idx="0">
-            <a:schemeClr val="accent1"/>
-          </a:fillRef>
-          <a:effectRef idx="0">
-            <a:schemeClr val="accent1"/>
-          </a:effectRef>
-          <a:fontRef idx="minor">
-            <a:schemeClr val="tx1"/>
-          </a:fontRef>
-        </p:style>
-      </p:cxnSp>
-      <p:sp>
-        <p:nvSpPr>
-          <p:cNvPr id="38" name="TextBox 37"/>
-          <p:cNvSpPr txBox="1"/>
-          <p:nvPr/>
-        </p:nvSpPr>
-        <p:spPr>
-          <a:xfrm>
-            <a:off x="5086738" y="3360850"/>
-            <a:ext cx="990600" cy="276999"/>
-          </a:xfrm>
-          <a:prstGeom prst="rect">
-            <a:avLst/>
-          </a:prstGeom>
-          <a:noFill/>
-        </p:spPr>
-        <p:txBody>
-          <a:bodyPr wrap="square" rtlCol="0">
-            <a:spAutoFit/>
-          </a:bodyPr>
-          <a:lstStyle/>
-          <a:p>
-            <a:pPr algn="ctr"/>
-            <a:r>
-              <a:rPr lang="en-US" sz="1200" dirty="0"/>
-              <a:t>Pop 2</a:t>
-            </a:r>
-          </a:p>
-        </p:txBody>
-      </p:sp>
-      <p:cxnSp>
-        <p:nvCxnSpPr>
-          <p:cNvPr id="40" name="Elbow Connector 39"/>
-          <p:cNvCxnSpPr>
-            <a:stCxn id="33" idx="1"/>
-            <a:endCxn id="7" idx="2"/>
-          </p:cNvCxnSpPr>
-          <p:nvPr/>
-        </p:nvCxnSpPr>
-        <p:spPr>
-          <a:xfrm rot="10800000">
-            <a:off x="4076700" y="2926080"/>
-            <a:ext cx="248816" cy="2069376"/>
-          </a:xfrm>
-          <a:prstGeom prst="bentConnector2">
-            <a:avLst/>
-          </a:prstGeom>
-          <a:ln>
-            <a:headEnd type="triangle"/>
-            <a:tailEnd type="none"/>
-          </a:ln>
-        </p:spPr>
-        <p:style>
-          <a:lnRef idx="1">
-            <a:schemeClr val="accent1"/>
-          </a:lnRef>
-          <a:fillRef idx="0">
-            <a:schemeClr val="accent1"/>
-          </a:fillRef>
-          <a:effectRef idx="0">
-            <a:schemeClr val="accent1"/>
-          </a:effectRef>
-          <a:fontRef idx="minor">
-            <a:schemeClr val="tx1"/>
-          </a:fontRef>
-        </p:style>
-      </p:cxnSp>
-      <p:sp>
-        <p:nvSpPr>
-          <p:cNvPr id="41" name="TextBox 40"/>
-          <p:cNvSpPr txBox="1"/>
-          <p:nvPr/>
-        </p:nvSpPr>
-        <p:spPr>
-          <a:xfrm>
-            <a:off x="3170852" y="2991013"/>
-            <a:ext cx="990600" cy="276999"/>
-          </a:xfrm>
-          <a:prstGeom prst="rect">
-            <a:avLst/>
-          </a:prstGeom>
-          <a:noFill/>
-        </p:spPr>
-        <p:txBody>
-          <a:bodyPr wrap="square" rtlCol="0">
-            <a:spAutoFit/>
-          </a:bodyPr>
-          <a:lstStyle/>
-          <a:p>
-            <a:pPr algn="ctr"/>
-            <a:r>
-              <a:rPr lang="en-US" sz="1200" dirty="0"/>
-              <a:t>Pop 1</a:t>
-            </a:r>
-          </a:p>
-        </p:txBody>
-      </p:sp>
-      <p:sp>
-        <p:nvSpPr>
-          <p:cNvPr id="42" name="Right Arrow 41"/>
-          <p:cNvSpPr/>
-          <p:nvPr/>
-        </p:nvSpPr>
-        <p:spPr>
-          <a:xfrm rot="10800000">
-            <a:off x="5856914" y="5263756"/>
-            <a:ext cx="367736" cy="406301"/>
-          </a:xfrm>
-          <a:prstGeom prst="rightArrow">
-            <a:avLst/>
-          </a:prstGeom>
-        </p:spPr>
-        <p:style>
-          <a:lnRef idx="2">
-            <a:schemeClr val="accent1">
-              <a:shade val="50000"/>
-            </a:schemeClr>
-          </a:lnRef>
-          <a:fillRef idx="1">
-            <a:schemeClr val="accent1"/>
-          </a:fillRef>
-          <a:effectRef idx="0">
-            <a:schemeClr val="accent1"/>
-          </a:effectRef>
-          <a:fontRef idx="minor">
-            <a:schemeClr val="lt1"/>
-          </a:fontRef>
-        </p:style>
-        <p:txBody>
-          <a:bodyPr rtlCol="0" anchor="ctr"/>
-          <a:lstStyle/>
-          <a:p>
-            <a:pPr algn="ctr"/>
-            <a:endParaRPr lang="en-US"/>
-          </a:p>
-        </p:txBody>
-      </p:sp>
-      <p:sp>
-        <p:nvSpPr>
-          <p:cNvPr id="43" name="Right Arrow 42"/>
-          <p:cNvSpPr/>
-          <p:nvPr/>
-        </p:nvSpPr>
-        <p:spPr>
-          <a:xfrm rot="10800000">
-            <a:off x="3893598" y="5263757"/>
-            <a:ext cx="367736" cy="406301"/>
-          </a:xfrm>
-          <a:prstGeom prst="rightArrow">
-            <a:avLst/>
-          </a:prstGeom>
-        </p:spPr>
-        <p:style>
-          <a:lnRef idx="2">
-            <a:schemeClr val="accent1">
-              <a:shade val="50000"/>
-            </a:schemeClr>
-          </a:lnRef>
-          <a:fillRef idx="1">
-            <a:schemeClr val="accent1"/>
-          </a:fillRef>
-          <a:effectRef idx="0">
-            <a:schemeClr val="accent1"/>
-          </a:effectRef>
-          <a:fontRef idx="minor">
-            <a:schemeClr val="lt1"/>
-          </a:fontRef>
-        </p:style>
-        <p:txBody>
-          <a:bodyPr rtlCol="0" anchor="ctr"/>
-          <a:lstStyle/>
-          <a:p>
-            <a:pPr algn="ctr"/>
-            <a:endParaRPr lang="en-US"/>
-          </a:p>
-        </p:txBody>
-      </p:sp>
-      <p:sp>
-        <p:nvSpPr>
-          <p:cNvPr id="45" name="Left Brace 44"/>
-          <p:cNvSpPr/>
-          <p:nvPr/>
-        </p:nvSpPr>
-        <p:spPr>
-          <a:xfrm>
-            <a:off x="677248" y="2336313"/>
-            <a:ext cx="475084" cy="1473687"/>
-          </a:xfrm>
-          <a:prstGeom prst="leftBrace">
-            <a:avLst/>
-          </a:prstGeom>
-        </p:spPr>
-        <p:style>
-          <a:lnRef idx="1">
-            <a:schemeClr val="accent1"/>
-          </a:lnRef>
-          <a:fillRef idx="0">
-            <a:schemeClr val="accent1"/>
-          </a:fillRef>
-          <a:effectRef idx="0">
-            <a:schemeClr val="accent1"/>
-          </a:effectRef>
-          <a:fontRef idx="minor">
-            <a:schemeClr val="tx1"/>
-          </a:fontRef>
-        </p:style>
-        <p:txBody>
-          <a:bodyPr rtlCol="0" anchor="ctr"/>
-          <a:lstStyle/>
-          <a:p>
-            <a:pPr algn="ctr"/>
-            <a:endParaRPr lang="en-US"/>
-          </a:p>
-        </p:txBody>
-      </p:sp>
-      <p:sp>
-        <p:nvSpPr>
-          <p:cNvPr id="46" name="TextBox 45"/>
-          <p:cNvSpPr txBox="1"/>
-          <p:nvPr/>
-        </p:nvSpPr>
-        <p:spPr>
-          <a:xfrm>
-            <a:off x="-102635" y="2814935"/>
-            <a:ext cx="990600" cy="461665"/>
-          </a:xfrm>
-          <a:prstGeom prst="rect">
-            <a:avLst/>
-          </a:prstGeom>
-          <a:noFill/>
-        </p:spPr>
-        <p:txBody>
-          <a:bodyPr wrap="square" rtlCol="0">
-            <a:spAutoFit/>
-          </a:bodyPr>
-          <a:lstStyle/>
-          <a:p>
-            <a:pPr algn="ctr"/>
-            <a:r>
-              <a:rPr lang="en-US" sz="1200" dirty="0"/>
-              <a:t>Stack Collection</a:t>
-            </a:r>
-          </a:p>
-        </p:txBody>
-      </p:sp>
-    </p:spTree>
-    <p:extLst>
-      <p:ext uri="{BB962C8B-B14F-4D97-AF65-F5344CB8AC3E}">
         <p14:creationId xmlns:p14="http://schemas.microsoft.com/office/powerpoint/2010/main" val="1233324448"/>
       </p:ext>
     </p:extLst>
@@ -14945,6 +14946,620 @@
     <p:extLst>
       <p:ext uri="{BB962C8B-B14F-4D97-AF65-F5344CB8AC3E}">
         <p14:creationId xmlns:p14="http://schemas.microsoft.com/office/powerpoint/2010/main" val="751263954"/>
+      </p:ext>
+    </p:extLst>
+  </p:cSld>
+  <p:clrMapOvr>
+    <a:masterClrMapping/>
+  </p:clrMapOvr>
+</p:sld>
+</file>
+
+<file path=ppt/slides/slide16.xml><?xml version="1.0" encoding="utf-8"?>
+<p:sld xmlns:a="http://schemas.openxmlformats.org/drawingml/2006/main" xmlns:r="http://schemas.openxmlformats.org/officeDocument/2006/relationships" xmlns:p="http://schemas.openxmlformats.org/presentationml/2006/main">
+  <p:cSld>
+    <p:spTree>
+      <p:nvGrpSpPr>
+        <p:cNvPr id="1" name=""/>
+        <p:cNvGrpSpPr/>
+        <p:nvPr/>
+      </p:nvGrpSpPr>
+      <p:grpSpPr>
+        <a:xfrm>
+          <a:off x="0" y="0"/>
+          <a:ext cx="0" cy="0"/>
+          <a:chOff x="0" y="0"/>
+          <a:chExt cx="0" cy="0"/>
+        </a:xfrm>
+      </p:grpSpPr>
+      <p:sp>
+        <p:nvSpPr>
+          <p:cNvPr id="10" name="Rectangle 9"/>
+          <p:cNvSpPr/>
+          <p:nvPr/>
+        </p:nvSpPr>
+        <p:spPr bwMode="auto">
+          <a:xfrm>
+            <a:off x="381000" y="1143000"/>
+            <a:ext cx="8381921" cy="4114800"/>
+          </a:xfrm>
+          <a:prstGeom prst="rect">
+            <a:avLst/>
+          </a:prstGeom>
+          <a:solidFill>
+            <a:schemeClr val="accent3"/>
+          </a:solidFill>
+          <a:ln w="19050" cap="flat" cmpd="sng" algn="ctr">
+            <a:solidFill>
+              <a:schemeClr val="tx1"/>
+            </a:solidFill>
+            <a:prstDash val="solid"/>
+            <a:round/>
+            <a:headEnd type="none" w="sm" len="sm"/>
+            <a:tailEnd type="triangle" w="lg" len="lg"/>
+          </a:ln>
+          <a:effectLst/>
+        </p:spPr>
+        <p:txBody>
+          <a:bodyPr vert="horz" wrap="square" lIns="45720" tIns="45720" rIns="45720" bIns="45720" numCol="1" rtlCol="0" anchor="t" anchorCtr="1" compatLnSpc="1">
+            <a:prstTxWarp prst="textNoShape">
+              <a:avLst/>
+            </a:prstTxWarp>
+            <a:noAutofit/>
+          </a:bodyPr>
+          <a:lstStyle/>
+          <a:p>
+            <a:pPr algn="ctr"/>
+            <a:r>
+              <a:rPr lang="en-US" b="1" dirty="0">
+                <a:latin typeface="Segoe UI Light" panose="020B0502040204020203" pitchFamily="34" charset="0"/>
+                <a:cs typeface="Segoe UI Light" panose="020B0502040204020203" pitchFamily="34" charset="0"/>
+              </a:rPr>
+              <a:t>Cluster</a:t>
+            </a:r>
+            <a:br>
+              <a:rPr lang="en-US" b="1" dirty="0">
+                <a:latin typeface="Segoe UI Light" panose="020B0502040204020203" pitchFamily="34" charset="0"/>
+                <a:cs typeface="Segoe UI Light" panose="020B0502040204020203" pitchFamily="34" charset="0"/>
+              </a:rPr>
+            </a:br>
+            <a:r>
+              <a:rPr lang="en-US" dirty="0">
+                <a:latin typeface="Segoe UI Light" panose="020B0502040204020203" pitchFamily="34" charset="0"/>
+                <a:cs typeface="Segoe UI Light" panose="020B0502040204020203" pitchFamily="34" charset="0"/>
+              </a:rPr>
+              <a:t>Management, Billing (VMs), Geolocation, Multitenancy</a:t>
+            </a:r>
+          </a:p>
+        </p:txBody>
+      </p:sp>
+      <p:sp>
+        <p:nvSpPr>
+          <p:cNvPr id="11" name="Rectangle 10"/>
+          <p:cNvSpPr/>
+          <p:nvPr/>
+        </p:nvSpPr>
+        <p:spPr bwMode="auto">
+          <a:xfrm>
+            <a:off x="514536" y="1944189"/>
+            <a:ext cx="8137606" cy="3236961"/>
+          </a:xfrm>
+          <a:prstGeom prst="rect">
+            <a:avLst/>
+          </a:prstGeom>
+          <a:solidFill>
+            <a:schemeClr val="accent1"/>
+          </a:solidFill>
+        </p:spPr>
+        <p:style>
+          <a:lnRef idx="2">
+            <a:schemeClr val="accent2">
+              <a:shade val="50000"/>
+            </a:schemeClr>
+          </a:lnRef>
+          <a:fillRef idx="1">
+            <a:schemeClr val="accent2"/>
+          </a:fillRef>
+          <a:effectRef idx="0">
+            <a:schemeClr val="accent2"/>
+          </a:effectRef>
+          <a:fontRef idx="minor">
+            <a:schemeClr val="lt1"/>
+          </a:fontRef>
+        </p:style>
+        <p:txBody>
+          <a:bodyPr rtlCol="0" anchor="t" anchorCtr="0"/>
+          <a:lstStyle/>
+          <a:p>
+            <a:pPr algn="ctr"/>
+            <a:r>
+              <a:rPr lang="en-US" sz="2000" b="1" dirty="0">
+                <a:solidFill>
+                  <a:schemeClr val="tx1"/>
+                </a:solidFill>
+                <a:latin typeface="Segoe UI Light" panose="020B0502040204020203" pitchFamily="34" charset="0"/>
+                <a:cs typeface="Segoe UI Light" panose="020B0502040204020203" pitchFamily="34" charset="0"/>
+              </a:rPr>
+              <a:t> </a:t>
+            </a:r>
+            <a:r>
+              <a:rPr lang="en-US" b="1" dirty="0">
+                <a:solidFill>
+                  <a:schemeClr val="tx1"/>
+                </a:solidFill>
+                <a:latin typeface="Segoe UI Light" panose="020B0502040204020203" pitchFamily="34" charset="0"/>
+                <a:cs typeface="Segoe UI Light" panose="020B0502040204020203" pitchFamily="34" charset="0"/>
+              </a:rPr>
+              <a:t>1+ Named Applications</a:t>
+            </a:r>
+          </a:p>
+          <a:p>
+            <a:pPr algn="ctr"/>
+            <a:r>
+              <a:rPr lang="en-US" dirty="0">
+                <a:solidFill>
+                  <a:schemeClr val="tx1"/>
+                </a:solidFill>
+                <a:latin typeface="Segoe UI Light" panose="020B0502040204020203" pitchFamily="34" charset="0"/>
+                <a:cs typeface="Segoe UI Light" panose="020B0502040204020203" pitchFamily="34" charset="0"/>
+              </a:rPr>
+              <a:t>Isolation, Multitenancy, Unit of versioning/config</a:t>
+            </a:r>
+          </a:p>
+        </p:txBody>
+      </p:sp>
+      <p:sp>
+        <p:nvSpPr>
+          <p:cNvPr id="12" name="Rectangle 11"/>
+          <p:cNvSpPr/>
+          <p:nvPr/>
+        </p:nvSpPr>
+        <p:spPr bwMode="auto">
+          <a:xfrm>
+            <a:off x="689159" y="2719252"/>
+            <a:ext cx="7846305" cy="2389549"/>
+          </a:xfrm>
+          <a:prstGeom prst="rect">
+            <a:avLst/>
+          </a:prstGeom>
+          <a:solidFill>
+            <a:schemeClr val="accent6">
+              <a:lumMod val="75000"/>
+            </a:schemeClr>
+          </a:solidFill>
+        </p:spPr>
+        <p:style>
+          <a:lnRef idx="2">
+            <a:schemeClr val="accent2">
+              <a:shade val="50000"/>
+            </a:schemeClr>
+          </a:lnRef>
+          <a:fillRef idx="1">
+            <a:schemeClr val="accent2"/>
+          </a:fillRef>
+          <a:effectRef idx="0">
+            <a:schemeClr val="accent2"/>
+          </a:effectRef>
+          <a:fontRef idx="minor">
+            <a:schemeClr val="lt1"/>
+          </a:fontRef>
+        </p:style>
+        <p:txBody>
+          <a:bodyPr rtlCol="0" anchor="t" anchorCtr="0"/>
+          <a:lstStyle/>
+          <a:p>
+            <a:pPr algn="ctr"/>
+            <a:r>
+              <a:rPr lang="en-US" b="1" dirty="0">
+                <a:solidFill>
+                  <a:schemeClr val="tx1"/>
+                </a:solidFill>
+                <a:latin typeface="Segoe UI Light" panose="020B0502040204020203" pitchFamily="34" charset="0"/>
+                <a:cs typeface="Segoe UI Light" panose="020B0502040204020203" pitchFamily="34" charset="0"/>
+              </a:rPr>
+              <a:t>1+ Named Services</a:t>
+            </a:r>
+            <a:br>
+              <a:rPr lang="en-US" b="1" dirty="0">
+                <a:solidFill>
+                  <a:schemeClr val="tx1"/>
+                </a:solidFill>
+                <a:latin typeface="Segoe UI Light" panose="020B0502040204020203" pitchFamily="34" charset="0"/>
+                <a:cs typeface="Segoe UI Light" panose="020B0502040204020203" pitchFamily="34" charset="0"/>
+              </a:rPr>
+            </a:br>
+            <a:r>
+              <a:rPr lang="en-US" dirty="0">
+                <a:solidFill>
+                  <a:schemeClr val="tx1"/>
+                </a:solidFill>
+                <a:latin typeface="Segoe UI Light" panose="020B0502040204020203" pitchFamily="34" charset="0"/>
+                <a:cs typeface="Segoe UI Light" panose="020B0502040204020203" pitchFamily="34" charset="0"/>
+              </a:rPr>
+              <a:t>Code package(s), Multitenancy (w/o isolation)</a:t>
+            </a:r>
+          </a:p>
+        </p:txBody>
+      </p:sp>
+      <p:sp>
+        <p:nvSpPr>
+          <p:cNvPr id="13" name="Rectangle 12"/>
+          <p:cNvSpPr/>
+          <p:nvPr/>
+        </p:nvSpPr>
+        <p:spPr bwMode="auto">
+          <a:xfrm>
+            <a:off x="909069" y="3572692"/>
+            <a:ext cx="3611441" cy="1488869"/>
+          </a:xfrm>
+          <a:prstGeom prst="rect">
+            <a:avLst/>
+          </a:prstGeom>
+          <a:gradFill flip="none" rotWithShape="1">
+            <a:gsLst>
+              <a:gs pos="0">
+                <a:schemeClr val="accent5">
+                  <a:lumMod val="67000"/>
+                </a:schemeClr>
+              </a:gs>
+              <a:gs pos="48000">
+                <a:schemeClr val="accent5">
+                  <a:lumMod val="97000"/>
+                  <a:lumOff val="3000"/>
+                </a:schemeClr>
+              </a:gs>
+              <a:gs pos="100000">
+                <a:schemeClr val="accent5">
+                  <a:lumMod val="60000"/>
+                  <a:lumOff val="40000"/>
+                </a:schemeClr>
+              </a:gs>
+            </a:gsLst>
+            <a:lin ang="16200000" scaled="1"/>
+            <a:tileRect/>
+          </a:gradFill>
+        </p:spPr>
+        <p:style>
+          <a:lnRef idx="2">
+            <a:schemeClr val="accent2">
+              <a:shade val="50000"/>
+            </a:schemeClr>
+          </a:lnRef>
+          <a:fillRef idx="1">
+            <a:schemeClr val="accent2"/>
+          </a:fillRef>
+          <a:effectRef idx="0">
+            <a:schemeClr val="accent2"/>
+          </a:effectRef>
+          <a:fontRef idx="minor">
+            <a:schemeClr val="lt1"/>
+          </a:fontRef>
+        </p:style>
+        <p:txBody>
+          <a:bodyPr rtlCol="0" anchor="t" anchorCtr="0"/>
+          <a:lstStyle/>
+          <a:p>
+            <a:pPr algn="ctr"/>
+            <a:r>
+              <a:rPr lang="en-US" b="1" dirty="0">
+                <a:solidFill>
+                  <a:schemeClr val="tx1"/>
+                </a:solidFill>
+                <a:latin typeface="Segoe UI Light" panose="020B0502040204020203" pitchFamily="34" charset="0"/>
+                <a:cs typeface="Segoe UI Light" panose="020B0502040204020203" pitchFamily="34" charset="0"/>
+              </a:rPr>
+              <a:t>Stateless: 1 Partition</a:t>
+            </a:r>
+            <a:br>
+              <a:rPr lang="en-US" b="1" dirty="0">
+                <a:solidFill>
+                  <a:schemeClr val="tx1"/>
+                </a:solidFill>
+                <a:latin typeface="Segoe UI Light" panose="020B0502040204020203" pitchFamily="34" charset="0"/>
+                <a:cs typeface="Segoe UI Light" panose="020B0502040204020203" pitchFamily="34" charset="0"/>
+              </a:rPr>
+            </a:br>
+            <a:r>
+              <a:rPr lang="en-US" dirty="0">
+                <a:solidFill>
+                  <a:schemeClr val="tx1"/>
+                </a:solidFill>
+                <a:latin typeface="Segoe UI Light" panose="020B0502040204020203" pitchFamily="34" charset="0"/>
+                <a:cs typeface="Segoe UI Light" panose="020B0502040204020203" pitchFamily="34" charset="0"/>
+              </a:rPr>
+              <a:t>No value</a:t>
+            </a:r>
+          </a:p>
+        </p:txBody>
+      </p:sp>
+      <p:sp>
+        <p:nvSpPr>
+          <p:cNvPr id="14" name="Rectangle 13"/>
+          <p:cNvSpPr/>
+          <p:nvPr/>
+        </p:nvSpPr>
+        <p:spPr bwMode="auto">
+          <a:xfrm>
+            <a:off x="1439008" y="4346780"/>
+            <a:ext cx="2641866" cy="636224"/>
+          </a:xfrm>
+          <a:prstGeom prst="rect">
+            <a:avLst/>
+          </a:prstGeom>
+          <a:solidFill>
+            <a:srgbClr val="7030A0"/>
+          </a:solidFill>
+          <a:ln w="19050" cap="flat" cmpd="sng" algn="ctr">
+            <a:solidFill>
+              <a:schemeClr val="tx1"/>
+            </a:solidFill>
+            <a:prstDash val="solid"/>
+            <a:round/>
+            <a:headEnd type="none" w="sm" len="sm"/>
+            <a:tailEnd type="triangle" w="lg" len="lg"/>
+          </a:ln>
+          <a:effectLst/>
+        </p:spPr>
+        <p:txBody>
+          <a:bodyPr vert="horz" wrap="square" lIns="45720" tIns="45720" rIns="45720" bIns="45720" numCol="1" rtlCol="0" anchor="t" anchorCtr="1" compatLnSpc="1">
+            <a:prstTxWarp prst="textNoShape">
+              <a:avLst/>
+            </a:prstTxWarp>
+            <a:noAutofit/>
+          </a:bodyPr>
+          <a:lstStyle/>
+          <a:p>
+            <a:pPr algn="ctr"/>
+            <a:r>
+              <a:rPr lang="en-US" b="1" dirty="0">
+                <a:solidFill>
+                  <a:schemeClr val="bg1"/>
+                </a:solidFill>
+                <a:latin typeface="Segoe UI Light" panose="020B0502040204020203" pitchFamily="34" charset="0"/>
+                <a:cs typeface="Segoe UI Light" panose="020B0502040204020203" pitchFamily="34" charset="0"/>
+              </a:rPr>
+              <a:t>1+ Instances</a:t>
+            </a:r>
+            <a:br>
+              <a:rPr lang="en-US" b="1" dirty="0">
+                <a:solidFill>
+                  <a:schemeClr val="bg1"/>
+                </a:solidFill>
+                <a:latin typeface="Segoe UI Light" panose="020B0502040204020203" pitchFamily="34" charset="0"/>
+                <a:cs typeface="Segoe UI Light" panose="020B0502040204020203" pitchFamily="34" charset="0"/>
+              </a:rPr>
+            </a:br>
+            <a:r>
+              <a:rPr lang="en-US" dirty="0">
+                <a:solidFill>
+                  <a:schemeClr val="bg1"/>
+                </a:solidFill>
+                <a:latin typeface="Segoe UI Light" panose="020B0502040204020203" pitchFamily="34" charset="0"/>
+                <a:cs typeface="Segoe UI Light" panose="020B0502040204020203" pitchFamily="34" charset="0"/>
+              </a:rPr>
+              <a:t>Scale,</a:t>
+            </a:r>
+            <a:r>
+              <a:rPr lang="en-US" b="1" dirty="0">
+                <a:solidFill>
+                  <a:schemeClr val="bg1"/>
+                </a:solidFill>
+                <a:latin typeface="Segoe UI Light" panose="020B0502040204020203" pitchFamily="34" charset="0"/>
+                <a:cs typeface="Segoe UI Light" panose="020B0502040204020203" pitchFamily="34" charset="0"/>
+              </a:rPr>
+              <a:t> </a:t>
+            </a:r>
+            <a:r>
+              <a:rPr lang="en-US" dirty="0">
+                <a:solidFill>
+                  <a:schemeClr val="bg1"/>
+                </a:solidFill>
+                <a:latin typeface="Segoe UI Light" panose="020B0502040204020203" pitchFamily="34" charset="0"/>
+                <a:cs typeface="Segoe UI Light" panose="020B0502040204020203" pitchFamily="34" charset="0"/>
+              </a:rPr>
+              <a:t>Availability</a:t>
+            </a:r>
+          </a:p>
+        </p:txBody>
+      </p:sp>
+      <p:sp>
+        <p:nvSpPr>
+          <p:cNvPr id="15" name="Rectangle 14"/>
+          <p:cNvSpPr/>
+          <p:nvPr/>
+        </p:nvSpPr>
+        <p:spPr bwMode="auto">
+          <a:xfrm>
+            <a:off x="4724400" y="3541802"/>
+            <a:ext cx="3611441" cy="1487398"/>
+          </a:xfrm>
+          <a:prstGeom prst="rect">
+            <a:avLst/>
+          </a:prstGeom>
+          <a:gradFill flip="none" rotWithShape="1">
+            <a:gsLst>
+              <a:gs pos="0">
+                <a:schemeClr val="accent5">
+                  <a:lumMod val="67000"/>
+                </a:schemeClr>
+              </a:gs>
+              <a:gs pos="48000">
+                <a:schemeClr val="accent5">
+                  <a:lumMod val="97000"/>
+                  <a:lumOff val="3000"/>
+                </a:schemeClr>
+              </a:gs>
+              <a:gs pos="100000">
+                <a:schemeClr val="accent5">
+                  <a:lumMod val="60000"/>
+                  <a:lumOff val="40000"/>
+                </a:schemeClr>
+              </a:gs>
+            </a:gsLst>
+            <a:lin ang="16200000" scaled="1"/>
+            <a:tileRect/>
+          </a:gradFill>
+        </p:spPr>
+        <p:style>
+          <a:lnRef idx="2">
+            <a:schemeClr val="accent2">
+              <a:shade val="50000"/>
+            </a:schemeClr>
+          </a:lnRef>
+          <a:fillRef idx="1">
+            <a:schemeClr val="accent2"/>
+          </a:fillRef>
+          <a:effectRef idx="0">
+            <a:schemeClr val="accent2"/>
+          </a:effectRef>
+          <a:fontRef idx="minor">
+            <a:schemeClr val="lt1"/>
+          </a:fontRef>
+        </p:style>
+        <p:txBody>
+          <a:bodyPr rtlCol="0" anchor="t" anchorCtr="0"/>
+          <a:lstStyle/>
+          <a:p>
+            <a:pPr algn="ctr"/>
+            <a:r>
+              <a:rPr lang="en-US" b="1" dirty="0">
+                <a:solidFill>
+                  <a:schemeClr val="tx1"/>
+                </a:solidFill>
+                <a:latin typeface="Segoe UI Light" panose="020B0502040204020203" pitchFamily="34" charset="0"/>
+                <a:cs typeface="Segoe UI Light" panose="020B0502040204020203" pitchFamily="34" charset="0"/>
+              </a:rPr>
+              <a:t>Stateful: 1+ Partitions</a:t>
+            </a:r>
+            <a:br>
+              <a:rPr lang="en-US" b="1" dirty="0">
+                <a:solidFill>
+                  <a:schemeClr val="tx1"/>
+                </a:solidFill>
+                <a:latin typeface="Segoe UI Light" panose="020B0502040204020203" pitchFamily="34" charset="0"/>
+                <a:cs typeface="Segoe UI Light" panose="020B0502040204020203" pitchFamily="34" charset="0"/>
+              </a:rPr>
+            </a:br>
+            <a:r>
+              <a:rPr lang="en-US" dirty="0">
+                <a:solidFill>
+                  <a:schemeClr val="tx1"/>
+                </a:solidFill>
+                <a:latin typeface="Segoe UI Light" panose="020B0502040204020203" pitchFamily="34" charset="0"/>
+                <a:cs typeface="Segoe UI Light" panose="020B0502040204020203" pitchFamily="34" charset="0"/>
+              </a:rPr>
+              <a:t>Addressability, Scale</a:t>
+            </a:r>
+          </a:p>
+        </p:txBody>
+      </p:sp>
+      <p:sp>
+        <p:nvSpPr>
+          <p:cNvPr id="16" name="Rectangle 15"/>
+          <p:cNvSpPr/>
+          <p:nvPr/>
+        </p:nvSpPr>
+        <p:spPr bwMode="auto">
+          <a:xfrm>
+            <a:off x="5293741" y="4314023"/>
+            <a:ext cx="2641866" cy="636224"/>
+          </a:xfrm>
+          <a:prstGeom prst="rect">
+            <a:avLst/>
+          </a:prstGeom>
+          <a:solidFill>
+            <a:srgbClr val="7030A0"/>
+          </a:solidFill>
+          <a:ln w="19050" cap="flat" cmpd="sng" algn="ctr">
+            <a:solidFill>
+              <a:schemeClr val="tx1"/>
+            </a:solidFill>
+            <a:prstDash val="solid"/>
+            <a:round/>
+            <a:headEnd type="none" w="sm" len="sm"/>
+            <a:tailEnd type="triangle" w="lg" len="lg"/>
+          </a:ln>
+          <a:effectLst/>
+        </p:spPr>
+        <p:txBody>
+          <a:bodyPr vert="horz" wrap="square" lIns="45720" tIns="45720" rIns="45720" bIns="45720" numCol="1" rtlCol="0" anchor="t" anchorCtr="1" compatLnSpc="1">
+            <a:prstTxWarp prst="textNoShape">
+              <a:avLst/>
+            </a:prstTxWarp>
+            <a:noAutofit/>
+          </a:bodyPr>
+          <a:lstStyle/>
+          <a:p>
+            <a:pPr algn="ctr"/>
+            <a:r>
+              <a:rPr lang="en-US" b="1" dirty="0">
+                <a:solidFill>
+                  <a:schemeClr val="bg1"/>
+                </a:solidFill>
+                <a:latin typeface="Segoe UI Light" panose="020B0502040204020203" pitchFamily="34" charset="0"/>
+                <a:cs typeface="Segoe UI Light" panose="020B0502040204020203" pitchFamily="34" charset="0"/>
+              </a:rPr>
+              <a:t>1+ Replicas</a:t>
+            </a:r>
+            <a:br>
+              <a:rPr lang="en-US" b="1" dirty="0">
+                <a:solidFill>
+                  <a:schemeClr val="bg1"/>
+                </a:solidFill>
+                <a:latin typeface="Segoe UI Light" panose="020B0502040204020203" pitchFamily="34" charset="0"/>
+                <a:cs typeface="Segoe UI Light" panose="020B0502040204020203" pitchFamily="34" charset="0"/>
+              </a:rPr>
+            </a:br>
+            <a:r>
+              <a:rPr lang="en-US" dirty="0">
+                <a:solidFill>
+                  <a:schemeClr val="bg1"/>
+                </a:solidFill>
+                <a:latin typeface="Segoe UI Light" panose="020B0502040204020203" pitchFamily="34" charset="0"/>
+                <a:cs typeface="Segoe UI Light" panose="020B0502040204020203" pitchFamily="34" charset="0"/>
+              </a:rPr>
+              <a:t>Availability</a:t>
+            </a:r>
+          </a:p>
+        </p:txBody>
+      </p:sp>
+      <p:sp>
+        <p:nvSpPr>
+          <p:cNvPr id="17" name="TextBox 16"/>
+          <p:cNvSpPr txBox="1"/>
+          <p:nvPr/>
+        </p:nvSpPr>
+        <p:spPr>
+          <a:xfrm>
+            <a:off x="1905000" y="5334000"/>
+            <a:ext cx="5410200" cy="369332"/>
+          </a:xfrm>
+          <a:prstGeom prst="rect">
+            <a:avLst/>
+          </a:prstGeom>
+          <a:noFill/>
+        </p:spPr>
+        <p:txBody>
+          <a:bodyPr wrap="square" rtlCol="0">
+            <a:spAutoFit/>
+          </a:bodyPr>
+          <a:lstStyle/>
+          <a:p>
+            <a:pPr algn="ctr"/>
+            <a:r>
+              <a:rPr lang="en-US" dirty="0">
+                <a:latin typeface="Segoe UI Light" panose="020B0502040204020203" pitchFamily="34" charset="0"/>
+                <a:cs typeface="Segoe UI Light" panose="020B0502040204020203" pitchFamily="34" charset="0"/>
+              </a:rPr>
+              <a:t>From a Service Fabric Team Presentation</a:t>
+            </a:r>
+          </a:p>
+        </p:txBody>
+      </p:sp>
+    </p:spTree>
+    <p:extLst>
+      <p:ext uri="{BB962C8B-B14F-4D97-AF65-F5344CB8AC3E}">
+        <p14:creationId xmlns:p14="http://schemas.microsoft.com/office/powerpoint/2010/main" val="1983623602"/>
       </p:ext>
     </p:extLst>
   </p:cSld>

</xml_diff>

<commit_message>
Added Service Fabric Fundamentals:
</commit_message>
<xml_diff>
--- a/illustrations/illustrations.pptx
+++ b/illustrations/illustrations.pptx
@@ -5,7 +5,7 @@
     <p:sldMasterId id="2147483648" r:id="rId1"/>
   </p:sldMasterIdLst>
   <p:notesMasterIdLst>
-    <p:notesMasterId r:id="rId18"/>
+    <p:notesMasterId r:id="rId20"/>
   </p:notesMasterIdLst>
   <p:sldIdLst>
     <p:sldId id="574" r:id="rId2"/>
@@ -24,6 +24,8 @@
     <p:sldId id="587" r:id="rId15"/>
     <p:sldId id="588" r:id="rId16"/>
     <p:sldId id="589" r:id="rId17"/>
+    <p:sldId id="590" r:id="rId18"/>
+    <p:sldId id="591" r:id="rId19"/>
   </p:sldIdLst>
   <p:sldSz cx="9144000" cy="6858000" type="screen4x3"/>
   <p:notesSz cx="6858000" cy="9144000"/>
@@ -1978,22 +1980,22 @@
     </dgm:pt>
   </dgm:ptLst>
   <dgm:cxnLst>
+    <dgm:cxn modelId="{2C0F271A-9DC3-4874-8512-544D4DA2466A}" srcId="{BCACD718-32BE-45F5-A691-B9EE3D302E1E}" destId="{B1C23AF6-BE31-4914-818C-D393C108EC10}" srcOrd="0" destOrd="0" parTransId="{C223CFEE-25DD-43D7-A029-7F94691B435F}" sibTransId="{7E469D0A-54AF-4D30-9C2F-77F6AC72E6D1}"/>
+    <dgm:cxn modelId="{4BB6292B-DD56-48D3-9197-BBA14AF5C9A7}" srcId="{F99380A9-B668-449B-920D-51F879F1D912}" destId="{BCACD718-32BE-45F5-A691-B9EE3D302E1E}" srcOrd="1" destOrd="0" parTransId="{24AA74BD-90C3-4800-A1A3-D270A267950D}" sibTransId="{499878E2-56A0-48DF-8DFC-116485555A64}"/>
     <dgm:cxn modelId="{6F36FE41-029D-49FF-83B1-373D29A2262C}" type="presOf" srcId="{B1C23AF6-BE31-4914-818C-D393C108EC10}" destId="{37BA5629-FAFC-412A-90CD-731215C7A978}" srcOrd="0" destOrd="0" presId="urn:microsoft.com/office/officeart/2005/8/layout/process4"/>
+    <dgm:cxn modelId="{048A2377-7277-4D45-94BD-550681A57AB6}" srcId="{F99380A9-B668-449B-920D-51F879F1D912}" destId="{AF5DDCCF-7B53-4A4C-B16E-39CF90B0B9F2}" srcOrd="0" destOrd="0" parTransId="{8C8E70BC-9E4D-4023-A47E-827D82FC4EDA}" sibTransId="{7C380EF4-200F-4795-B540-E1B1F36C0852}"/>
+    <dgm:cxn modelId="{8960B50A-8489-4BB3-ADB4-23568788FC4A}" type="presOf" srcId="{AF5DDCCF-7B53-4A4C-B16E-39CF90B0B9F2}" destId="{5392887C-2905-4E40-8FF8-A9BCA74D5336}" srcOrd="0" destOrd="0" presId="urn:microsoft.com/office/officeart/2005/8/layout/process4"/>
+    <dgm:cxn modelId="{EB4A50D6-95CB-4D43-A4F7-D35E4A73B5D4}" srcId="{F99380A9-B668-449B-920D-51F879F1D912}" destId="{DEFEEA8C-B625-46EB-80FD-8036FD4F5303}" srcOrd="2" destOrd="0" parTransId="{EDBDE7BE-D6D0-4703-A2B0-226A24124F33}" sibTransId="{8C34E643-4E2F-427D-B1B8-4EF161F3BA87}"/>
+    <dgm:cxn modelId="{FABF78A1-B7CE-4C9C-99A2-14A03F8BCD47}" type="presOf" srcId="{66C197CC-BD55-4780-96DB-FFC14484B6F4}" destId="{54A6DB46-4E13-4153-BD8C-D6279691D80C}" srcOrd="0" destOrd="0" presId="urn:microsoft.com/office/officeart/2005/8/layout/process4"/>
     <dgm:cxn modelId="{5FD16841-95BF-4B41-A4E7-AE6413BC0FB4}" srcId="{DEFEEA8C-B625-46EB-80FD-8036FD4F5303}" destId="{66C197CC-BD55-4780-96DB-FFC14484B6F4}" srcOrd="0" destOrd="0" parTransId="{4B100D52-6AC8-4E7A-B2E0-9BE05AA4D77F}" sibTransId="{5BC94DCE-9E38-44EB-9E41-46759D062B81}"/>
-    <dgm:cxn modelId="{8960B50A-8489-4BB3-ADB4-23568788FC4A}" type="presOf" srcId="{AF5DDCCF-7B53-4A4C-B16E-39CF90B0B9F2}" destId="{5392887C-2905-4E40-8FF8-A9BCA74D5336}" srcOrd="0" destOrd="0" presId="urn:microsoft.com/office/officeart/2005/8/layout/process4"/>
+    <dgm:cxn modelId="{B7A6575D-38FD-4DB9-804B-6161B9C31898}" type="presOf" srcId="{DEFEEA8C-B625-46EB-80FD-8036FD4F5303}" destId="{6BB44E00-F442-4F25-9FE5-5B179876D08F}" srcOrd="0" destOrd="0" presId="urn:microsoft.com/office/officeart/2005/8/layout/process4"/>
     <dgm:cxn modelId="{3727209C-D399-49BA-975D-34906BF26614}" type="presOf" srcId="{D67728B6-92E8-4009-AF69-2D48B766590A}" destId="{D0E5A419-A8C3-4EF2-B67D-F59D92AFFF5C}" srcOrd="0" destOrd="0" presId="urn:microsoft.com/office/officeart/2005/8/layout/process4"/>
-    <dgm:cxn modelId="{B7A6575D-38FD-4DB9-804B-6161B9C31898}" type="presOf" srcId="{DEFEEA8C-B625-46EB-80FD-8036FD4F5303}" destId="{6BB44E00-F442-4F25-9FE5-5B179876D08F}" srcOrd="0" destOrd="0" presId="urn:microsoft.com/office/officeart/2005/8/layout/process4"/>
     <dgm:cxn modelId="{A09F15EC-1400-4F16-9959-003918DF7A7E}" type="presOf" srcId="{BCACD718-32BE-45F5-A691-B9EE3D302E1E}" destId="{698DB033-4727-4E3C-BCFC-6EC35C5DF62E}" srcOrd="0" destOrd="0" presId="urn:microsoft.com/office/officeart/2005/8/layout/process4"/>
-    <dgm:cxn modelId="{FABF78A1-B7CE-4C9C-99A2-14A03F8BCD47}" type="presOf" srcId="{66C197CC-BD55-4780-96DB-FFC14484B6F4}" destId="{54A6DB46-4E13-4153-BD8C-D6279691D80C}" srcOrd="0" destOrd="0" presId="urn:microsoft.com/office/officeart/2005/8/layout/process4"/>
-    <dgm:cxn modelId="{EB4A50D6-95CB-4D43-A4F7-D35E4A73B5D4}" srcId="{F99380A9-B668-449B-920D-51F879F1D912}" destId="{DEFEEA8C-B625-46EB-80FD-8036FD4F5303}" srcOrd="2" destOrd="0" parTransId="{EDBDE7BE-D6D0-4703-A2B0-226A24124F33}" sibTransId="{8C34E643-4E2F-427D-B1B8-4EF161F3BA87}"/>
-    <dgm:cxn modelId="{2C0F271A-9DC3-4874-8512-544D4DA2466A}" srcId="{BCACD718-32BE-45F5-A691-B9EE3D302E1E}" destId="{B1C23AF6-BE31-4914-818C-D393C108EC10}" srcOrd="0" destOrd="0" parTransId="{C223CFEE-25DD-43D7-A029-7F94691B435F}" sibTransId="{7E469D0A-54AF-4D30-9C2F-77F6AC72E6D1}"/>
     <dgm:cxn modelId="{E42AB08B-CCF6-485D-B438-83FFAEE130A0}" type="presOf" srcId="{AF5DDCCF-7B53-4A4C-B16E-39CF90B0B9F2}" destId="{99145A6D-7000-4445-B530-229FB8F1789A}" srcOrd="1" destOrd="0" presId="urn:microsoft.com/office/officeart/2005/8/layout/process4"/>
+    <dgm:cxn modelId="{60284354-1283-4E49-8A2A-6BDAF10A67EC}" type="presOf" srcId="{BCACD718-32BE-45F5-A691-B9EE3D302E1E}" destId="{BF6C8519-5E48-48CB-BE06-DDDDCA6D630D}" srcOrd="1" destOrd="0" presId="urn:microsoft.com/office/officeart/2005/8/layout/process4"/>
     <dgm:cxn modelId="{EDD64CC0-B960-4961-A8CA-E2C259E9C0C3}" type="presOf" srcId="{DEFEEA8C-B625-46EB-80FD-8036FD4F5303}" destId="{9631F43F-71D5-439A-86EB-4907586BC29B}" srcOrd="1" destOrd="0" presId="urn:microsoft.com/office/officeart/2005/8/layout/process4"/>
-    <dgm:cxn modelId="{4BB6292B-DD56-48D3-9197-BBA14AF5C9A7}" srcId="{F99380A9-B668-449B-920D-51F879F1D912}" destId="{BCACD718-32BE-45F5-A691-B9EE3D302E1E}" srcOrd="1" destOrd="0" parTransId="{24AA74BD-90C3-4800-A1A3-D270A267950D}" sibTransId="{499878E2-56A0-48DF-8DFC-116485555A64}"/>
+    <dgm:cxn modelId="{8A78FD57-467D-48C8-A90D-A3736DD1D8A7}" type="presOf" srcId="{F99380A9-B668-449B-920D-51F879F1D912}" destId="{42A4C1D8-DA21-497B-AD89-C3F1BD36FC1F}" srcOrd="0" destOrd="0" presId="urn:microsoft.com/office/officeart/2005/8/layout/process4"/>
     <dgm:cxn modelId="{51035011-0488-4BE7-A87A-2C3725D7D1F3}" srcId="{AF5DDCCF-7B53-4A4C-B16E-39CF90B0B9F2}" destId="{D67728B6-92E8-4009-AF69-2D48B766590A}" srcOrd="0" destOrd="0" parTransId="{9CAA8F85-7896-4A6C-95BD-5F459416FE75}" sibTransId="{37B92E8C-6F31-4F44-83F6-FAA9B09C5FE2}"/>
-    <dgm:cxn modelId="{048A2377-7277-4D45-94BD-550681A57AB6}" srcId="{F99380A9-B668-449B-920D-51F879F1D912}" destId="{AF5DDCCF-7B53-4A4C-B16E-39CF90B0B9F2}" srcOrd="0" destOrd="0" parTransId="{8C8E70BC-9E4D-4023-A47E-827D82FC4EDA}" sibTransId="{7C380EF4-200F-4795-B540-E1B1F36C0852}"/>
-    <dgm:cxn modelId="{8A78FD57-467D-48C8-A90D-A3736DD1D8A7}" type="presOf" srcId="{F99380A9-B668-449B-920D-51F879F1D912}" destId="{42A4C1D8-DA21-497B-AD89-C3F1BD36FC1F}" srcOrd="0" destOrd="0" presId="urn:microsoft.com/office/officeart/2005/8/layout/process4"/>
-    <dgm:cxn modelId="{60284354-1283-4E49-8A2A-6BDAF10A67EC}" type="presOf" srcId="{BCACD718-32BE-45F5-A691-B9EE3D302E1E}" destId="{BF6C8519-5E48-48CB-BE06-DDDDCA6D630D}" srcOrd="1" destOrd="0" presId="urn:microsoft.com/office/officeart/2005/8/layout/process4"/>
     <dgm:cxn modelId="{FF4C1400-1108-4DCE-9371-BE6F1C78C323}" type="presParOf" srcId="{42A4C1D8-DA21-497B-AD89-C3F1BD36FC1F}" destId="{AB831EBA-42C9-42E3-BE38-860137BBD197}" srcOrd="0" destOrd="0" presId="urn:microsoft.com/office/officeart/2005/8/layout/process4"/>
     <dgm:cxn modelId="{9D6C4966-9CCD-4422-B42E-DA5FBBF2378A}" type="presParOf" srcId="{AB831EBA-42C9-42E3-BE38-860137BBD197}" destId="{6BB44E00-F442-4F25-9FE5-5B179876D08F}" srcOrd="0" destOrd="0" presId="urn:microsoft.com/office/officeart/2005/8/layout/process4"/>
     <dgm:cxn modelId="{6A4D93F8-7C42-4481-98C9-2F6A513766FF}" type="presParOf" srcId="{AB831EBA-42C9-42E3-BE38-860137BBD197}" destId="{9631F43F-71D5-439A-86EB-4907586BC29B}" srcOrd="1" destOrd="0" presId="urn:microsoft.com/office/officeart/2005/8/layout/process4"/>
@@ -6205,7 +6207,7 @@
             <a:fld id="{1C54B592-DDDB-4FBB-91F2-233647701935}" type="datetimeFigureOut">
               <a:rPr lang="en-US" smtClean="0"/>
               <a:pPr/>
-              <a:t>12/5/2016</a:t>
+              <a:t>12/16/2016</a:t>
             </a:fld>
             <a:endParaRPr lang="en-US" dirty="0"/>
           </a:p>
@@ -6760,7 +6762,7 @@
           <a:p>
             <a:fld id="{C7AE018C-EBF3-4294-9E53-BB9692A1B238}" type="datetime1">
               <a:rPr lang="en-US" smtClean="0"/>
-              <a:t>12/5/2016</a:t>
+              <a:t>12/16/2016</a:t>
             </a:fld>
             <a:endParaRPr lang="en-US" dirty="0"/>
           </a:p>
@@ -6915,7 +6917,7 @@
           <a:p>
             <a:fld id="{AC5D3C69-66A1-4D00-B513-42CC0FCC59B6}" type="datetime1">
               <a:rPr lang="en-US" smtClean="0"/>
-              <a:t>12/5/2016</a:t>
+              <a:t>12/16/2016</a:t>
             </a:fld>
             <a:endParaRPr lang="en-US" dirty="0"/>
           </a:p>
@@ -7011,7 +7013,7 @@
           <a:p>
             <a:fld id="{DF081C4C-367B-4CA1-BFE5-DD5EF40A8C1E}" type="datetime1">
               <a:rPr lang="en-US" smtClean="0"/>
-              <a:t>12/5/2016</a:t>
+              <a:t>12/16/2016</a:t>
             </a:fld>
             <a:endParaRPr lang="en-US" dirty="0"/>
           </a:p>
@@ -7299,7 +7301,7 @@
           <a:p>
             <a:fld id="{7284FD7A-D0F1-4BFD-9AB1-D45A3214561B}" type="datetime1">
               <a:rPr lang="en-US" smtClean="0"/>
-              <a:t>12/5/2016</a:t>
+              <a:t>12/16/2016</a:t>
             </a:fld>
             <a:endParaRPr lang="en-US" dirty="0"/>
           </a:p>
@@ -7593,7 +7595,7 @@
           <a:p>
             <a:fld id="{7C1E8470-7002-4B16-912E-F3381BBFC303}" type="datetime1">
               <a:rPr lang="en-US" smtClean="0"/>
-              <a:t>12/5/2016</a:t>
+              <a:t>12/16/2016</a:t>
             </a:fld>
             <a:endParaRPr lang="en-US" dirty="0"/>
           </a:p>
@@ -8021,7 +8023,7 @@
           <a:p>
             <a:fld id="{2668835A-C4A1-487E-A7B8-3E3B6A85266C}" type="datetime1">
               <a:rPr lang="en-US" smtClean="0"/>
-              <a:t>12/5/2016</a:t>
+              <a:t>12/16/2016</a:t>
             </a:fld>
             <a:endParaRPr lang="en-US" dirty="0"/>
           </a:p>
@@ -8117,7 +8119,7 @@
           <a:p>
             <a:fld id="{83E71AAB-E703-47FE-974E-9D2B932F9534}" type="datetime1">
               <a:rPr lang="en-US" smtClean="0"/>
-              <a:t>12/5/2016</a:t>
+              <a:t>12/16/2016</a:t>
             </a:fld>
             <a:endParaRPr lang="en-US" dirty="0"/>
           </a:p>
@@ -8302,7 +8304,7 @@
           <a:p>
             <a:fld id="{C6C74358-98AB-4C1A-82FF-49E7FEE02080}" type="datetime1">
               <a:rPr lang="en-US" smtClean="0"/>
-              <a:t>12/5/2016</a:t>
+              <a:t>12/16/2016</a:t>
             </a:fld>
             <a:endParaRPr lang="en-US" dirty="0"/>
           </a:p>
@@ -15560,6 +15562,735 @@
     <p:extLst>
       <p:ext uri="{BB962C8B-B14F-4D97-AF65-F5344CB8AC3E}">
         <p14:creationId xmlns:p14="http://schemas.microsoft.com/office/powerpoint/2010/main" val="1983623602"/>
+      </p:ext>
+    </p:extLst>
+  </p:cSld>
+  <p:clrMapOvr>
+    <a:masterClrMapping/>
+  </p:clrMapOvr>
+</p:sld>
+</file>
+
+<file path=ppt/slides/slide17.xml><?xml version="1.0" encoding="utf-8"?>
+<p:sld xmlns:a="http://schemas.openxmlformats.org/drawingml/2006/main" xmlns:r="http://schemas.openxmlformats.org/officeDocument/2006/relationships" xmlns:p="http://schemas.openxmlformats.org/presentationml/2006/main">
+  <p:cSld>
+    <p:spTree>
+      <p:nvGrpSpPr>
+        <p:cNvPr id="1" name=""/>
+        <p:cNvGrpSpPr/>
+        <p:nvPr/>
+      </p:nvGrpSpPr>
+      <p:grpSpPr>
+        <a:xfrm>
+          <a:off x="0" y="0"/>
+          <a:ext cx="0" cy="0"/>
+          <a:chOff x="0" y="0"/>
+          <a:chExt cx="0" cy="0"/>
+        </a:xfrm>
+      </p:grpSpPr>
+      <p:sp>
+        <p:nvSpPr>
+          <p:cNvPr id="6" name="Rectangle 5"/>
+          <p:cNvSpPr/>
+          <p:nvPr/>
+        </p:nvSpPr>
+        <p:spPr>
+          <a:xfrm>
+            <a:off x="1804306" y="685800"/>
+            <a:ext cx="4880688" cy="2286000"/>
+          </a:xfrm>
+          <a:prstGeom prst="rect">
+            <a:avLst/>
+          </a:prstGeom>
+        </p:spPr>
+        <p:style>
+          <a:lnRef idx="2">
+            <a:schemeClr val="dk1"/>
+          </a:lnRef>
+          <a:fillRef idx="1">
+            <a:schemeClr val="lt1"/>
+          </a:fillRef>
+          <a:effectRef idx="0">
+            <a:schemeClr val="dk1"/>
+          </a:effectRef>
+          <a:fontRef idx="minor">
+            <a:schemeClr val="dk1"/>
+          </a:fontRef>
+        </p:style>
+        <p:txBody>
+          <a:bodyPr rtlCol="0" anchor="ctr"/>
+          <a:lstStyle/>
+          <a:p>
+            <a:pPr algn="ctr"/>
+            <a:endParaRPr lang="en-US" dirty="0"/>
+          </a:p>
+        </p:txBody>
+      </p:sp>
+      <p:sp>
+        <p:nvSpPr>
+          <p:cNvPr id="2" name="Slide Number Placeholder 1"/>
+          <p:cNvSpPr>
+            <a:spLocks noGrp="1"/>
+          </p:cNvSpPr>
+          <p:nvPr>
+            <p:ph type="sldNum" sz="quarter" idx="12"/>
+          </p:nvPr>
+        </p:nvSpPr>
+        <p:spPr/>
+        <p:txBody>
+          <a:bodyPr/>
+          <a:lstStyle/>
+          <a:p>
+            <a:fld id="{7C65DD3B-8E90-4815-956E-D18D24CB454B}" type="slidenum">
+              <a:rPr lang="en-US" smtClean="0"/>
+              <a:pPr/>
+              <a:t>17</a:t>
+            </a:fld>
+            <a:endParaRPr lang="en-US" dirty="0"/>
+          </a:p>
+        </p:txBody>
+      </p:sp>
+      <p:sp>
+        <p:nvSpPr>
+          <p:cNvPr id="3" name="Rectangle 2"/>
+          <p:cNvSpPr/>
+          <p:nvPr/>
+        </p:nvSpPr>
+        <p:spPr>
+          <a:xfrm>
+            <a:off x="2438400" y="914400"/>
+            <a:ext cx="1447800" cy="1371600"/>
+          </a:xfrm>
+          <a:prstGeom prst="rect">
+            <a:avLst/>
+          </a:prstGeom>
+        </p:spPr>
+        <p:style>
+          <a:lnRef idx="1">
+            <a:schemeClr val="dk1"/>
+          </a:lnRef>
+          <a:fillRef idx="2">
+            <a:schemeClr val="dk1"/>
+          </a:fillRef>
+          <a:effectRef idx="1">
+            <a:schemeClr val="dk1"/>
+          </a:effectRef>
+          <a:fontRef idx="minor">
+            <a:schemeClr val="dk1"/>
+          </a:fontRef>
+        </p:style>
+        <p:txBody>
+          <a:bodyPr rtlCol="0" anchor="ctr"/>
+          <a:lstStyle/>
+          <a:p>
+            <a:pPr algn="ctr"/>
+            <a:r>
+              <a:rPr lang="en-US" dirty="0"/>
+              <a:t>WEB </a:t>
+            </a:r>
+          </a:p>
+          <a:p>
+            <a:pPr algn="ctr"/>
+            <a:r>
+              <a:rPr lang="en-US" dirty="0"/>
+              <a:t>SERVICE</a:t>
+            </a:r>
+          </a:p>
+        </p:txBody>
+      </p:sp>
+      <p:sp>
+        <p:nvSpPr>
+          <p:cNvPr id="4" name="Rectangle 3"/>
+          <p:cNvSpPr/>
+          <p:nvPr/>
+        </p:nvSpPr>
+        <p:spPr>
+          <a:xfrm>
+            <a:off x="4572000" y="914400"/>
+            <a:ext cx="1447800" cy="1371600"/>
+          </a:xfrm>
+          <a:prstGeom prst="rect">
+            <a:avLst/>
+          </a:prstGeom>
+        </p:spPr>
+        <p:style>
+          <a:lnRef idx="1">
+            <a:schemeClr val="dk1"/>
+          </a:lnRef>
+          <a:fillRef idx="2">
+            <a:schemeClr val="dk1"/>
+          </a:fillRef>
+          <a:effectRef idx="1">
+            <a:schemeClr val="dk1"/>
+          </a:effectRef>
+          <a:fontRef idx="minor">
+            <a:schemeClr val="dk1"/>
+          </a:fontRef>
+        </p:style>
+        <p:txBody>
+          <a:bodyPr rtlCol="0" anchor="ctr"/>
+          <a:lstStyle/>
+          <a:p>
+            <a:pPr algn="ctr"/>
+            <a:r>
+              <a:rPr lang="en-US" dirty="0"/>
+              <a:t>RATES SERVICE</a:t>
+            </a:r>
+          </a:p>
+        </p:txBody>
+      </p:sp>
+      <p:sp>
+        <p:nvSpPr>
+          <p:cNvPr id="5" name="Right Arrow 22"/>
+          <p:cNvSpPr/>
+          <p:nvPr/>
+        </p:nvSpPr>
+        <p:spPr>
+          <a:xfrm>
+            <a:off x="4054150" y="1447800"/>
+            <a:ext cx="381000" cy="381000"/>
+          </a:xfrm>
+          <a:prstGeom prst="rightArrow">
+            <a:avLst/>
+          </a:prstGeom>
+        </p:spPr>
+        <p:style>
+          <a:lnRef idx="2">
+            <a:schemeClr val="accent1">
+              <a:shade val="50000"/>
+            </a:schemeClr>
+          </a:lnRef>
+          <a:fillRef idx="1">
+            <a:schemeClr val="accent1"/>
+          </a:fillRef>
+          <a:effectRef idx="0">
+            <a:schemeClr val="accent1"/>
+          </a:effectRef>
+          <a:fontRef idx="minor">
+            <a:schemeClr val="lt1"/>
+          </a:fontRef>
+        </p:style>
+        <p:txBody>
+          <a:bodyPr rtlCol="0" anchor="ctr"/>
+          <a:lstStyle/>
+          <a:p>
+            <a:pPr algn="ctr"/>
+            <a:endParaRPr lang="en-US"/>
+          </a:p>
+        </p:txBody>
+      </p:sp>
+      <p:sp>
+        <p:nvSpPr>
+          <p:cNvPr id="7" name="TextBox 6"/>
+          <p:cNvSpPr txBox="1"/>
+          <p:nvPr/>
+        </p:nvSpPr>
+        <p:spPr>
+          <a:xfrm>
+            <a:off x="3135863" y="2488168"/>
+            <a:ext cx="2133600" cy="369332"/>
+          </a:xfrm>
+          <a:prstGeom prst="rect">
+            <a:avLst/>
+          </a:prstGeom>
+          <a:noFill/>
+        </p:spPr>
+        <p:txBody>
+          <a:bodyPr wrap="square" rtlCol="0">
+            <a:spAutoFit/>
+          </a:bodyPr>
+          <a:lstStyle/>
+          <a:p>
+            <a:pPr algn="ctr"/>
+            <a:r>
+              <a:rPr lang="en-US" dirty="0"/>
+              <a:t>Rate Aggregator App</a:t>
+            </a:r>
+          </a:p>
+        </p:txBody>
+      </p:sp>
+      <p:sp>
+        <p:nvSpPr>
+          <p:cNvPr id="8" name="TextBox 7"/>
+          <p:cNvSpPr txBox="1"/>
+          <p:nvPr/>
+        </p:nvSpPr>
+        <p:spPr>
+          <a:xfrm>
+            <a:off x="381000" y="3991793"/>
+            <a:ext cx="8305800" cy="400110"/>
+          </a:xfrm>
+          <a:prstGeom prst="rect">
+            <a:avLst/>
+          </a:prstGeom>
+          <a:noFill/>
+        </p:spPr>
+        <p:txBody>
+          <a:bodyPr wrap="square" rtlCol="0">
+            <a:spAutoFit/>
+          </a:bodyPr>
+          <a:lstStyle/>
+          <a:p>
+            <a:r>
+              <a:rPr lang="en-US" sz="2000" dirty="0"/>
+              <a:t>http(s)://{nodeNameOrIP}:{port}/{appName}{partitionId}/{instanceId}/{guid}</a:t>
+            </a:r>
+          </a:p>
+        </p:txBody>
+      </p:sp>
+    </p:spTree>
+    <p:extLst>
+      <p:ext uri="{BB962C8B-B14F-4D97-AF65-F5344CB8AC3E}">
+        <p14:creationId xmlns:p14="http://schemas.microsoft.com/office/powerpoint/2010/main" val="2387789038"/>
+      </p:ext>
+    </p:extLst>
+  </p:cSld>
+  <p:clrMapOvr>
+    <a:masterClrMapping/>
+  </p:clrMapOvr>
+</p:sld>
+</file>
+
+<file path=ppt/slides/slide18.xml><?xml version="1.0" encoding="utf-8"?>
+<p:sld xmlns:a="http://schemas.openxmlformats.org/drawingml/2006/main" xmlns:r="http://schemas.openxmlformats.org/officeDocument/2006/relationships" xmlns:p="http://schemas.openxmlformats.org/presentationml/2006/main">
+  <p:cSld>
+    <p:spTree>
+      <p:nvGrpSpPr>
+        <p:cNvPr id="1" name=""/>
+        <p:cNvGrpSpPr/>
+        <p:nvPr/>
+      </p:nvGrpSpPr>
+      <p:grpSpPr>
+        <a:xfrm>
+          <a:off x="0" y="0"/>
+          <a:ext cx="0" cy="0"/>
+          <a:chOff x="0" y="0"/>
+          <a:chExt cx="0" cy="0"/>
+        </a:xfrm>
+      </p:grpSpPr>
+      <p:sp>
+        <p:nvSpPr>
+          <p:cNvPr id="6" name="Rectangle 5"/>
+          <p:cNvSpPr/>
+          <p:nvPr/>
+        </p:nvSpPr>
+        <p:spPr>
+          <a:xfrm>
+            <a:off x="1804306" y="685800"/>
+            <a:ext cx="4880688" cy="2286000"/>
+          </a:xfrm>
+          <a:prstGeom prst="rect">
+            <a:avLst/>
+          </a:prstGeom>
+        </p:spPr>
+        <p:style>
+          <a:lnRef idx="2">
+            <a:schemeClr val="dk1"/>
+          </a:lnRef>
+          <a:fillRef idx="1">
+            <a:schemeClr val="lt1"/>
+          </a:fillRef>
+          <a:effectRef idx="0">
+            <a:schemeClr val="dk1"/>
+          </a:effectRef>
+          <a:fontRef idx="minor">
+            <a:schemeClr val="dk1"/>
+          </a:fontRef>
+        </p:style>
+        <p:txBody>
+          <a:bodyPr rtlCol="0" anchor="ctr"/>
+          <a:lstStyle/>
+          <a:p>
+            <a:pPr algn="ctr"/>
+            <a:endParaRPr lang="en-US" dirty="0"/>
+          </a:p>
+        </p:txBody>
+      </p:sp>
+      <p:sp>
+        <p:nvSpPr>
+          <p:cNvPr id="2" name="Slide Number Placeholder 1"/>
+          <p:cNvSpPr>
+            <a:spLocks noGrp="1"/>
+          </p:cNvSpPr>
+          <p:nvPr>
+            <p:ph type="sldNum" sz="quarter" idx="12"/>
+          </p:nvPr>
+        </p:nvSpPr>
+        <p:spPr/>
+        <p:txBody>
+          <a:bodyPr/>
+          <a:lstStyle/>
+          <a:p>
+            <a:fld id="{7C65DD3B-8E90-4815-956E-D18D24CB454B}" type="slidenum">
+              <a:rPr lang="en-US" smtClean="0"/>
+              <a:pPr/>
+              <a:t>18</a:t>
+            </a:fld>
+            <a:endParaRPr lang="en-US" dirty="0"/>
+          </a:p>
+        </p:txBody>
+      </p:sp>
+      <p:sp>
+        <p:nvSpPr>
+          <p:cNvPr id="3" name="Rectangle 2"/>
+          <p:cNvSpPr/>
+          <p:nvPr/>
+        </p:nvSpPr>
+        <p:spPr>
+          <a:xfrm>
+            <a:off x="2438400" y="914400"/>
+            <a:ext cx="1447800" cy="1371600"/>
+          </a:xfrm>
+          <a:prstGeom prst="rect">
+            <a:avLst/>
+          </a:prstGeom>
+        </p:spPr>
+        <p:style>
+          <a:lnRef idx="1">
+            <a:schemeClr val="dk1"/>
+          </a:lnRef>
+          <a:fillRef idx="2">
+            <a:schemeClr val="dk1"/>
+          </a:fillRef>
+          <a:effectRef idx="1">
+            <a:schemeClr val="dk1"/>
+          </a:effectRef>
+          <a:fontRef idx="minor">
+            <a:schemeClr val="dk1"/>
+          </a:fontRef>
+        </p:style>
+        <p:txBody>
+          <a:bodyPr rtlCol="0" anchor="ctr"/>
+          <a:lstStyle/>
+          <a:p>
+            <a:pPr algn="ctr"/>
+            <a:r>
+              <a:rPr lang="en-US" dirty="0"/>
+              <a:t>WEB </a:t>
+            </a:r>
+          </a:p>
+          <a:p>
+            <a:pPr algn="ctr"/>
+            <a:r>
+              <a:rPr lang="en-US" dirty="0"/>
+              <a:t>SERVICE</a:t>
+            </a:r>
+          </a:p>
+        </p:txBody>
+      </p:sp>
+      <p:sp>
+        <p:nvSpPr>
+          <p:cNvPr id="4" name="Rectangle 3"/>
+          <p:cNvSpPr/>
+          <p:nvPr/>
+        </p:nvSpPr>
+        <p:spPr>
+          <a:xfrm>
+            <a:off x="4572000" y="914400"/>
+            <a:ext cx="1447800" cy="1371600"/>
+          </a:xfrm>
+          <a:prstGeom prst="rect">
+            <a:avLst/>
+          </a:prstGeom>
+        </p:spPr>
+        <p:style>
+          <a:lnRef idx="1">
+            <a:schemeClr val="dk1"/>
+          </a:lnRef>
+          <a:fillRef idx="2">
+            <a:schemeClr val="dk1"/>
+          </a:fillRef>
+          <a:effectRef idx="1">
+            <a:schemeClr val="dk1"/>
+          </a:effectRef>
+          <a:fontRef idx="minor">
+            <a:schemeClr val="dk1"/>
+          </a:fontRef>
+        </p:style>
+        <p:txBody>
+          <a:bodyPr rtlCol="0" anchor="ctr"/>
+          <a:lstStyle/>
+          <a:p>
+            <a:pPr algn="ctr"/>
+            <a:r>
+              <a:rPr lang="en-US" dirty="0"/>
+              <a:t>RATES SERVICE</a:t>
+            </a:r>
+          </a:p>
+        </p:txBody>
+      </p:sp>
+      <p:sp>
+        <p:nvSpPr>
+          <p:cNvPr id="5" name="Right Arrow 22"/>
+          <p:cNvSpPr/>
+          <p:nvPr/>
+        </p:nvSpPr>
+        <p:spPr>
+          <a:xfrm>
+            <a:off x="4054150" y="1447800"/>
+            <a:ext cx="381000" cy="381000"/>
+          </a:xfrm>
+          <a:prstGeom prst="rightArrow">
+            <a:avLst/>
+          </a:prstGeom>
+        </p:spPr>
+        <p:style>
+          <a:lnRef idx="2">
+            <a:schemeClr val="accent1">
+              <a:shade val="50000"/>
+            </a:schemeClr>
+          </a:lnRef>
+          <a:fillRef idx="1">
+            <a:schemeClr val="accent1"/>
+          </a:fillRef>
+          <a:effectRef idx="0">
+            <a:schemeClr val="accent1"/>
+          </a:effectRef>
+          <a:fontRef idx="minor">
+            <a:schemeClr val="lt1"/>
+          </a:fontRef>
+        </p:style>
+        <p:txBody>
+          <a:bodyPr rtlCol="0" anchor="ctr"/>
+          <a:lstStyle/>
+          <a:p>
+            <a:pPr algn="ctr"/>
+            <a:endParaRPr lang="en-US"/>
+          </a:p>
+        </p:txBody>
+      </p:sp>
+      <p:sp>
+        <p:nvSpPr>
+          <p:cNvPr id="7" name="TextBox 6"/>
+          <p:cNvSpPr txBox="1"/>
+          <p:nvPr/>
+        </p:nvSpPr>
+        <p:spPr>
+          <a:xfrm>
+            <a:off x="2438400" y="2488168"/>
+            <a:ext cx="3581399" cy="369332"/>
+          </a:xfrm>
+          <a:prstGeom prst="rect">
+            <a:avLst/>
+          </a:prstGeom>
+          <a:noFill/>
+        </p:spPr>
+        <p:txBody>
+          <a:bodyPr wrap="square" rtlCol="0">
+            <a:spAutoFit/>
+          </a:bodyPr>
+          <a:lstStyle/>
+          <a:p>
+            <a:pPr algn="ctr"/>
+            <a:r>
+              <a:rPr lang="en-US" dirty="0"/>
+              <a:t>ContosoRateAggregator</a:t>
+            </a:r>
+          </a:p>
+        </p:txBody>
+      </p:sp>
+      <p:sp>
+        <p:nvSpPr>
+          <p:cNvPr id="9" name="Rectangle 8"/>
+          <p:cNvSpPr/>
+          <p:nvPr/>
+        </p:nvSpPr>
+        <p:spPr>
+          <a:xfrm>
+            <a:off x="1804306" y="3276600"/>
+            <a:ext cx="4880688" cy="2286000"/>
+          </a:xfrm>
+          <a:prstGeom prst="rect">
+            <a:avLst/>
+          </a:prstGeom>
+        </p:spPr>
+        <p:style>
+          <a:lnRef idx="2">
+            <a:schemeClr val="dk1"/>
+          </a:lnRef>
+          <a:fillRef idx="1">
+            <a:schemeClr val="lt1"/>
+          </a:fillRef>
+          <a:effectRef idx="0">
+            <a:schemeClr val="dk1"/>
+          </a:effectRef>
+          <a:fontRef idx="minor">
+            <a:schemeClr val="dk1"/>
+          </a:fontRef>
+        </p:style>
+        <p:txBody>
+          <a:bodyPr rtlCol="0" anchor="ctr"/>
+          <a:lstStyle/>
+          <a:p>
+            <a:pPr algn="ctr"/>
+            <a:endParaRPr lang="en-US" dirty="0"/>
+          </a:p>
+        </p:txBody>
+      </p:sp>
+      <p:sp>
+        <p:nvSpPr>
+          <p:cNvPr id="10" name="Rectangle 9"/>
+          <p:cNvSpPr/>
+          <p:nvPr/>
+        </p:nvSpPr>
+        <p:spPr>
+          <a:xfrm>
+            <a:off x="2438400" y="3505200"/>
+            <a:ext cx="1447800" cy="1371600"/>
+          </a:xfrm>
+          <a:prstGeom prst="rect">
+            <a:avLst/>
+          </a:prstGeom>
+        </p:spPr>
+        <p:style>
+          <a:lnRef idx="1">
+            <a:schemeClr val="dk1"/>
+          </a:lnRef>
+          <a:fillRef idx="2">
+            <a:schemeClr val="dk1"/>
+          </a:fillRef>
+          <a:effectRef idx="1">
+            <a:schemeClr val="dk1"/>
+          </a:effectRef>
+          <a:fontRef idx="minor">
+            <a:schemeClr val="dk1"/>
+          </a:fontRef>
+        </p:style>
+        <p:txBody>
+          <a:bodyPr rtlCol="0" anchor="ctr"/>
+          <a:lstStyle/>
+          <a:p>
+            <a:pPr algn="ctr"/>
+            <a:r>
+              <a:rPr lang="en-US" dirty="0"/>
+              <a:t>WEB </a:t>
+            </a:r>
+          </a:p>
+          <a:p>
+            <a:pPr algn="ctr"/>
+            <a:r>
+              <a:rPr lang="en-US" dirty="0"/>
+              <a:t>SERVICE</a:t>
+            </a:r>
+          </a:p>
+        </p:txBody>
+      </p:sp>
+      <p:sp>
+        <p:nvSpPr>
+          <p:cNvPr id="11" name="Rectangle 10"/>
+          <p:cNvSpPr/>
+          <p:nvPr/>
+        </p:nvSpPr>
+        <p:spPr>
+          <a:xfrm>
+            <a:off x="4572000" y="3505200"/>
+            <a:ext cx="1447800" cy="1371600"/>
+          </a:xfrm>
+          <a:prstGeom prst="rect">
+            <a:avLst/>
+          </a:prstGeom>
+        </p:spPr>
+        <p:style>
+          <a:lnRef idx="1">
+            <a:schemeClr val="dk1"/>
+          </a:lnRef>
+          <a:fillRef idx="2">
+            <a:schemeClr val="dk1"/>
+          </a:fillRef>
+          <a:effectRef idx="1">
+            <a:schemeClr val="dk1"/>
+          </a:effectRef>
+          <a:fontRef idx="minor">
+            <a:schemeClr val="dk1"/>
+          </a:fontRef>
+        </p:style>
+        <p:txBody>
+          <a:bodyPr rtlCol="0" anchor="ctr"/>
+          <a:lstStyle/>
+          <a:p>
+            <a:pPr algn="ctr"/>
+            <a:r>
+              <a:rPr lang="en-US" dirty="0"/>
+              <a:t>RATES SERVICE</a:t>
+            </a:r>
+          </a:p>
+        </p:txBody>
+      </p:sp>
+      <p:sp>
+        <p:nvSpPr>
+          <p:cNvPr id="12" name="Right Arrow 22"/>
+          <p:cNvSpPr/>
+          <p:nvPr/>
+        </p:nvSpPr>
+        <p:spPr>
+          <a:xfrm>
+            <a:off x="4054150" y="4038600"/>
+            <a:ext cx="381000" cy="381000"/>
+          </a:xfrm>
+          <a:prstGeom prst="rightArrow">
+            <a:avLst/>
+          </a:prstGeom>
+        </p:spPr>
+        <p:style>
+          <a:lnRef idx="2">
+            <a:schemeClr val="accent1">
+              <a:shade val="50000"/>
+            </a:schemeClr>
+          </a:lnRef>
+          <a:fillRef idx="1">
+            <a:schemeClr val="accent1"/>
+          </a:fillRef>
+          <a:effectRef idx="0">
+            <a:schemeClr val="accent1"/>
+          </a:effectRef>
+          <a:fontRef idx="minor">
+            <a:schemeClr val="lt1"/>
+          </a:fontRef>
+        </p:style>
+        <p:txBody>
+          <a:bodyPr rtlCol="0" anchor="ctr"/>
+          <a:lstStyle/>
+          <a:p>
+            <a:pPr algn="ctr"/>
+            <a:endParaRPr lang="en-US"/>
+          </a:p>
+        </p:txBody>
+      </p:sp>
+      <p:sp>
+        <p:nvSpPr>
+          <p:cNvPr id="13" name="TextBox 12"/>
+          <p:cNvSpPr txBox="1"/>
+          <p:nvPr/>
+        </p:nvSpPr>
+        <p:spPr>
+          <a:xfrm>
+            <a:off x="2438400" y="5078968"/>
+            <a:ext cx="3581399" cy="369332"/>
+          </a:xfrm>
+          <a:prstGeom prst="rect">
+            <a:avLst/>
+          </a:prstGeom>
+          <a:noFill/>
+        </p:spPr>
+        <p:txBody>
+          <a:bodyPr wrap="square" rtlCol="0">
+            <a:spAutoFit/>
+          </a:bodyPr>
+          <a:lstStyle/>
+          <a:p>
+            <a:pPr algn="ctr"/>
+            <a:r>
+              <a:rPr lang="en-US" dirty="0" err="1"/>
+              <a:t>FabricanRateAggregator</a:t>
+            </a:r>
+            <a:endParaRPr lang="en-US" dirty="0"/>
+          </a:p>
+        </p:txBody>
+      </p:sp>
+    </p:spTree>
+    <p:extLst>
+      <p:ext uri="{BB962C8B-B14F-4D97-AF65-F5344CB8AC3E}">
+        <p14:creationId xmlns:p14="http://schemas.microsoft.com/office/powerpoint/2010/main" val="4025609284"/>
       </p:ext>
     </p:extLst>
   </p:cSld>

</xml_diff>